<commit_message>
Travail du lundi soir 23/02
</commit_message>
<xml_diff>
--- a/Talentsoft-RD-Academy-Kinect.pptx
+++ b/Talentsoft-RD-Academy-Kinect.pptx
@@ -5,10 +5,10 @@
     <p:sldMasterId id="2147483648" r:id="rId4"/>
   </p:sldMasterIdLst>
   <p:notesMasterIdLst>
-    <p:notesMasterId r:id="rId28"/>
+    <p:notesMasterId r:id="rId27"/>
   </p:notesMasterIdLst>
   <p:handoutMasterIdLst>
-    <p:handoutMasterId r:id="rId29"/>
+    <p:handoutMasterId r:id="rId28"/>
   </p:handoutMasterIdLst>
   <p:sldIdLst>
     <p:sldId id="256" r:id="rId5"/>
@@ -16,24 +16,23 @@
     <p:sldId id="263" r:id="rId7"/>
     <p:sldId id="258" r:id="rId8"/>
     <p:sldId id="274" r:id="rId9"/>
-    <p:sldId id="259" r:id="rId10"/>
-    <p:sldId id="260" r:id="rId11"/>
-    <p:sldId id="261" r:id="rId12"/>
-    <p:sldId id="271" r:id="rId13"/>
-    <p:sldId id="264" r:id="rId14"/>
-    <p:sldId id="265" r:id="rId15"/>
-    <p:sldId id="269" r:id="rId16"/>
-    <p:sldId id="266" r:id="rId17"/>
-    <p:sldId id="267" r:id="rId18"/>
-    <p:sldId id="268" r:id="rId19"/>
-    <p:sldId id="270" r:id="rId20"/>
-    <p:sldId id="280" r:id="rId21"/>
-    <p:sldId id="275" r:id="rId22"/>
-    <p:sldId id="277" r:id="rId23"/>
-    <p:sldId id="276" r:id="rId24"/>
-    <p:sldId id="279" r:id="rId25"/>
-    <p:sldId id="273" r:id="rId26"/>
-    <p:sldId id="272" r:id="rId27"/>
+    <p:sldId id="281" r:id="rId10"/>
+    <p:sldId id="282" r:id="rId11"/>
+    <p:sldId id="283" r:id="rId12"/>
+    <p:sldId id="264" r:id="rId13"/>
+    <p:sldId id="265" r:id="rId14"/>
+    <p:sldId id="271" r:id="rId15"/>
+    <p:sldId id="266" r:id="rId16"/>
+    <p:sldId id="267" r:id="rId17"/>
+    <p:sldId id="268" r:id="rId18"/>
+    <p:sldId id="270" r:id="rId19"/>
+    <p:sldId id="280" r:id="rId20"/>
+    <p:sldId id="275" r:id="rId21"/>
+    <p:sldId id="277" r:id="rId22"/>
+    <p:sldId id="276" r:id="rId23"/>
+    <p:sldId id="279" r:id="rId24"/>
+    <p:sldId id="273" r:id="rId25"/>
+    <p:sldId id="272" r:id="rId26"/>
   </p:sldIdLst>
   <p:sldSz cx="9144000" cy="6858000" type="screen4x3"/>
   <p:notesSz cx="6858000" cy="9144000"/>
@@ -42633,6 +42632,10 @@
           <a:bodyPr/>
           <a:lstStyle/>
           <a:p>
+            <a:r>
+              <a:rPr lang="fr-FR" dirty="0" smtClean="0"/>
+              <a:t>Kinect For Windows</a:t>
+            </a:r>
             <a:endParaRPr lang="fr-FR" dirty="0"/>
           </a:p>
         </p:txBody>
@@ -42652,6 +42655,10 @@
           <a:bodyPr/>
           <a:lstStyle/>
           <a:p>
+            <a:r>
+              <a:rPr lang="fr-FR" dirty="0" smtClean="0"/>
+              <a:t>Stéphane VANACKER / Mickaël NIVET</a:t>
+            </a:r>
             <a:endParaRPr lang="fr-FR" dirty="0"/>
           </a:p>
         </p:txBody>
@@ -42689,168 +42696,17 @@
   <p:clrMapOvr>
     <a:masterClrMapping/>
   </p:clrMapOvr>
+  <p:timing>
+    <p:tnLst>
+      <p:par>
+        <p:cTn id="1" dur="indefinite" restart="never" nodeType="tmRoot"/>
+      </p:par>
+    </p:tnLst>
+  </p:timing>
 </p:sld>
 </file>
 
 <file path=ppt/slides/slide10.xml><?xml version="1.0" encoding="utf-8"?>
-<p:sld xmlns:a="http://schemas.openxmlformats.org/drawingml/2006/main" xmlns:r="http://schemas.openxmlformats.org/officeDocument/2006/relationships" xmlns:p="http://schemas.openxmlformats.org/presentationml/2006/main">
-  <p:cSld>
-    <p:spTree>
-      <p:nvGrpSpPr>
-        <p:cNvPr id="1" name=""/>
-        <p:cNvGrpSpPr/>
-        <p:nvPr/>
-      </p:nvGrpSpPr>
-      <p:grpSpPr>
-        <a:xfrm>
-          <a:off x="0" y="0"/>
-          <a:ext cx="0" cy="0"/>
-          <a:chOff x="0" y="0"/>
-          <a:chExt cx="0" cy="0"/>
-        </a:xfrm>
-      </p:grpSpPr>
-      <p:sp>
-        <p:nvSpPr>
-          <p:cNvPr id="2" name="Espace réservé du texte 1"/>
-          <p:cNvSpPr>
-            <a:spLocks noGrp="1"/>
-          </p:cNvSpPr>
-          <p:nvPr>
-            <p:ph type="body" sz="quarter" idx="11"/>
-          </p:nvPr>
-        </p:nvSpPr>
-        <p:spPr>
-          <a:xfrm>
-            <a:off x="4500880" y="2818798"/>
-            <a:ext cx="4643437" cy="776049"/>
-          </a:xfrm>
-        </p:spPr>
-        <p:txBody>
-          <a:bodyPr/>
-          <a:lstStyle/>
-          <a:p>
-            <a:endParaRPr lang="fr-FR" dirty="0"/>
-          </a:p>
-        </p:txBody>
-      </p:sp>
-      <p:sp>
-        <p:nvSpPr>
-          <p:cNvPr id="3" name="Titre 2"/>
-          <p:cNvSpPr>
-            <a:spLocks noGrp="1"/>
-          </p:cNvSpPr>
-          <p:nvPr>
-            <p:ph type="ctrTitle"/>
-          </p:nvPr>
-        </p:nvSpPr>
-        <p:spPr>
-          <a:xfrm>
-            <a:off x="609606" y="293037"/>
-            <a:ext cx="8241072" cy="1545939"/>
-          </a:xfrm>
-        </p:spPr>
-        <p:txBody>
-          <a:bodyPr/>
-          <a:lstStyle/>
-          <a:p>
-            <a:r>
-              <a:rPr lang="fr-FR" dirty="0"/>
-              <a:t>Live Coding : Application Windows utilisant </a:t>
-            </a:r>
-            <a:r>
-              <a:rPr lang="fr-FR" dirty="0" smtClean="0"/>
-              <a:t>Kinect</a:t>
-            </a:r>
-            <a:endParaRPr lang="fr-FR" dirty="0"/>
-          </a:p>
-        </p:txBody>
-      </p:sp>
-      <p:sp>
-        <p:nvSpPr>
-          <p:cNvPr id="4" name="Espace réservé du numéro de diapositive 3"/>
-          <p:cNvSpPr>
-            <a:spLocks noGrp="1"/>
-          </p:cNvSpPr>
-          <p:nvPr>
-            <p:ph type="sldNum" sz="quarter" idx="4"/>
-          </p:nvPr>
-        </p:nvSpPr>
-        <p:spPr/>
-        <p:txBody>
-          <a:bodyPr/>
-          <a:lstStyle/>
-          <a:p>
-            <a:fld id="{D8B8FD23-DCAD-4E0C-B199-CE60B1012E33}" type="slidenum">
-              <a:rPr lang="fr-FR" smtClean="0"/>
-              <a:pPr/>
-              <a:t>10</a:t>
-            </a:fld>
-            <a:endParaRPr lang="fr-FR" dirty="0"/>
-          </a:p>
-        </p:txBody>
-      </p:sp>
-      <p:sp>
-        <p:nvSpPr>
-          <p:cNvPr id="5" name="Espace réservé du texte 4"/>
-          <p:cNvSpPr>
-            <a:spLocks noGrp="1"/>
-          </p:cNvSpPr>
-          <p:nvPr>
-            <p:ph type="body" sz="quarter" idx="10"/>
-          </p:nvPr>
-        </p:nvSpPr>
-        <p:spPr/>
-        <p:txBody>
-          <a:bodyPr/>
-          <a:lstStyle/>
-          <a:p>
-            <a:r>
-              <a:rPr lang="fr-FR" dirty="0"/>
-              <a:t>Présentation du matériel</a:t>
-            </a:r>
-          </a:p>
-          <a:p>
-            <a:r>
-              <a:rPr lang="fr-FR" dirty="0"/>
-              <a:t>Live Coding : Application Windows utilisant Kinect</a:t>
-            </a:r>
-          </a:p>
-          <a:p>
-            <a:r>
-              <a:rPr lang="fr-FR" dirty="0"/>
-              <a:t>Démo : Focus sur les </a:t>
-            </a:r>
-            <a:r>
-              <a:rPr lang="fr-FR" dirty="0" err="1"/>
-              <a:t>Gestures</a:t>
-            </a:r>
-            <a:endParaRPr lang="fr-FR" dirty="0"/>
-          </a:p>
-          <a:p>
-            <a:r>
-              <a:rPr lang="fr-FR" dirty="0"/>
-              <a:t>Live Coding : Reconnaissance vocale et Robotique</a:t>
-            </a:r>
-          </a:p>
-          <a:p>
-            <a:endParaRPr lang="fr-FR" dirty="0"/>
-          </a:p>
-        </p:txBody>
-      </p:sp>
-    </p:spTree>
-    <p:extLst>
-      <p:ext uri="{BB962C8B-B14F-4D97-AF65-F5344CB8AC3E}">
-        <p14:creationId xmlns:p14="http://schemas.microsoft.com/office/powerpoint/2010/main" val="2490615142"/>
-      </p:ext>
-    </p:extLst>
-  </p:cSld>
-  <p:clrMapOvr>
-    <a:masterClrMapping/>
-  </p:clrMapOvr>
-</p:sld>
-</file>
-
-<file path=ppt/slides/slide11.xml><?xml version="1.0" encoding="utf-8"?>
 <p:sld xmlns:a="http://schemas.openxmlformats.org/drawingml/2006/main" xmlns:r="http://schemas.openxmlformats.org/officeDocument/2006/relationships" xmlns:p="http://schemas.openxmlformats.org/presentationml/2006/main">
   <p:cSld>
     <p:spTree>
@@ -42891,13 +42747,8 @@
             <a:pPr lvl="1"/>
             <a:r>
               <a:rPr lang="fr-FR" dirty="0" smtClean="0"/>
-              <a:t>1 </a:t>
-            </a:r>
-            <a:r>
-              <a:rPr lang="fr-FR" dirty="0" smtClean="0"/>
-              <a:t>SDK (version 1.8)</a:t>
-            </a:r>
-            <a:endParaRPr lang="fr-FR" dirty="0" smtClean="0"/>
+              <a:t>1 SDK (version 1.8)</a:t>
+            </a:r>
           </a:p>
           <a:p>
             <a:pPr lvl="2"/>
@@ -42987,7 +42838,7 @@
             <a:fld id="{C47C2D81-940B-4685-92D1-3ECF90F4940E}" type="slidenum">
               <a:rPr lang="fr-FR" smtClean="0"/>
               <a:pPr/>
-              <a:t>11</a:t>
+              <a:t>10</a:t>
             </a:fld>
             <a:endParaRPr lang="fr-FR" dirty="0"/>
           </a:p>
@@ -42997,6 +42848,107 @@
     <p:extLst>
       <p:ext uri="{BB962C8B-B14F-4D97-AF65-F5344CB8AC3E}">
         <p14:creationId xmlns:p14="http://schemas.microsoft.com/office/powerpoint/2010/main" val="2386648981"/>
+      </p:ext>
+    </p:extLst>
+  </p:cSld>
+  <p:clrMapOvr>
+    <a:masterClrMapping/>
+  </p:clrMapOvr>
+</p:sld>
+</file>
+
+<file path=ppt/slides/slide11.xml><?xml version="1.0" encoding="utf-8"?>
+<p:sld xmlns:a="http://schemas.openxmlformats.org/drawingml/2006/main" xmlns:r="http://schemas.openxmlformats.org/officeDocument/2006/relationships" xmlns:p="http://schemas.openxmlformats.org/presentationml/2006/main">
+  <p:cSld>
+    <p:spTree>
+      <p:nvGrpSpPr>
+        <p:cNvPr id="1" name=""/>
+        <p:cNvGrpSpPr/>
+        <p:nvPr/>
+      </p:nvGrpSpPr>
+      <p:grpSpPr>
+        <a:xfrm>
+          <a:off x="0" y="0"/>
+          <a:ext cx="0" cy="0"/>
+          <a:chOff x="0" y="0"/>
+          <a:chExt cx="0" cy="0"/>
+        </a:xfrm>
+      </p:grpSpPr>
+      <p:sp>
+        <p:nvSpPr>
+          <p:cNvPr id="3" name="Titre 2"/>
+          <p:cNvSpPr>
+            <a:spLocks noGrp="1"/>
+          </p:cNvSpPr>
+          <p:nvPr>
+            <p:ph type="title"/>
+          </p:nvPr>
+        </p:nvSpPr>
+        <p:spPr/>
+        <p:txBody>
+          <a:bodyPr/>
+          <a:lstStyle/>
+          <a:p>
+            <a:r>
+              <a:rPr lang="fr-FR" dirty="0" smtClean="0"/>
+              <a:t>Architecture – Accès aux flux d’information</a:t>
+            </a:r>
+            <a:endParaRPr lang="fr-FR" dirty="0"/>
+          </a:p>
+        </p:txBody>
+      </p:sp>
+      <p:sp>
+        <p:nvSpPr>
+          <p:cNvPr id="4" name="Espace réservé du numéro de diapositive 3"/>
+          <p:cNvSpPr>
+            <a:spLocks noGrp="1"/>
+          </p:cNvSpPr>
+          <p:nvPr>
+            <p:ph type="sldNum" sz="quarter" idx="4"/>
+          </p:nvPr>
+        </p:nvSpPr>
+        <p:spPr/>
+        <p:txBody>
+          <a:bodyPr/>
+          <a:lstStyle/>
+          <a:p>
+            <a:fld id="{C47C2D81-940B-4685-92D1-3ECF90F4940E}" type="slidenum">
+              <a:rPr lang="fr-FR" smtClean="0"/>
+              <a:pPr/>
+              <a:t>11</a:t>
+            </a:fld>
+            <a:endParaRPr lang="fr-FR" dirty="0"/>
+          </a:p>
+        </p:txBody>
+      </p:sp>
+      <p:graphicFrame>
+        <p:nvGraphicFramePr>
+          <p:cNvPr id="6" name="Espace réservé du contenu 3"/>
+          <p:cNvGraphicFramePr>
+            <a:graphicFrameLocks/>
+          </p:cNvGraphicFramePr>
+          <p:nvPr>
+            <p:extLst>
+              <p:ext uri="{D42A27DB-BD31-4B8C-83A1-F6EECF244321}">
+                <p14:modId xmlns:p14="http://schemas.microsoft.com/office/powerpoint/2010/main" val="1241852078"/>
+              </p:ext>
+            </p:extLst>
+          </p:nvPr>
+        </p:nvGraphicFramePr>
+        <p:xfrm>
+          <a:off x="233082" y="1744943"/>
+          <a:ext cx="8193742" cy="4351338"/>
+        </p:xfrm>
+        <a:graphic>
+          <a:graphicData uri="http://schemas.openxmlformats.org/drawingml/2006/diagram">
+            <dgm:relIds xmlns:dgm="http://schemas.openxmlformats.org/drawingml/2006/diagram" xmlns:r="http://schemas.openxmlformats.org/officeDocument/2006/relationships" r:dm="rId2" r:lo="rId3" r:qs="rId4" r:cs="rId5"/>
+          </a:graphicData>
+        </a:graphic>
+      </p:graphicFrame>
+    </p:spTree>
+    <p:extLst>
+      <p:ext uri="{BB962C8B-B14F-4D97-AF65-F5344CB8AC3E}">
+        <p14:creationId xmlns:p14="http://schemas.microsoft.com/office/powerpoint/2010/main" val="233628240"/>
       </p:ext>
     </p:extLst>
   </p:cSld>
@@ -43040,13 +42992,7 @@
           <a:p>
             <a:r>
               <a:rPr lang="fr-FR" dirty="0" smtClean="0"/>
-              <a:t>Plusieurs Kinect</a:t>
-            </a:r>
-          </a:p>
-          <a:p>
-            <a:r>
-              <a:rPr lang="fr-FR" dirty="0" smtClean="0"/>
-              <a:t>Plusieurs observateurs …</a:t>
+              <a:t>Démonstration des capacités de base de la Kinect</a:t>
             </a:r>
             <a:endParaRPr lang="fr-FR" dirty="0"/>
           </a:p>
@@ -43069,7 +43015,7 @@
           <a:p>
             <a:r>
               <a:rPr lang="fr-FR" dirty="0" smtClean="0"/>
-              <a:t>Architecture du SDK </a:t>
+              <a:t>Live Coding</a:t>
             </a:r>
             <a:endParaRPr lang="fr-FR" dirty="0"/>
           </a:p>
@@ -43102,7 +43048,7 @@
     </p:spTree>
     <p:extLst>
       <p:ext uri="{BB962C8B-B14F-4D97-AF65-F5344CB8AC3E}">
-        <p14:creationId xmlns:p14="http://schemas.microsoft.com/office/powerpoint/2010/main" val="3446087481"/>
+        <p14:creationId xmlns:p14="http://schemas.microsoft.com/office/powerpoint/2010/main" val="3852720044"/>
       </p:ext>
     </p:extLst>
   </p:cSld>
@@ -43131,23 +43077,24 @@
       </p:grpSpPr>
       <p:sp>
         <p:nvSpPr>
-          <p:cNvPr id="2" name="Espace réservé du contenu 1"/>
+          <p:cNvPr id="2" name="Espace réservé du texte 1"/>
           <p:cNvSpPr>
             <a:spLocks noGrp="1"/>
           </p:cNvSpPr>
           <p:nvPr>
-            <p:ph idx="1"/>
+            <p:ph type="body" sz="quarter" idx="11"/>
           </p:nvPr>
         </p:nvSpPr>
-        <p:spPr/>
+        <p:spPr>
+          <a:xfrm>
+            <a:off x="4500563" y="3797820"/>
+            <a:ext cx="4643437" cy="478345"/>
+          </a:xfrm>
+        </p:spPr>
         <p:txBody>
           <a:bodyPr/>
           <a:lstStyle/>
           <a:p>
-            <a:r>
-              <a:rPr lang="fr-FR" dirty="0" smtClean="0"/>
-              <a:t>Démonstration des capacités de base de la Kinect</a:t>
-            </a:r>
             <a:endParaRPr lang="fr-FR" dirty="0"/>
           </a:p>
         </p:txBody>
@@ -43159,17 +43106,30 @@
             <a:spLocks noGrp="1"/>
           </p:cNvSpPr>
           <p:nvPr>
-            <p:ph type="title"/>
+            <p:ph type="ctrTitle"/>
           </p:nvPr>
         </p:nvSpPr>
-        <p:spPr/>
+        <p:spPr>
+          <a:xfrm>
+            <a:off x="609606" y="293037"/>
+            <a:ext cx="8241072" cy="1545939"/>
+          </a:xfrm>
+        </p:spPr>
         <p:txBody>
           <a:bodyPr/>
           <a:lstStyle/>
           <a:p>
             <a:r>
+              <a:rPr lang="fr-FR" dirty="0"/>
+              <a:t>Live Coding : </a:t>
+            </a:r>
+            <a:r>
               <a:rPr lang="fr-FR" dirty="0" smtClean="0"/>
-              <a:t>Live Coding</a:t>
+              <a:t>Focus sur les </a:t>
+            </a:r>
+            <a:r>
+              <a:rPr lang="fr-FR" dirty="0" err="1" smtClean="0"/>
+              <a:t>gestures</a:t>
             </a:r>
             <a:endParaRPr lang="fr-FR" dirty="0"/>
           </a:p>
@@ -43190,124 +43150,10 @@
           <a:bodyPr/>
           <a:lstStyle/>
           <a:p>
-            <a:fld id="{C47C2D81-940B-4685-92D1-3ECF90F4940E}" type="slidenum">
+            <a:fld id="{D8B8FD23-DCAD-4E0C-B199-CE60B1012E33}" type="slidenum">
               <a:rPr lang="fr-FR" smtClean="0"/>
               <a:pPr/>
               <a:t>13</a:t>
-            </a:fld>
-            <a:endParaRPr lang="fr-FR" dirty="0"/>
-          </a:p>
-        </p:txBody>
-      </p:sp>
-    </p:spTree>
-    <p:extLst>
-      <p:ext uri="{BB962C8B-B14F-4D97-AF65-F5344CB8AC3E}">
-        <p14:creationId xmlns:p14="http://schemas.microsoft.com/office/powerpoint/2010/main" val="3852720044"/>
-      </p:ext>
-    </p:extLst>
-  </p:cSld>
-  <p:clrMapOvr>
-    <a:masterClrMapping/>
-  </p:clrMapOvr>
-</p:sld>
-</file>
-
-<file path=ppt/slides/slide14.xml><?xml version="1.0" encoding="utf-8"?>
-<p:sld xmlns:a="http://schemas.openxmlformats.org/drawingml/2006/main" xmlns:r="http://schemas.openxmlformats.org/officeDocument/2006/relationships" xmlns:p="http://schemas.openxmlformats.org/presentationml/2006/main">
-  <p:cSld>
-    <p:spTree>
-      <p:nvGrpSpPr>
-        <p:cNvPr id="1" name=""/>
-        <p:cNvGrpSpPr/>
-        <p:nvPr/>
-      </p:nvGrpSpPr>
-      <p:grpSpPr>
-        <a:xfrm>
-          <a:off x="0" y="0"/>
-          <a:ext cx="0" cy="0"/>
-          <a:chOff x="0" y="0"/>
-          <a:chExt cx="0" cy="0"/>
-        </a:xfrm>
-      </p:grpSpPr>
-      <p:sp>
-        <p:nvSpPr>
-          <p:cNvPr id="2" name="Espace réservé du texte 1"/>
-          <p:cNvSpPr>
-            <a:spLocks noGrp="1"/>
-          </p:cNvSpPr>
-          <p:nvPr>
-            <p:ph type="body" sz="quarter" idx="11"/>
-          </p:nvPr>
-        </p:nvSpPr>
-        <p:spPr>
-          <a:xfrm>
-            <a:off x="4500563" y="3797820"/>
-            <a:ext cx="4643437" cy="478345"/>
-          </a:xfrm>
-        </p:spPr>
-        <p:txBody>
-          <a:bodyPr/>
-          <a:lstStyle/>
-          <a:p>
-            <a:endParaRPr lang="fr-FR" dirty="0"/>
-          </a:p>
-        </p:txBody>
-      </p:sp>
-      <p:sp>
-        <p:nvSpPr>
-          <p:cNvPr id="3" name="Titre 2"/>
-          <p:cNvSpPr>
-            <a:spLocks noGrp="1"/>
-          </p:cNvSpPr>
-          <p:nvPr>
-            <p:ph type="ctrTitle"/>
-          </p:nvPr>
-        </p:nvSpPr>
-        <p:spPr>
-          <a:xfrm>
-            <a:off x="609606" y="293037"/>
-            <a:ext cx="8241072" cy="1545939"/>
-          </a:xfrm>
-        </p:spPr>
-        <p:txBody>
-          <a:bodyPr/>
-          <a:lstStyle/>
-          <a:p>
-            <a:r>
-              <a:rPr lang="fr-FR" dirty="0"/>
-              <a:t>Live Coding : </a:t>
-            </a:r>
-            <a:r>
-              <a:rPr lang="fr-FR" dirty="0" smtClean="0"/>
-              <a:t>Focus sur les </a:t>
-            </a:r>
-            <a:r>
-              <a:rPr lang="fr-FR" dirty="0" err="1" smtClean="0"/>
-              <a:t>gestures</a:t>
-            </a:r>
-            <a:endParaRPr lang="fr-FR" dirty="0"/>
-          </a:p>
-        </p:txBody>
-      </p:sp>
-      <p:sp>
-        <p:nvSpPr>
-          <p:cNvPr id="4" name="Espace réservé du numéro de diapositive 3"/>
-          <p:cNvSpPr>
-            <a:spLocks noGrp="1"/>
-          </p:cNvSpPr>
-          <p:nvPr>
-            <p:ph type="sldNum" sz="quarter" idx="4"/>
-          </p:nvPr>
-        </p:nvSpPr>
-        <p:spPr/>
-        <p:txBody>
-          <a:bodyPr/>
-          <a:lstStyle/>
-          <a:p>
-            <a:fld id="{D8B8FD23-DCAD-4E0C-B199-CE60B1012E33}" type="slidenum">
-              <a:rPr lang="fr-FR" smtClean="0"/>
-              <a:pPr/>
-              <a:t>14</a:t>
             </a:fld>
             <a:endParaRPr lang="fr-FR" dirty="0"/>
           </a:p>
@@ -43374,7 +43220,7 @@
 </p:sld>
 </file>
 
-<file path=ppt/slides/slide15.xml><?xml version="1.0" encoding="utf-8"?>
+<file path=ppt/slides/slide14.xml><?xml version="1.0" encoding="utf-8"?>
 <p:sld xmlns:a="http://schemas.openxmlformats.org/drawingml/2006/main" xmlns:r="http://schemas.openxmlformats.org/officeDocument/2006/relationships" xmlns:p="http://schemas.openxmlformats.org/presentationml/2006/main">
   <p:cSld>
     <p:spTree>
@@ -43409,7 +43255,7 @@
             <a:fld id="{C47C2D81-940B-4685-92D1-3ECF90F4940E}" type="slidenum">
               <a:rPr lang="fr-FR" smtClean="0"/>
               <a:pPr/>
-              <a:t>15</a:t>
+              <a:t>14</a:t>
             </a:fld>
             <a:endParaRPr lang="fr-FR" dirty="0"/>
           </a:p>
@@ -43554,7 +43400,7 @@
 </p:sld>
 </file>
 
-<file path=ppt/slides/slide16.xml><?xml version="1.0" encoding="utf-8"?>
+<file path=ppt/slides/slide15.xml><?xml version="1.0" encoding="utf-8"?>
 <p:sld xmlns:a="http://schemas.openxmlformats.org/drawingml/2006/main" xmlns:r="http://schemas.openxmlformats.org/officeDocument/2006/relationships" xmlns:p="http://schemas.openxmlformats.org/presentationml/2006/main">
   <p:cSld>
     <p:spTree>
@@ -43630,7 +43476,7 @@
             <a:fld id="{C47C2D81-940B-4685-92D1-3ECF90F4940E}" type="slidenum">
               <a:rPr lang="fr-FR" smtClean="0"/>
               <a:pPr/>
-              <a:t>16</a:t>
+              <a:t>15</a:t>
             </a:fld>
             <a:endParaRPr lang="fr-FR" dirty="0"/>
           </a:p>
@@ -43742,6 +43588,348 @@
     <p:extLst>
       <p:ext uri="{BB962C8B-B14F-4D97-AF65-F5344CB8AC3E}">
         <p14:creationId xmlns:p14="http://schemas.microsoft.com/office/powerpoint/2010/main" val="3271869282"/>
+      </p:ext>
+    </p:extLst>
+  </p:cSld>
+  <p:clrMapOvr>
+    <a:masterClrMapping/>
+  </p:clrMapOvr>
+</p:sld>
+</file>
+
+<file path=ppt/slides/slide16.xml><?xml version="1.0" encoding="utf-8"?>
+<p:sld xmlns:a="http://schemas.openxmlformats.org/drawingml/2006/main" xmlns:r="http://schemas.openxmlformats.org/officeDocument/2006/relationships" xmlns:p="http://schemas.openxmlformats.org/presentationml/2006/main">
+  <p:cSld>
+    <p:spTree>
+      <p:nvGrpSpPr>
+        <p:cNvPr id="1" name=""/>
+        <p:cNvGrpSpPr/>
+        <p:nvPr/>
+      </p:nvGrpSpPr>
+      <p:grpSpPr>
+        <a:xfrm>
+          <a:off x="0" y="0"/>
+          <a:ext cx="0" cy="0"/>
+          <a:chOff x="0" y="0"/>
+          <a:chExt cx="0" cy="0"/>
+        </a:xfrm>
+      </p:grpSpPr>
+      <p:sp>
+        <p:nvSpPr>
+          <p:cNvPr id="2" name="Espace réservé du contenu 1"/>
+          <p:cNvSpPr>
+            <a:spLocks noGrp="1"/>
+          </p:cNvSpPr>
+          <p:nvPr>
+            <p:ph idx="1"/>
+          </p:nvPr>
+        </p:nvSpPr>
+        <p:spPr/>
+        <p:txBody>
+          <a:bodyPr>
+            <a:normAutofit/>
+          </a:bodyPr>
+          <a:lstStyle/>
+          <a:p>
+            <a:pPr>
+              <a:lnSpc>
+                <a:spcPct val="120000"/>
+              </a:lnSpc>
+              <a:spcBef>
+                <a:spcPts val="0"/>
+              </a:spcBef>
+              <a:spcAft>
+                <a:spcPts val="0"/>
+              </a:spcAft>
+            </a:pPr>
+            <a:r>
+              <a:rPr lang="fr-FR" dirty="0" smtClean="0"/>
+              <a:t>Pas mal de travail si on veut gérer des mouvements simples comme repérer un déplacement de bras à gauche ou à Droite</a:t>
+            </a:r>
+          </a:p>
+          <a:p>
+            <a:pPr>
+              <a:lnSpc>
+                <a:spcPct val="120000"/>
+              </a:lnSpc>
+              <a:spcBef>
+                <a:spcPts val="0"/>
+              </a:spcBef>
+              <a:spcAft>
+                <a:spcPts val="0"/>
+              </a:spcAft>
+            </a:pPr>
+            <a:endParaRPr lang="en-US" dirty="0" smtClean="0"/>
+          </a:p>
+          <a:p>
+            <a:pPr>
+              <a:lnSpc>
+                <a:spcPct val="120000"/>
+              </a:lnSpc>
+              <a:spcBef>
+                <a:spcPts val="0"/>
+              </a:spcBef>
+              <a:spcAft>
+                <a:spcPts val="0"/>
+              </a:spcAft>
+            </a:pPr>
+            <a:r>
+              <a:rPr lang="en-US" dirty="0" smtClean="0"/>
+              <a:t>nothing </a:t>
+            </a:r>
+            <a:r>
+              <a:rPr lang="en-US" dirty="0"/>
+              <a:t>provided before </a:t>
+            </a:r>
+            <a:r>
+              <a:rPr lang="en-US" dirty="0" err="1"/>
+              <a:t>kinect</a:t>
+            </a:r>
+            <a:r>
+              <a:rPr lang="en-US" dirty="0"/>
+              <a:t> V2 (Xbox One)</a:t>
+            </a:r>
+          </a:p>
+          <a:p>
+            <a:pPr>
+              <a:lnSpc>
+                <a:spcPct val="120000"/>
+              </a:lnSpc>
+              <a:spcBef>
+                <a:spcPts val="0"/>
+              </a:spcBef>
+              <a:spcAft>
+                <a:spcPts val="0"/>
+              </a:spcAft>
+            </a:pPr>
+            <a:r>
+              <a:rPr lang="en-US" dirty="0" err="1" smtClean="0"/>
+              <a:t>kinect</a:t>
+            </a:r>
+            <a:r>
+              <a:rPr lang="en-US" dirty="0" smtClean="0"/>
+              <a:t> V1 </a:t>
+            </a:r>
+            <a:r>
+              <a:rPr lang="en-US" dirty="0" err="1" smtClean="0"/>
+              <a:t>dans</a:t>
+            </a:r>
+            <a:r>
+              <a:rPr lang="en-US" dirty="0" smtClean="0"/>
+              <a:t> le toolkit (à compiler </a:t>
+            </a:r>
+            <a:r>
+              <a:rPr lang="en-US" dirty="0" err="1" smtClean="0"/>
+              <a:t>soit</a:t>
+            </a:r>
+            <a:r>
+              <a:rPr lang="en-US" dirty="0" smtClean="0"/>
+              <a:t> </a:t>
+            </a:r>
+            <a:r>
+              <a:rPr lang="en-US" dirty="0" err="1" smtClean="0"/>
+              <a:t>même</a:t>
+            </a:r>
+            <a:r>
+              <a:rPr lang="en-US" dirty="0" smtClean="0"/>
+              <a:t>) </a:t>
+            </a:r>
+            <a:r>
+              <a:rPr lang="en-US" dirty="0"/>
+              <a:t>:</a:t>
+            </a:r>
+          </a:p>
+          <a:p>
+            <a:pPr>
+              <a:lnSpc>
+                <a:spcPct val="120000"/>
+              </a:lnSpc>
+              <a:spcBef>
+                <a:spcPts val="0"/>
+              </a:spcBef>
+              <a:spcAft>
+                <a:spcPts val="0"/>
+              </a:spcAft>
+            </a:pPr>
+            <a:r>
+              <a:rPr lang="en-US" dirty="0"/>
+              <a:t>* face </a:t>
+            </a:r>
+            <a:r>
+              <a:rPr lang="en-US" dirty="0" err="1" smtClean="0"/>
+              <a:t>traking</a:t>
+            </a:r>
+            <a:endParaRPr lang="en-US" dirty="0"/>
+          </a:p>
+          <a:p>
+            <a:pPr>
+              <a:lnSpc>
+                <a:spcPct val="120000"/>
+              </a:lnSpc>
+              <a:spcBef>
+                <a:spcPts val="0"/>
+              </a:spcBef>
+              <a:spcAft>
+                <a:spcPts val="0"/>
+              </a:spcAft>
+            </a:pPr>
+            <a:r>
+              <a:rPr lang="en-US" dirty="0"/>
+              <a:t>* interaction (only hand location, press and grip. no swipe gesture)</a:t>
+            </a:r>
+          </a:p>
+          <a:p>
+            <a:pPr>
+              <a:lnSpc>
+                <a:spcPct val="120000"/>
+              </a:lnSpc>
+              <a:spcBef>
+                <a:spcPts val="0"/>
+              </a:spcBef>
+              <a:spcAft>
+                <a:spcPts val="0"/>
+              </a:spcAft>
+            </a:pPr>
+            <a:endParaRPr lang="en-US" dirty="0" smtClean="0"/>
+          </a:p>
+          <a:p>
+            <a:pPr>
+              <a:lnSpc>
+                <a:spcPct val="120000"/>
+              </a:lnSpc>
+              <a:spcBef>
+                <a:spcPts val="0"/>
+              </a:spcBef>
+              <a:spcAft>
+                <a:spcPts val="0"/>
+              </a:spcAft>
+            </a:pPr>
+            <a:r>
+              <a:rPr lang="en-US" dirty="0" smtClean="0"/>
+              <a:t>Some </a:t>
+            </a:r>
+            <a:r>
+              <a:rPr lang="en-US" dirty="0"/>
+              <a:t>public frameworks are also available</a:t>
+            </a:r>
+          </a:p>
+          <a:p>
+            <a:pPr>
+              <a:lnSpc>
+                <a:spcPct val="120000"/>
+              </a:lnSpc>
+              <a:spcBef>
+                <a:spcPts val="0"/>
+              </a:spcBef>
+              <a:spcAft>
+                <a:spcPts val="0"/>
+              </a:spcAft>
+            </a:pPr>
+            <a:r>
+              <a:rPr lang="en-US" dirty="0" smtClean="0"/>
+              <a:t>for </a:t>
+            </a:r>
+            <a:r>
+              <a:rPr lang="en-US" dirty="0"/>
+              <a:t>this demo we choose to use Kinect Toolbox</a:t>
+            </a:r>
+          </a:p>
+          <a:p>
+            <a:pPr>
+              <a:lnSpc>
+                <a:spcPct val="120000"/>
+              </a:lnSpc>
+              <a:spcBef>
+                <a:spcPts val="0"/>
+              </a:spcBef>
+              <a:spcAft>
+                <a:spcPts val="0"/>
+              </a:spcAft>
+            </a:pPr>
+            <a:r>
+              <a:rPr lang="en-US" dirty="0"/>
+              <a:t>which is with Vitruvius the two projects that</a:t>
+            </a:r>
+          </a:p>
+          <a:p>
+            <a:pPr>
+              <a:lnSpc>
+                <a:spcPct val="120000"/>
+              </a:lnSpc>
+              <a:spcBef>
+                <a:spcPts val="0"/>
+              </a:spcBef>
+              <a:spcAft>
+                <a:spcPts val="0"/>
+              </a:spcAft>
+            </a:pPr>
+            <a:r>
+              <a:rPr lang="en-US" dirty="0"/>
+              <a:t>seems the most advanced </a:t>
+            </a:r>
+            <a:r>
+              <a:rPr lang="en-US" dirty="0" err="1"/>
+              <a:t>kinect</a:t>
+            </a:r>
+            <a:r>
+              <a:rPr lang="en-US" dirty="0"/>
+              <a:t> complement frameworks</a:t>
+            </a:r>
+            <a:endParaRPr lang="fr-FR" dirty="0"/>
+          </a:p>
+        </p:txBody>
+      </p:sp>
+      <p:sp>
+        <p:nvSpPr>
+          <p:cNvPr id="3" name="Titre 2"/>
+          <p:cNvSpPr>
+            <a:spLocks noGrp="1"/>
+          </p:cNvSpPr>
+          <p:nvPr>
+            <p:ph type="title"/>
+          </p:nvPr>
+        </p:nvSpPr>
+        <p:spPr/>
+        <p:txBody>
+          <a:bodyPr/>
+          <a:lstStyle/>
+          <a:p>
+            <a:r>
+              <a:rPr lang="fr-FR" dirty="0" smtClean="0"/>
+              <a:t>Librairie / Framework Tierce</a:t>
+            </a:r>
+            <a:endParaRPr lang="fr-FR" dirty="0"/>
+          </a:p>
+        </p:txBody>
+      </p:sp>
+      <p:sp>
+        <p:nvSpPr>
+          <p:cNvPr id="4" name="Espace réservé du numéro de diapositive 3"/>
+          <p:cNvSpPr>
+            <a:spLocks noGrp="1"/>
+          </p:cNvSpPr>
+          <p:nvPr>
+            <p:ph type="sldNum" sz="quarter" idx="4"/>
+          </p:nvPr>
+        </p:nvSpPr>
+        <p:spPr/>
+        <p:txBody>
+          <a:bodyPr/>
+          <a:lstStyle/>
+          <a:p>
+            <a:fld id="{C47C2D81-940B-4685-92D1-3ECF90F4940E}" type="slidenum">
+              <a:rPr lang="fr-FR" smtClean="0"/>
+              <a:pPr/>
+              <a:t>16</a:t>
+            </a:fld>
+            <a:endParaRPr lang="fr-FR" dirty="0"/>
+          </a:p>
+        </p:txBody>
+      </p:sp>
+    </p:spTree>
+    <p:extLst>
+      <p:ext uri="{BB962C8B-B14F-4D97-AF65-F5344CB8AC3E}">
+        <p14:creationId xmlns:p14="http://schemas.microsoft.com/office/powerpoint/2010/main" val="3681655130"/>
       </p:ext>
     </p:extLst>
   </p:cSld>
@@ -43770,37 +43958,24 @@
       </p:grpSpPr>
       <p:sp>
         <p:nvSpPr>
-          <p:cNvPr id="2" name="Espace réservé du contenu 1"/>
+          <p:cNvPr id="2" name="Espace réservé du texte 1"/>
           <p:cNvSpPr>
             <a:spLocks noGrp="1"/>
           </p:cNvSpPr>
           <p:nvPr>
-            <p:ph idx="1"/>
+            <p:ph type="body" sz="quarter" idx="11"/>
           </p:nvPr>
         </p:nvSpPr>
-        <p:spPr/>
+        <p:spPr>
+          <a:xfrm>
+            <a:off x="4500563" y="4516277"/>
+            <a:ext cx="4643437" cy="774180"/>
+          </a:xfrm>
+        </p:spPr>
         <p:txBody>
           <a:bodyPr/>
           <a:lstStyle/>
           <a:p>
-            <a:r>
-              <a:rPr lang="fr-FR" dirty="0" smtClean="0"/>
-              <a:t>Pas mal de travail si on veut gérer des mouvements simples comme repérer un déplacement de bras à gauche ou à Droite</a:t>
-            </a:r>
-          </a:p>
-          <a:p>
-            <a:r>
-              <a:rPr lang="fr-FR" dirty="0" smtClean="0"/>
-              <a:t>Ajout d’une librairie « </a:t>
-            </a:r>
-            <a:r>
-              <a:rPr lang="fr-FR" dirty="0" err="1" smtClean="0"/>
-              <a:t>FaceTrackData</a:t>
-            </a:r>
-            <a:r>
-              <a:rPr lang="fr-FR" smtClean="0"/>
-              <a:t> »</a:t>
-            </a:r>
             <a:endParaRPr lang="fr-FR" dirty="0"/>
           </a:p>
         </p:txBody>
@@ -43812,17 +43987,34 @@
             <a:spLocks noGrp="1"/>
           </p:cNvSpPr>
           <p:nvPr>
-            <p:ph type="title"/>
+            <p:ph type="ctrTitle"/>
           </p:nvPr>
         </p:nvSpPr>
-        <p:spPr/>
+        <p:spPr>
+          <a:xfrm>
+            <a:off x="609606" y="293037"/>
+            <a:ext cx="8241072" cy="1545939"/>
+          </a:xfrm>
+        </p:spPr>
         <p:txBody>
           <a:bodyPr/>
           <a:lstStyle/>
           <a:p>
             <a:r>
+              <a:rPr lang="fr-FR" dirty="0"/>
+              <a:t>Live Coding : </a:t>
+            </a:r>
+            <a:r>
               <a:rPr lang="fr-FR" dirty="0" smtClean="0"/>
-              <a:t>Librairie / Framework Tierce</a:t>
+              <a:t>Focus sur </a:t>
+            </a:r>
+            <a:r>
+              <a:rPr lang="fr-FR" dirty="0" err="1" smtClean="0"/>
+              <a:t>lA</a:t>
+            </a:r>
+            <a:r>
+              <a:rPr lang="fr-FR" dirty="0" smtClean="0"/>
+              <a:t> reconnaissance vocale</a:t>
             </a:r>
             <a:endParaRPr lang="fr-FR" dirty="0"/>
           </a:p>
@@ -43843,128 +44035,10 @@
           <a:bodyPr/>
           <a:lstStyle/>
           <a:p>
-            <a:fld id="{C47C2D81-940B-4685-92D1-3ECF90F4940E}" type="slidenum">
+            <a:fld id="{D8B8FD23-DCAD-4E0C-B199-CE60B1012E33}" type="slidenum">
               <a:rPr lang="fr-FR" smtClean="0"/>
               <a:pPr/>
               <a:t>17</a:t>
-            </a:fld>
-            <a:endParaRPr lang="fr-FR" dirty="0"/>
-          </a:p>
-        </p:txBody>
-      </p:sp>
-    </p:spTree>
-    <p:extLst>
-      <p:ext uri="{BB962C8B-B14F-4D97-AF65-F5344CB8AC3E}">
-        <p14:creationId xmlns:p14="http://schemas.microsoft.com/office/powerpoint/2010/main" val="3681655130"/>
-      </p:ext>
-    </p:extLst>
-  </p:cSld>
-  <p:clrMapOvr>
-    <a:masterClrMapping/>
-  </p:clrMapOvr>
-</p:sld>
-</file>
-
-<file path=ppt/slides/slide18.xml><?xml version="1.0" encoding="utf-8"?>
-<p:sld xmlns:a="http://schemas.openxmlformats.org/drawingml/2006/main" xmlns:r="http://schemas.openxmlformats.org/officeDocument/2006/relationships" xmlns:p="http://schemas.openxmlformats.org/presentationml/2006/main">
-  <p:cSld>
-    <p:spTree>
-      <p:nvGrpSpPr>
-        <p:cNvPr id="1" name=""/>
-        <p:cNvGrpSpPr/>
-        <p:nvPr/>
-      </p:nvGrpSpPr>
-      <p:grpSpPr>
-        <a:xfrm>
-          <a:off x="0" y="0"/>
-          <a:ext cx="0" cy="0"/>
-          <a:chOff x="0" y="0"/>
-          <a:chExt cx="0" cy="0"/>
-        </a:xfrm>
-      </p:grpSpPr>
-      <p:sp>
-        <p:nvSpPr>
-          <p:cNvPr id="2" name="Espace réservé du texte 1"/>
-          <p:cNvSpPr>
-            <a:spLocks noGrp="1"/>
-          </p:cNvSpPr>
-          <p:nvPr>
-            <p:ph type="body" sz="quarter" idx="11"/>
-          </p:nvPr>
-        </p:nvSpPr>
-        <p:spPr>
-          <a:xfrm>
-            <a:off x="4500563" y="4516277"/>
-            <a:ext cx="4643437" cy="774180"/>
-          </a:xfrm>
-        </p:spPr>
-        <p:txBody>
-          <a:bodyPr/>
-          <a:lstStyle/>
-          <a:p>
-            <a:endParaRPr lang="fr-FR" dirty="0"/>
-          </a:p>
-        </p:txBody>
-      </p:sp>
-      <p:sp>
-        <p:nvSpPr>
-          <p:cNvPr id="3" name="Titre 2"/>
-          <p:cNvSpPr>
-            <a:spLocks noGrp="1"/>
-          </p:cNvSpPr>
-          <p:nvPr>
-            <p:ph type="ctrTitle"/>
-          </p:nvPr>
-        </p:nvSpPr>
-        <p:spPr>
-          <a:xfrm>
-            <a:off x="609606" y="293037"/>
-            <a:ext cx="8241072" cy="1545939"/>
-          </a:xfrm>
-        </p:spPr>
-        <p:txBody>
-          <a:bodyPr/>
-          <a:lstStyle/>
-          <a:p>
-            <a:r>
-              <a:rPr lang="fr-FR" dirty="0"/>
-              <a:t>Live Coding : </a:t>
-            </a:r>
-            <a:r>
-              <a:rPr lang="fr-FR" dirty="0" smtClean="0"/>
-              <a:t>Focus sur </a:t>
-            </a:r>
-            <a:r>
-              <a:rPr lang="fr-FR" dirty="0" err="1" smtClean="0"/>
-              <a:t>lA</a:t>
-            </a:r>
-            <a:r>
-              <a:rPr lang="fr-FR" dirty="0" smtClean="0"/>
-              <a:t> reconnaissance vocale</a:t>
-            </a:r>
-            <a:endParaRPr lang="fr-FR" dirty="0"/>
-          </a:p>
-        </p:txBody>
-      </p:sp>
-      <p:sp>
-        <p:nvSpPr>
-          <p:cNvPr id="4" name="Espace réservé du numéro de diapositive 3"/>
-          <p:cNvSpPr>
-            <a:spLocks noGrp="1"/>
-          </p:cNvSpPr>
-          <p:nvPr>
-            <p:ph type="sldNum" sz="quarter" idx="4"/>
-          </p:nvPr>
-        </p:nvSpPr>
-        <p:spPr/>
-        <p:txBody>
-          <a:bodyPr/>
-          <a:lstStyle/>
-          <a:p>
-            <a:fld id="{D8B8FD23-DCAD-4E0C-B199-CE60B1012E33}" type="slidenum">
-              <a:rPr lang="fr-FR" smtClean="0"/>
-              <a:pPr/>
-              <a:t>18</a:t>
             </a:fld>
             <a:endParaRPr lang="fr-FR" dirty="0"/>
           </a:p>
@@ -44031,7 +44105,7 @@
 </p:sld>
 </file>
 
-<file path=ppt/slides/slide19.xml><?xml version="1.0" encoding="utf-8"?>
+<file path=ppt/slides/slide18.xml><?xml version="1.0" encoding="utf-8"?>
 <p:sld xmlns:a="http://schemas.openxmlformats.org/drawingml/2006/main" xmlns:r="http://schemas.openxmlformats.org/officeDocument/2006/relationships" xmlns:p="http://schemas.openxmlformats.org/presentationml/2006/main">
   <p:cSld>
     <p:spTree>
@@ -47564,149 +47638,7 @@
 </p:sld>
 </file>
 
-<file path=ppt/slides/slide2.xml><?xml version="1.0" encoding="utf-8"?>
-<p:sld xmlns:a="http://schemas.openxmlformats.org/drawingml/2006/main" xmlns:r="http://schemas.openxmlformats.org/officeDocument/2006/relationships" xmlns:p="http://schemas.openxmlformats.org/presentationml/2006/main">
-  <p:cSld>
-    <p:spTree>
-      <p:nvGrpSpPr>
-        <p:cNvPr id="1" name=""/>
-        <p:cNvGrpSpPr/>
-        <p:nvPr/>
-      </p:nvGrpSpPr>
-      <p:grpSpPr>
-        <a:xfrm>
-          <a:off x="0" y="0"/>
-          <a:ext cx="0" cy="0"/>
-          <a:chOff x="0" y="0"/>
-          <a:chExt cx="0" cy="0"/>
-        </a:xfrm>
-      </p:grpSpPr>
-      <p:sp>
-        <p:nvSpPr>
-          <p:cNvPr id="2" name="Espace réservé du texte 1"/>
-          <p:cNvSpPr>
-            <a:spLocks noGrp="1"/>
-          </p:cNvSpPr>
-          <p:nvPr>
-            <p:ph type="body" sz="quarter" idx="11"/>
-          </p:nvPr>
-        </p:nvSpPr>
-        <p:spPr/>
-        <p:txBody>
-          <a:bodyPr/>
-          <a:lstStyle/>
-          <a:p>
-            <a:endParaRPr lang="fr-FR" dirty="0"/>
-          </a:p>
-        </p:txBody>
-      </p:sp>
-      <p:sp>
-        <p:nvSpPr>
-          <p:cNvPr id="3" name="Espace réservé du numéro de diapositive 2"/>
-          <p:cNvSpPr>
-            <a:spLocks noGrp="1"/>
-          </p:cNvSpPr>
-          <p:nvPr>
-            <p:ph type="sldNum" sz="quarter" idx="4"/>
-          </p:nvPr>
-        </p:nvSpPr>
-        <p:spPr/>
-        <p:txBody>
-          <a:bodyPr/>
-          <a:lstStyle/>
-          <a:p>
-            <a:fld id="{7A7D4657-0547-4C5E-B336-07FA85EFC98F}" type="slidenum">
-              <a:rPr lang="fr-FR" smtClean="0"/>
-              <a:pPr/>
-              <a:t>2</a:t>
-            </a:fld>
-            <a:endParaRPr lang="fr-FR" dirty="0"/>
-          </a:p>
-        </p:txBody>
-      </p:sp>
-      <p:sp>
-        <p:nvSpPr>
-          <p:cNvPr id="4" name="Titre 3"/>
-          <p:cNvSpPr>
-            <a:spLocks noGrp="1"/>
-          </p:cNvSpPr>
-          <p:nvPr>
-            <p:ph type="ctrTitle"/>
-          </p:nvPr>
-        </p:nvSpPr>
-        <p:spPr/>
-        <p:txBody>
-          <a:bodyPr/>
-          <a:lstStyle/>
-          <a:p>
-            <a:r>
-              <a:rPr lang="fr-FR" dirty="0" smtClean="0"/>
-              <a:t>Plan</a:t>
-            </a:r>
-            <a:endParaRPr lang="fr-FR" dirty="0"/>
-          </a:p>
-        </p:txBody>
-      </p:sp>
-      <p:sp>
-        <p:nvSpPr>
-          <p:cNvPr id="5" name="Espace réservé du texte 4"/>
-          <p:cNvSpPr>
-            <a:spLocks noGrp="1"/>
-          </p:cNvSpPr>
-          <p:nvPr>
-            <p:ph type="body" sz="quarter" idx="10"/>
-          </p:nvPr>
-        </p:nvSpPr>
-        <p:spPr/>
-        <p:txBody>
-          <a:bodyPr/>
-          <a:lstStyle/>
-          <a:p>
-            <a:r>
-              <a:rPr lang="fr-FR" dirty="0" smtClean="0"/>
-              <a:t>Présentation du matériel</a:t>
-            </a:r>
-          </a:p>
-          <a:p>
-            <a:r>
-              <a:rPr lang="fr-FR" dirty="0" smtClean="0"/>
-              <a:t>Live Coding : Application Windows utilisant Kinect</a:t>
-            </a:r>
-          </a:p>
-          <a:p>
-            <a:r>
-              <a:rPr lang="fr-FR" dirty="0" smtClean="0"/>
-              <a:t>Démo : Focus sur les </a:t>
-            </a:r>
-            <a:r>
-              <a:rPr lang="fr-FR" dirty="0" err="1" smtClean="0"/>
-              <a:t>Gestures</a:t>
-            </a:r>
-            <a:endParaRPr lang="fr-FR" dirty="0" smtClean="0"/>
-          </a:p>
-          <a:p>
-            <a:r>
-              <a:rPr lang="fr-FR" dirty="0" smtClean="0"/>
-              <a:t>Live Coding : Reconnaissance vocale et Robotique</a:t>
-            </a:r>
-            <a:endParaRPr lang="fr-FR" dirty="0"/>
-          </a:p>
-        </p:txBody>
-      </p:sp>
-    </p:spTree>
-    <p:extLst>
-      <p:ext uri="{BB962C8B-B14F-4D97-AF65-F5344CB8AC3E}">
-        <p14:creationId xmlns:p14="http://schemas.microsoft.com/office/powerpoint/2010/main" val="4187441221"/>
-      </p:ext>
-    </p:extLst>
-  </p:cSld>
-  <p:clrMapOvr>
-    <a:masterClrMapping/>
-  </p:clrMapOvr>
-</p:sld>
-</file>
-
-<file path=ppt/slides/slide20.xml><?xml version="1.0" encoding="utf-8"?>
+<file path=ppt/slides/slide19.xml><?xml version="1.0" encoding="utf-8"?>
 <p:sld xmlns:a="http://schemas.openxmlformats.org/drawingml/2006/main" xmlns:r="http://schemas.openxmlformats.org/officeDocument/2006/relationships" xmlns:p="http://schemas.openxmlformats.org/presentationml/2006/main">
   <p:cSld>
     <p:spTree>
@@ -47771,7 +47703,7 @@
             <a:fld id="{C47C2D81-940B-4685-92D1-3ECF90F4940E}" type="slidenum">
               <a:rPr lang="fr-FR" smtClean="0"/>
               <a:pPr/>
-              <a:t>20</a:t>
+              <a:t>19</a:t>
             </a:fld>
             <a:endParaRPr lang="fr-FR" dirty="0"/>
           </a:p>
@@ -49012,7 +48944,137 @@
 </p:sld>
 </file>
 
-<file path=ppt/slides/slide21.xml><?xml version="1.0" encoding="utf-8"?>
+<file path=ppt/slides/slide2.xml><?xml version="1.0" encoding="utf-8"?>
+<p:sld xmlns:a="http://schemas.openxmlformats.org/drawingml/2006/main" xmlns:r="http://schemas.openxmlformats.org/officeDocument/2006/relationships" xmlns:p="http://schemas.openxmlformats.org/presentationml/2006/main">
+  <p:cSld>
+    <p:spTree>
+      <p:nvGrpSpPr>
+        <p:cNvPr id="1" name=""/>
+        <p:cNvGrpSpPr/>
+        <p:nvPr/>
+      </p:nvGrpSpPr>
+      <p:grpSpPr>
+        <a:xfrm>
+          <a:off x="0" y="0"/>
+          <a:ext cx="0" cy="0"/>
+          <a:chOff x="0" y="0"/>
+          <a:chExt cx="0" cy="0"/>
+        </a:xfrm>
+      </p:grpSpPr>
+      <p:sp>
+        <p:nvSpPr>
+          <p:cNvPr id="3" name="Espace réservé du numéro de diapositive 2"/>
+          <p:cNvSpPr>
+            <a:spLocks noGrp="1"/>
+          </p:cNvSpPr>
+          <p:nvPr>
+            <p:ph type="sldNum" sz="quarter" idx="4"/>
+          </p:nvPr>
+        </p:nvSpPr>
+        <p:spPr/>
+        <p:txBody>
+          <a:bodyPr/>
+          <a:lstStyle/>
+          <a:p>
+            <a:fld id="{7A7D4657-0547-4C5E-B336-07FA85EFC98F}" type="slidenum">
+              <a:rPr lang="fr-FR" smtClean="0"/>
+              <a:pPr/>
+              <a:t>2</a:t>
+            </a:fld>
+            <a:endParaRPr lang="fr-FR" dirty="0"/>
+          </a:p>
+        </p:txBody>
+      </p:sp>
+      <p:sp>
+        <p:nvSpPr>
+          <p:cNvPr id="4" name="Titre 3"/>
+          <p:cNvSpPr>
+            <a:spLocks noGrp="1"/>
+          </p:cNvSpPr>
+          <p:nvPr>
+            <p:ph type="ctrTitle"/>
+          </p:nvPr>
+        </p:nvSpPr>
+        <p:spPr/>
+        <p:txBody>
+          <a:bodyPr/>
+          <a:lstStyle/>
+          <a:p>
+            <a:r>
+              <a:rPr lang="fr-FR" dirty="0" smtClean="0"/>
+              <a:t>Plan</a:t>
+            </a:r>
+            <a:endParaRPr lang="fr-FR" dirty="0"/>
+          </a:p>
+        </p:txBody>
+      </p:sp>
+      <p:sp>
+        <p:nvSpPr>
+          <p:cNvPr id="5" name="Espace réservé du texte 4"/>
+          <p:cNvSpPr>
+            <a:spLocks noGrp="1"/>
+          </p:cNvSpPr>
+          <p:nvPr>
+            <p:ph type="body" sz="quarter" idx="10"/>
+          </p:nvPr>
+        </p:nvSpPr>
+        <p:spPr/>
+        <p:txBody>
+          <a:bodyPr/>
+          <a:lstStyle/>
+          <a:p>
+            <a:r>
+              <a:rPr lang="fr-FR" dirty="0" smtClean="0"/>
+              <a:t>Présentation du matériel</a:t>
+            </a:r>
+          </a:p>
+          <a:p>
+            <a:r>
+              <a:rPr lang="fr-FR" dirty="0" smtClean="0"/>
+              <a:t>Live Coding : Application Windows utilisant Kinect</a:t>
+            </a:r>
+          </a:p>
+          <a:p>
+            <a:r>
+              <a:rPr lang="fr-FR" dirty="0" smtClean="0"/>
+              <a:t>Démo : Focus sur les </a:t>
+            </a:r>
+            <a:r>
+              <a:rPr lang="fr-FR" dirty="0" err="1" smtClean="0"/>
+              <a:t>Gestures</a:t>
+            </a:r>
+            <a:endParaRPr lang="fr-FR" dirty="0" smtClean="0"/>
+          </a:p>
+          <a:p>
+            <a:r>
+              <a:rPr lang="fr-FR" dirty="0" smtClean="0"/>
+              <a:t>Live Coding : Reconnaissance vocale et Robotique</a:t>
+            </a:r>
+            <a:endParaRPr lang="fr-FR" dirty="0"/>
+          </a:p>
+        </p:txBody>
+      </p:sp>
+    </p:spTree>
+    <p:extLst>
+      <p:ext uri="{BB962C8B-B14F-4D97-AF65-F5344CB8AC3E}">
+        <p14:creationId xmlns:p14="http://schemas.microsoft.com/office/powerpoint/2010/main" val="4187441221"/>
+      </p:ext>
+    </p:extLst>
+  </p:cSld>
+  <p:clrMapOvr>
+    <a:masterClrMapping/>
+  </p:clrMapOvr>
+  <p:timing>
+    <p:tnLst>
+      <p:par>
+        <p:cTn id="1" dur="indefinite" restart="never" nodeType="tmRoot"/>
+      </p:par>
+    </p:tnLst>
+  </p:timing>
+</p:sld>
+</file>
+
+<file path=ppt/slides/slide20.xml><?xml version="1.0" encoding="utf-8"?>
 <p:sld xmlns:a="http://schemas.openxmlformats.org/drawingml/2006/main" xmlns:r="http://schemas.openxmlformats.org/officeDocument/2006/relationships" xmlns:p="http://schemas.openxmlformats.org/presentationml/2006/main">
   <p:cSld>
     <p:spTree>
@@ -49181,7 +49243,7 @@
             <a:fld id="{C47C2D81-940B-4685-92D1-3ECF90F4940E}" type="slidenum">
               <a:rPr lang="fr-FR" smtClean="0"/>
               <a:pPr/>
-              <a:t>21</a:t>
+              <a:t>20</a:t>
             </a:fld>
             <a:endParaRPr lang="fr-FR" dirty="0"/>
           </a:p>
@@ -49200,7 +49262,7 @@
 </p:sld>
 </file>
 
-<file path=ppt/slides/slide22.xml><?xml version="1.0" encoding="utf-8"?>
+<file path=ppt/slides/slide21.xml><?xml version="1.0" encoding="utf-8"?>
 <p:sld xmlns:a="http://schemas.openxmlformats.org/drawingml/2006/main" xmlns:r="http://schemas.openxmlformats.org/officeDocument/2006/relationships" xmlns:p="http://schemas.openxmlformats.org/presentationml/2006/main">
   <p:cSld>
     <p:spTree>
@@ -49264,7 +49326,7 @@
             <a:fld id="{1AA167F7-1AE4-034A-99C2-C615EB6F9492}" type="slidenum">
               <a:rPr lang="fr-FR" smtClean="0"/>
               <a:pPr/>
-              <a:t>22</a:t>
+              <a:t>21</a:t>
             </a:fld>
             <a:endParaRPr lang="fr-FR" dirty="0"/>
           </a:p>
@@ -49283,7 +49345,7 @@
 </p:sld>
 </file>
 
-<file path=ppt/slides/slide23.xml><?xml version="1.0" encoding="utf-8"?>
+<file path=ppt/slides/slide22.xml><?xml version="1.0" encoding="utf-8"?>
 <p:sld xmlns:a="http://schemas.openxmlformats.org/drawingml/2006/main" xmlns:r="http://schemas.openxmlformats.org/officeDocument/2006/relationships" xmlns:p="http://schemas.openxmlformats.org/presentationml/2006/main">
   <p:cSld>
     <p:spTree>
@@ -49507,11 +49569,7 @@
           <a:p>
             <a:r>
               <a:rPr lang="fr-FR" dirty="0" smtClean="0"/>
-              <a:t>Kinect v1 (Xbox 360</a:t>
-            </a:r>
-            <a:r>
-              <a:rPr lang="fr-FR" dirty="0" smtClean="0"/>
-              <a:t>) :</a:t>
+              <a:t>Kinect v1 (Xbox 360) :</a:t>
             </a:r>
           </a:p>
           <a:p>
@@ -49535,15 +49593,7 @@
           <a:p>
             <a:r>
               <a:rPr lang="fr-FR" dirty="0" smtClean="0"/>
-              <a:t>Kinect </a:t>
-            </a:r>
-            <a:r>
-              <a:rPr lang="fr-FR" dirty="0" smtClean="0"/>
-              <a:t>for </a:t>
-            </a:r>
-            <a:r>
-              <a:rPr lang="fr-FR" dirty="0" smtClean="0"/>
-              <a:t>Windows</a:t>
+              <a:t>Kinect for Windows</a:t>
             </a:r>
           </a:p>
           <a:p>
@@ -49581,11 +49631,7 @@
           <a:p>
             <a:r>
               <a:rPr lang="fr-FR" dirty="0" smtClean="0"/>
-              <a:t>Différentes versions de </a:t>
-            </a:r>
-            <a:r>
-              <a:rPr lang="fr-FR" dirty="0" smtClean="0"/>
-              <a:t>Kinect (1)</a:t>
+              <a:t>Différentes versions de Kinect (1)</a:t>
             </a:r>
             <a:endParaRPr lang="fr-FR" dirty="0"/>
           </a:p>
@@ -50075,7 +50121,6 @@
               <a:rPr lang="fr-FR" dirty="0" smtClean="0"/>
               <a:t> la Xbox Smart Glass</a:t>
             </a:r>
-            <a:endParaRPr lang="fr-FR" dirty="0" smtClean="0"/>
           </a:p>
           <a:p>
             <a:pPr>
@@ -50129,15 +50174,7 @@
           <a:p>
             <a:r>
               <a:rPr lang="fr-FR" dirty="0" smtClean="0"/>
-              <a:t>Différentes </a:t>
-            </a:r>
-            <a:r>
-              <a:rPr lang="fr-FR" dirty="0" smtClean="0"/>
-              <a:t>versions de </a:t>
-            </a:r>
-            <a:r>
-              <a:rPr lang="fr-FR" dirty="0" smtClean="0"/>
-              <a:t>Kinect (2)</a:t>
+              <a:t>Différentes versions de Kinect (2)</a:t>
             </a:r>
             <a:endParaRPr lang="fr-FR" dirty="0"/>
           </a:p>
@@ -50465,111 +50502,202 @@
           <a:chExt cx="0" cy="0"/>
         </a:xfrm>
       </p:grpSpPr>
-      <p:sp>
-        <p:nvSpPr>
-          <p:cNvPr id="2" name="Espace réservé du contenu 1"/>
-          <p:cNvSpPr>
-            <a:spLocks noGrp="1"/>
-          </p:cNvSpPr>
+      <p:pic>
+        <p:nvPicPr>
+          <p:cNvPr id="1026" name="Picture 2" descr="JJ131033.k4w_sensor_2(en-us,IEB.10).png"/>
+          <p:cNvPicPr>
+            <a:picLocks noGrp="1" noChangeAspect="1" noChangeArrowheads="1"/>
+          </p:cNvPicPr>
           <p:nvPr>
-            <p:ph idx="1"/>
+            <p:ph sz="half" idx="1"/>
           </p:nvPr>
-        </p:nvSpPr>
-        <p:spPr/>
-        <p:txBody>
-          <a:bodyPr>
-            <a:normAutofit lnSpcReduction="10000"/>
-          </a:bodyPr>
-          <a:lstStyle/>
-          <a:p>
-            <a:r>
-              <a:rPr lang="fr-FR" b="0" dirty="0"/>
-              <a:t>Capteur :</a:t>
-            </a:r>
-          </a:p>
-          <a:p>
-            <a:pPr lvl="1"/>
-            <a:r>
-              <a:rPr lang="fr-FR" dirty="0"/>
-              <a:t>Lentilles détectant la couleur et la profondeur</a:t>
-            </a:r>
-          </a:p>
-          <a:p>
-            <a:pPr lvl="1"/>
-            <a:r>
-              <a:rPr lang="fr-FR" dirty="0"/>
-              <a:t>Micro à reconnaissance vocale</a:t>
-            </a:r>
-          </a:p>
-          <a:p>
-            <a:pPr lvl="1"/>
-            <a:r>
-              <a:rPr lang="fr-FR" dirty="0"/>
-              <a:t>Capteur motorisé pour suivre les déplacements</a:t>
-            </a:r>
-          </a:p>
-          <a:p>
-            <a:r>
-              <a:rPr lang="fr-FR" b="0" dirty="0"/>
-              <a:t>Champ de vision :</a:t>
-            </a:r>
-          </a:p>
-          <a:p>
-            <a:pPr lvl="1"/>
-            <a:r>
-              <a:rPr lang="fr-FR" dirty="0"/>
-              <a:t>Champ de vision horizontal : 57 degrés</a:t>
-            </a:r>
-          </a:p>
-          <a:p>
-            <a:pPr lvl="1"/>
-            <a:r>
-              <a:rPr lang="fr-FR" dirty="0"/>
-              <a:t>Champ de vision vertical : 43 degrés</a:t>
-            </a:r>
-          </a:p>
-          <a:p>
-            <a:pPr lvl="1"/>
-            <a:r>
-              <a:rPr lang="fr-FR" dirty="0"/>
-              <a:t>Marge de déplacement du capteur : ± 27 degrés</a:t>
-            </a:r>
-          </a:p>
-          <a:p>
-            <a:pPr lvl="1"/>
-            <a:r>
-              <a:rPr lang="fr-FR" dirty="0"/>
-              <a:t>Portée du capteur : 1,2 m – 3,5 m (à partir de 50 cm pour la version Kinect for </a:t>
-            </a:r>
-            <a:r>
-              <a:rPr lang="fr-FR" dirty="0" smtClean="0"/>
-              <a:t>Windows)</a:t>
-            </a:r>
-            <a:endParaRPr lang="fr-FR" dirty="0"/>
-          </a:p>
-          <a:p>
-            <a:r>
-              <a:rPr lang="fr-FR" b="0" dirty="0" smtClean="0"/>
-              <a:t>Fréquences</a:t>
-            </a:r>
-            <a:r>
-              <a:rPr lang="fr-FR" b="0" dirty="0"/>
-              <a:t> :</a:t>
-            </a:r>
-          </a:p>
-          <a:p>
-            <a:pPr lvl="1"/>
-            <a:r>
-              <a:rPr lang="fr-FR" dirty="0" smtClean="0"/>
-              <a:t>640*480 pixels @ 30 Hz</a:t>
-            </a:r>
-            <a:endParaRPr lang="fr-FR" dirty="0"/>
-          </a:p>
-          <a:p>
-            <a:endParaRPr lang="fr-FR" dirty="0"/>
-          </a:p>
-        </p:txBody>
-      </p:sp>
+        </p:nvPicPr>
+        <p:blipFill>
+          <a:blip r:embed="rId2">
+            <a:extLst>
+              <a:ext uri="{28A0092B-C50C-407E-A947-70E740481C1C}">
+                <a14:useLocalDpi xmlns:a14="http://schemas.microsoft.com/office/drawing/2010/main" val="0"/>
+              </a:ext>
+            </a:extLst>
+          </a:blip>
+          <a:stretch>
+            <a:fillRect/>
+          </a:stretch>
+        </p:blipFill>
+        <p:spPr bwMode="auto">
+          <a:xfrm>
+            <a:off x="2414978" y="1600200"/>
+            <a:ext cx="4350557" cy="2232025"/>
+          </a:xfrm>
+          <a:prstGeom prst="rect">
+            <a:avLst/>
+          </a:prstGeom>
+          <a:noFill/>
+          <a:extLst>
+            <a:ext uri="{909E8E84-426E-40DD-AFC4-6F175D3DCCD1}">
+              <a14:hiddenFill xmlns:a14="http://schemas.microsoft.com/office/drawing/2010/main">
+                <a:solidFill>
+                  <a:srgbClr val="FFFFFF"/>
+                </a:solidFill>
+              </a14:hiddenFill>
+            </a:ext>
+          </a:extLst>
+        </p:spPr>
+      </p:pic>
+      <p:graphicFrame>
+        <p:nvGraphicFramePr>
+          <p:cNvPr id="9" name="Espace réservé du contenu 8"/>
+          <p:cNvGraphicFramePr>
+            <a:graphicFrameLocks noGrp="1"/>
+          </p:cNvGraphicFramePr>
+          <p:nvPr>
+            <p:ph sz="half" idx="2"/>
+            <p:extLst>
+              <p:ext uri="{D42A27DB-BD31-4B8C-83A1-F6EECF244321}">
+                <p14:modId xmlns:p14="http://schemas.microsoft.com/office/powerpoint/2010/main" val="2477486790"/>
+              </p:ext>
+            </p:extLst>
+          </p:nvPr>
+        </p:nvGraphicFramePr>
+        <p:xfrm>
+          <a:off x="360363" y="4006850"/>
+          <a:ext cx="8497351" cy="2382520"/>
+        </p:xfrm>
+        <a:graphic>
+          <a:graphicData uri="http://schemas.openxmlformats.org/drawingml/2006/table">
+            <a:tbl>
+              <a:tblPr firstRow="1" bandRow="1">
+                <a:tableStyleId>{5C22544A-7EE6-4342-B048-85BDC9FD1C3A}</a:tableStyleId>
+              </a:tblPr>
+              <a:tblGrid>
+                <a:gridCol w="2268000"/>
+                <a:gridCol w="6229351"/>
+              </a:tblGrid>
+              <a:tr h="370840">
+                <a:tc>
+                  <a:txBody>
+                    <a:bodyPr/>
+                    <a:lstStyle/>
+                    <a:p>
+                      <a:r>
+                        <a:rPr lang="en-GB" dirty="0" err="1" smtClean="0"/>
+                        <a:t>Capteur</a:t>
+                      </a:r>
+                      <a:endParaRPr lang="en-GB" dirty="0"/>
+                    </a:p>
+                  </a:txBody>
+                  <a:tcPr/>
+                </a:tc>
+                <a:tc>
+                  <a:txBody>
+                    <a:bodyPr/>
+                    <a:lstStyle/>
+                    <a:p>
+                      <a:r>
+                        <a:rPr lang="en-GB" dirty="0" err="1" smtClean="0"/>
+                        <a:t>Spécifications</a:t>
+                      </a:r>
+                      <a:endParaRPr lang="en-GB" dirty="0"/>
+                    </a:p>
+                  </a:txBody>
+                  <a:tcPr/>
+                </a:tc>
+              </a:tr>
+              <a:tr h="370840">
+                <a:tc>
+                  <a:txBody>
+                    <a:bodyPr/>
+                    <a:lstStyle/>
+                    <a:p>
+                      <a:r>
+                        <a:rPr lang="en-GB" dirty="0" smtClean="0"/>
+                        <a:t>Camera</a:t>
+                      </a:r>
+                      <a:endParaRPr lang="en-GB" dirty="0"/>
+                    </a:p>
+                  </a:txBody>
+                  <a:tcPr/>
+                </a:tc>
+                <a:tc>
+                  <a:txBody>
+                    <a:bodyPr/>
+                    <a:lstStyle/>
+                    <a:p>
+                      <a:r>
+                        <a:rPr lang="en-GB" dirty="0" smtClean="0"/>
+                        <a:t>RGB </a:t>
+                      </a:r>
+                      <a:r>
+                        <a:rPr lang="en-GB" dirty="0" err="1" smtClean="0"/>
+                        <a:t>ou</a:t>
+                      </a:r>
+                      <a:r>
+                        <a:rPr lang="en-GB" dirty="0" smtClean="0"/>
+                        <a:t> YUV</a:t>
+                      </a:r>
+                      <a:br>
+                        <a:rPr lang="en-GB" dirty="0" smtClean="0"/>
+                      </a:br>
+                      <a:r>
+                        <a:rPr lang="en-GB" dirty="0" smtClean="0"/>
+                        <a:t>640x480</a:t>
+                      </a:r>
+                      <a:r>
+                        <a:rPr lang="en-GB" baseline="0" dirty="0" smtClean="0"/>
+                        <a:t> 30fps </a:t>
+                      </a:r>
+                      <a:r>
+                        <a:rPr lang="en-GB" baseline="0" dirty="0" err="1" smtClean="0"/>
+                        <a:t>ou</a:t>
+                      </a:r>
+                      <a:r>
+                        <a:rPr lang="en-GB" baseline="0" dirty="0" smtClean="0"/>
+                        <a:t> 1280x960 12fps </a:t>
+                      </a:r>
+                      <a:r>
+                        <a:rPr lang="en-GB" baseline="0" dirty="0" err="1" smtClean="0"/>
+                        <a:t>ou</a:t>
+                      </a:r>
+                      <a:r>
+                        <a:rPr lang="en-GB" baseline="0" dirty="0" smtClean="0"/>
+                        <a:t> 1080p 30fps (v2 </a:t>
+                      </a:r>
+                      <a:r>
+                        <a:rPr lang="en-GB" baseline="0" dirty="0" err="1" smtClean="0"/>
+                        <a:t>uniquement</a:t>
+                      </a:r>
+                      <a:r>
+                        <a:rPr lang="en-GB" baseline="0" dirty="0" smtClean="0"/>
+                        <a:t>)</a:t>
+                      </a:r>
+                      <a:br>
+                        <a:rPr lang="en-GB" baseline="0" dirty="0" smtClean="0"/>
+                      </a:br>
+                      <a:endParaRPr lang="en-GB" baseline="0" dirty="0" smtClean="0"/>
+                    </a:p>
+                    <a:p>
+                      <a:r>
+                        <a:rPr lang="fr-FR" dirty="0" smtClean="0"/>
+                        <a:t>Champ de vision horizontal : 57 degrés</a:t>
+                      </a:r>
+                    </a:p>
+                    <a:p>
+                      <a:r>
+                        <a:rPr lang="fr-FR" dirty="0" smtClean="0"/>
+                        <a:t>Champ de vision vertical : 43 degrés</a:t>
+                      </a:r>
+                    </a:p>
+                    <a:p>
+                      <a:endParaRPr lang="en-GB" dirty="0"/>
+                    </a:p>
+                  </a:txBody>
+                  <a:tcPr/>
+                </a:tc>
+              </a:tr>
+            </a:tbl>
+          </a:graphicData>
+        </a:graphic>
+      </p:graphicFrame>
       <p:sp>
         <p:nvSpPr>
           <p:cNvPr id="3" name="Titre 2"/>
@@ -50587,7 +50715,7 @@
           <a:p>
             <a:r>
               <a:rPr lang="fr-FR" dirty="0" smtClean="0"/>
-              <a:t>Camera</a:t>
+              <a:t>Capteurs</a:t>
             </a:r>
             <a:endParaRPr lang="fr-FR" dirty="0"/>
           </a:p>
@@ -50620,7 +50748,7 @@
     </p:spTree>
     <p:extLst>
       <p:ext uri="{BB962C8B-B14F-4D97-AF65-F5344CB8AC3E}">
-        <p14:creationId xmlns:p14="http://schemas.microsoft.com/office/powerpoint/2010/main" val="2567991566"/>
+        <p14:creationId xmlns:p14="http://schemas.microsoft.com/office/powerpoint/2010/main" val="107877105"/>
       </p:ext>
     </p:extLst>
   </p:cSld>
@@ -50647,50 +50775,214 @@
           <a:chExt cx="0" cy="0"/>
         </a:xfrm>
       </p:grpSpPr>
-      <p:sp>
-        <p:nvSpPr>
-          <p:cNvPr id="2" name="Espace réservé du contenu 1"/>
-          <p:cNvSpPr>
-            <a:spLocks noGrp="1"/>
-          </p:cNvSpPr>
+      <p:pic>
+        <p:nvPicPr>
+          <p:cNvPr id="1026" name="Picture 2" descr="JJ131033.k4w_sensor_2(en-us,IEB.10).png"/>
+          <p:cNvPicPr>
+            <a:picLocks noGrp="1" noChangeAspect="1" noChangeArrowheads="1"/>
+          </p:cNvPicPr>
           <p:nvPr>
-            <p:ph idx="1"/>
+            <p:ph sz="half" idx="1"/>
           </p:nvPr>
-        </p:nvSpPr>
-        <p:spPr/>
-        <p:txBody>
-          <a:bodyPr/>
-          <a:lstStyle/>
-          <a:p>
-            <a:pPr>
-              <a:buNone/>
-            </a:pPr>
-            <a:r>
-              <a:rPr lang="fr-FR" dirty="0" smtClean="0"/>
-              <a:t>640*480 @ 30 Hz</a:t>
-            </a:r>
-          </a:p>
-          <a:p>
-            <a:pPr>
-              <a:buNone/>
-            </a:pPr>
-            <a:r>
-              <a:rPr lang="fr-FR" dirty="0" smtClean="0"/>
-              <a:t>Minimum : 80 cm / 50 cm</a:t>
-            </a:r>
-          </a:p>
-          <a:p>
-            <a:pPr>
-              <a:buNone/>
-            </a:pPr>
-            <a:r>
-              <a:rPr lang="fr-FR" dirty="0" smtClean="0"/>
-              <a:t>Maximum : 6 mètres</a:t>
-            </a:r>
-            <a:endParaRPr lang="fr-FR" dirty="0"/>
-          </a:p>
-        </p:txBody>
-      </p:sp>
+        </p:nvPicPr>
+        <p:blipFill>
+          <a:blip r:embed="rId2">
+            <a:extLst>
+              <a:ext uri="{28A0092B-C50C-407E-A947-70E740481C1C}">
+                <a14:useLocalDpi xmlns:a14="http://schemas.microsoft.com/office/drawing/2010/main" val="0"/>
+              </a:ext>
+            </a:extLst>
+          </a:blip>
+          <a:stretch>
+            <a:fillRect/>
+          </a:stretch>
+        </p:blipFill>
+        <p:spPr bwMode="auto">
+          <a:xfrm>
+            <a:off x="2414978" y="1600200"/>
+            <a:ext cx="4350557" cy="2232025"/>
+          </a:xfrm>
+          <a:prstGeom prst="rect">
+            <a:avLst/>
+          </a:prstGeom>
+          <a:noFill/>
+          <a:extLst>
+            <a:ext uri="{909E8E84-426E-40DD-AFC4-6F175D3DCCD1}">
+              <a14:hiddenFill xmlns:a14="http://schemas.microsoft.com/office/drawing/2010/main">
+                <a:solidFill>
+                  <a:srgbClr val="FFFFFF"/>
+                </a:solidFill>
+              </a14:hiddenFill>
+            </a:ext>
+          </a:extLst>
+        </p:spPr>
+      </p:pic>
+      <p:graphicFrame>
+        <p:nvGraphicFramePr>
+          <p:cNvPr id="9" name="Espace réservé du contenu 8"/>
+          <p:cNvGraphicFramePr>
+            <a:graphicFrameLocks noGrp="1"/>
+          </p:cNvGraphicFramePr>
+          <p:nvPr>
+            <p:ph sz="half" idx="2"/>
+            <p:extLst>
+              <p:ext uri="{D42A27DB-BD31-4B8C-83A1-F6EECF244321}">
+                <p14:modId xmlns:p14="http://schemas.microsoft.com/office/powerpoint/2010/main" val="3850855557"/>
+              </p:ext>
+            </p:extLst>
+          </p:nvPr>
+        </p:nvGraphicFramePr>
+        <p:xfrm>
+          <a:off x="360363" y="4006850"/>
+          <a:ext cx="8452527" cy="1656080"/>
+        </p:xfrm>
+        <a:graphic>
+          <a:graphicData uri="http://schemas.openxmlformats.org/drawingml/2006/table">
+            <a:tbl>
+              <a:tblPr firstRow="1" bandRow="1">
+                <a:tableStyleId>{5C22544A-7EE6-4342-B048-85BDC9FD1C3A}</a:tableStyleId>
+              </a:tblPr>
+              <a:tblGrid>
+                <a:gridCol w="2268000"/>
+                <a:gridCol w="6184527"/>
+              </a:tblGrid>
+              <a:tr h="370840">
+                <a:tc>
+                  <a:txBody>
+                    <a:bodyPr/>
+                    <a:lstStyle/>
+                    <a:p>
+                      <a:r>
+                        <a:rPr lang="en-GB" dirty="0" err="1" smtClean="0"/>
+                        <a:t>Capteur</a:t>
+                      </a:r>
+                      <a:endParaRPr lang="en-GB" dirty="0"/>
+                    </a:p>
+                  </a:txBody>
+                  <a:tcPr/>
+                </a:tc>
+                <a:tc>
+                  <a:txBody>
+                    <a:bodyPr/>
+                    <a:lstStyle/>
+                    <a:p>
+                      <a:r>
+                        <a:rPr lang="en-GB" dirty="0" err="1" smtClean="0"/>
+                        <a:t>Spécifications</a:t>
+                      </a:r>
+                      <a:endParaRPr lang="en-GB" dirty="0"/>
+                    </a:p>
+                  </a:txBody>
+                  <a:tcPr/>
+                </a:tc>
+              </a:tr>
+              <a:tr h="370840">
+                <a:tc>
+                  <a:txBody>
+                    <a:bodyPr/>
+                    <a:lstStyle/>
+                    <a:p>
+                      <a:r>
+                        <a:rPr lang="fr-FR" baseline="0" noProof="0" dirty="0" smtClean="0"/>
+                        <a:t>Emetteur IR</a:t>
+                      </a:r>
+                      <a:endParaRPr lang="en-GB" baseline="0" noProof="0" dirty="0" smtClean="0"/>
+                    </a:p>
+                    <a:p>
+                      <a:r>
+                        <a:rPr lang="en-GB" baseline="0" noProof="0" dirty="0" smtClean="0"/>
+                        <a:t>+</a:t>
+                      </a:r>
+                      <a:r>
+                        <a:rPr lang="en-GB" baseline="0" dirty="0" smtClean="0"/>
+                        <a:t> </a:t>
+                      </a:r>
+                      <a:r>
+                        <a:rPr lang="fr-FR" baseline="0" noProof="0" dirty="0" smtClean="0"/>
+                        <a:t>Capteur</a:t>
+                      </a:r>
+                      <a:r>
+                        <a:rPr lang="en-GB" baseline="0" dirty="0" smtClean="0"/>
+                        <a:t> de </a:t>
+                      </a:r>
+                      <a:r>
+                        <a:rPr lang="fr-FR" baseline="0" noProof="0" dirty="0" smtClean="0"/>
+                        <a:t>profondeur</a:t>
+                      </a:r>
+                      <a:endParaRPr lang="fr-FR" noProof="0" dirty="0"/>
+                    </a:p>
+                  </a:txBody>
+                  <a:tcPr/>
+                </a:tc>
+                <a:tc>
+                  <a:txBody>
+                    <a:bodyPr/>
+                    <a:lstStyle/>
+                    <a:p>
+                      <a:r>
+                        <a:rPr lang="fr-FR" dirty="0" smtClean="0"/>
+                        <a:t>Portée du capteur : 80cm – 6m (jouable entre 1,2 m – 3,5 m)</a:t>
+                      </a:r>
+                    </a:p>
+                    <a:p>
+                      <a:r>
+                        <a:rPr lang="fr-FR" dirty="0" smtClean="0"/>
+                        <a:t>(à partir de 50 cm pour les versions Kinect for Windows)</a:t>
+                      </a:r>
+                    </a:p>
+                  </a:txBody>
+                  <a:tcPr/>
+                </a:tc>
+              </a:tr>
+              <a:tr h="370840">
+                <a:tc>
+                  <a:txBody>
+                    <a:bodyPr/>
+                    <a:lstStyle/>
+                    <a:p>
+                      <a:r>
+                        <a:rPr lang="fr-FR" noProof="0" dirty="0" smtClean="0"/>
+                        <a:t>Moteur</a:t>
+                      </a:r>
+                      <a:r>
+                        <a:rPr lang="en-GB" dirty="0" smtClean="0"/>
+                        <a:t> </a:t>
+                      </a:r>
+                      <a:r>
+                        <a:rPr lang="fr-FR" noProof="0" dirty="0" smtClean="0"/>
+                        <a:t>d’inclinaison</a:t>
+                      </a:r>
+                      <a:endParaRPr lang="fr-FR" noProof="0" dirty="0"/>
+                    </a:p>
+                  </a:txBody>
+                  <a:tcPr/>
+                </a:tc>
+                <a:tc>
+                  <a:txBody>
+                    <a:bodyPr/>
+                    <a:lstStyle/>
+                    <a:p>
+                      <a:r>
+                        <a:rPr lang="fr-FR" dirty="0" smtClean="0"/>
+                        <a:t>Marge de déplacement </a:t>
+                      </a:r>
+                      <a:r>
+                        <a:rPr lang="fr-FR" dirty="0" smtClean="0"/>
+                        <a:t>: </a:t>
+                      </a:r>
+                      <a:r>
+                        <a:rPr lang="fr-FR" dirty="0" smtClean="0"/>
+                        <a:t>± 27 degrés</a:t>
+                      </a:r>
+                    </a:p>
+                  </a:txBody>
+                  <a:tcPr/>
+                </a:tc>
+              </a:tr>
+            </a:tbl>
+          </a:graphicData>
+        </a:graphic>
+      </p:graphicFrame>
       <p:sp>
         <p:nvSpPr>
           <p:cNvPr id="3" name="Titre 2"/>
@@ -50708,11 +51000,7 @@
           <a:p>
             <a:r>
               <a:rPr lang="fr-FR" dirty="0" smtClean="0"/>
-              <a:t>Emetteur Infrarouge – Gestion de </a:t>
-            </a:r>
-            <a:r>
-              <a:rPr lang="fr-FR" smtClean="0"/>
-              <a:t>la distance</a:t>
+              <a:t>Capteurs</a:t>
             </a:r>
             <a:endParaRPr lang="fr-FR" dirty="0"/>
           </a:p>
@@ -50742,51 +51030,10 @@
           </a:p>
         </p:txBody>
       </p:sp>
-      <p:pic>
-        <p:nvPicPr>
-          <p:cNvPr id="2050" name="Picture 2" descr="http://upload.wikimedia.org/wikipedia/commons/thumb/9/90/Kinect2-deepmap.png/220px-Kinect2-deepmap.png"/>
-          <p:cNvPicPr>
-            <a:picLocks noChangeAspect="1" noChangeArrowheads="1"/>
-          </p:cNvPicPr>
-          <p:nvPr/>
-        </p:nvPicPr>
-        <p:blipFill>
-          <a:blip r:embed="rId2">
-            <a:extLst>
-              <a:ext uri="{28A0092B-C50C-407E-A947-70E740481C1C}">
-                <a14:useLocalDpi xmlns:a14="http://schemas.microsoft.com/office/drawing/2010/main" val="0"/>
-              </a:ext>
-            </a:extLst>
-          </a:blip>
-          <a:srcRect/>
-          <a:stretch>
-            <a:fillRect/>
-          </a:stretch>
-        </p:blipFill>
-        <p:spPr bwMode="auto">
-          <a:xfrm>
-            <a:off x="6612359" y="1600201"/>
-            <a:ext cx="2095500" cy="1685926"/>
-          </a:xfrm>
-          <a:prstGeom prst="rect">
-            <a:avLst/>
-          </a:prstGeom>
-          <a:noFill/>
-          <a:extLst>
-            <a:ext uri="{909E8E84-426E-40DD-AFC4-6F175D3DCCD1}">
-              <a14:hiddenFill xmlns:a14="http://schemas.microsoft.com/office/drawing/2010/main">
-                <a:solidFill>
-                  <a:srgbClr val="FFFFFF"/>
-                </a:solidFill>
-              </a14:hiddenFill>
-            </a:ext>
-          </a:extLst>
-        </p:spPr>
-      </p:pic>
     </p:spTree>
     <p:extLst>
       <p:ext uri="{BB962C8B-B14F-4D97-AF65-F5344CB8AC3E}">
-        <p14:creationId xmlns:p14="http://schemas.microsoft.com/office/powerpoint/2010/main" val="304316796"/>
+        <p14:creationId xmlns:p14="http://schemas.microsoft.com/office/powerpoint/2010/main" val="1893257072"/>
       </p:ext>
     </p:extLst>
   </p:cSld>
@@ -50813,65 +51060,169 @@
           <a:chExt cx="0" cy="0"/>
         </a:xfrm>
       </p:grpSpPr>
-      <p:sp>
-        <p:nvSpPr>
-          <p:cNvPr id="2" name="Espace réservé du contenu 1"/>
-          <p:cNvSpPr>
-            <a:spLocks noGrp="1"/>
-          </p:cNvSpPr>
+      <p:pic>
+        <p:nvPicPr>
+          <p:cNvPr id="1026" name="Picture 2" descr="JJ131033.k4w_sensor_2(en-us,IEB.10).png"/>
+          <p:cNvPicPr>
+            <a:picLocks noGrp="1" noChangeAspect="1" noChangeArrowheads="1"/>
+          </p:cNvPicPr>
           <p:nvPr>
-            <p:ph idx="1"/>
+            <p:ph sz="half" idx="1"/>
           </p:nvPr>
-        </p:nvSpPr>
-        <p:spPr/>
-        <p:txBody>
-          <a:bodyPr/>
-          <a:lstStyle/>
-          <a:p>
-            <a:r>
-              <a:rPr lang="fr-FR" dirty="0" smtClean="0"/>
-              <a:t>4 microphones </a:t>
-            </a:r>
-            <a:r>
-              <a:rPr lang="fr-FR" dirty="0" smtClean="0"/>
-              <a:t>intégrés</a:t>
-            </a:r>
-          </a:p>
-          <a:p>
-            <a:r>
-              <a:rPr lang="fr-FR" dirty="0" smtClean="0"/>
-              <a:t>Suppression du bruit ambiant</a:t>
-            </a:r>
-          </a:p>
-          <a:p>
-            <a:r>
-              <a:rPr lang="fr-FR" dirty="0" smtClean="0"/>
-              <a:t>Suppression de l’écho</a:t>
-            </a:r>
-          </a:p>
-          <a:p>
-            <a:r>
-              <a:rPr lang="fr-FR" dirty="0" smtClean="0"/>
-              <a:t>Intégration avec le moteur de Reconnaissance Vocal de Windows (Windows Speech Recognition)</a:t>
-            </a:r>
-          </a:p>
-          <a:p>
-            <a:pPr lvl="1"/>
-            <a:r>
-              <a:rPr lang="fr-FR" dirty="0" smtClean="0"/>
-              <a:t>Fonctionne avec un indice de confiance qu’on peut régler entre 0 et 1.0f</a:t>
-            </a:r>
-          </a:p>
-          <a:p>
-            <a:pPr lvl="1"/>
-            <a:r>
-              <a:rPr lang="fr-FR" dirty="0" smtClean="0"/>
-              <a:t>Gère des mots reconnus, mots hypothétiques</a:t>
-            </a:r>
-            <a:endParaRPr lang="fr-FR" dirty="0"/>
-          </a:p>
-        </p:txBody>
-      </p:sp>
+        </p:nvPicPr>
+        <p:blipFill>
+          <a:blip r:embed="rId2">
+            <a:extLst>
+              <a:ext uri="{28A0092B-C50C-407E-A947-70E740481C1C}">
+                <a14:useLocalDpi xmlns:a14="http://schemas.microsoft.com/office/drawing/2010/main" val="0"/>
+              </a:ext>
+            </a:extLst>
+          </a:blip>
+          <a:stretch>
+            <a:fillRect/>
+          </a:stretch>
+        </p:blipFill>
+        <p:spPr bwMode="auto">
+          <a:xfrm>
+            <a:off x="2414978" y="1600200"/>
+            <a:ext cx="4350557" cy="2232025"/>
+          </a:xfrm>
+          <a:prstGeom prst="rect">
+            <a:avLst/>
+          </a:prstGeom>
+          <a:noFill/>
+          <a:extLst>
+            <a:ext uri="{909E8E84-426E-40DD-AFC4-6F175D3DCCD1}">
+              <a14:hiddenFill xmlns:a14="http://schemas.microsoft.com/office/drawing/2010/main">
+                <a:solidFill>
+                  <a:srgbClr val="FFFFFF"/>
+                </a:solidFill>
+              </a14:hiddenFill>
+            </a:ext>
+          </a:extLst>
+        </p:spPr>
+      </p:pic>
+      <p:graphicFrame>
+        <p:nvGraphicFramePr>
+          <p:cNvPr id="9" name="Espace réservé du contenu 8"/>
+          <p:cNvGraphicFramePr>
+            <a:graphicFrameLocks noGrp="1"/>
+          </p:cNvGraphicFramePr>
+          <p:nvPr>
+            <p:ph sz="half" idx="2"/>
+            <p:extLst>
+              <p:ext uri="{D42A27DB-BD31-4B8C-83A1-F6EECF244321}">
+                <p14:modId xmlns:p14="http://schemas.microsoft.com/office/powerpoint/2010/main" val="1455514045"/>
+              </p:ext>
+            </p:extLst>
+          </p:nvPr>
+        </p:nvGraphicFramePr>
+        <p:xfrm>
+          <a:off x="360363" y="4006850"/>
+          <a:ext cx="8459788" cy="2382520"/>
+        </p:xfrm>
+        <a:graphic>
+          <a:graphicData uri="http://schemas.openxmlformats.org/drawingml/2006/table">
+            <a:tbl>
+              <a:tblPr firstRow="1" bandRow="1">
+                <a:tableStyleId>{5C22544A-7EE6-4342-B048-85BDC9FD1C3A}</a:tableStyleId>
+              </a:tblPr>
+              <a:tblGrid>
+                <a:gridCol w="2266296"/>
+                <a:gridCol w="6193492"/>
+              </a:tblGrid>
+              <a:tr h="370840">
+                <a:tc>
+                  <a:txBody>
+                    <a:bodyPr/>
+                    <a:lstStyle/>
+                    <a:p>
+                      <a:r>
+                        <a:rPr lang="en-GB" dirty="0" err="1" smtClean="0"/>
+                        <a:t>Capteur</a:t>
+                      </a:r>
+                      <a:endParaRPr lang="en-GB" dirty="0"/>
+                    </a:p>
+                  </a:txBody>
+                  <a:tcPr/>
+                </a:tc>
+                <a:tc>
+                  <a:txBody>
+                    <a:bodyPr/>
+                    <a:lstStyle/>
+                    <a:p>
+                      <a:r>
+                        <a:rPr lang="en-GB" dirty="0" err="1" smtClean="0"/>
+                        <a:t>Spécifications</a:t>
+                      </a:r>
+                      <a:endParaRPr lang="en-GB" dirty="0"/>
+                    </a:p>
+                  </a:txBody>
+                  <a:tcPr/>
+                </a:tc>
+              </a:tr>
+              <a:tr h="370840">
+                <a:tc>
+                  <a:txBody>
+                    <a:bodyPr/>
+                    <a:lstStyle/>
+                    <a:p>
+                      <a:r>
+                        <a:rPr lang="en-GB" dirty="0" smtClean="0"/>
+                        <a:t>4 Microphones</a:t>
+                      </a:r>
+                      <a:endParaRPr lang="en-GB" dirty="0"/>
+                    </a:p>
+                  </a:txBody>
+                  <a:tcPr/>
+                </a:tc>
+                <a:tc>
+                  <a:txBody>
+                    <a:bodyPr/>
+                    <a:lstStyle/>
+                    <a:p>
+                      <a:r>
+                        <a:rPr lang="fr-FR" dirty="0" smtClean="0"/>
+                        <a:t>Suppression du bruit ambiant</a:t>
+                      </a:r>
+                    </a:p>
+                    <a:p>
+                      <a:r>
+                        <a:rPr lang="fr-FR" dirty="0" smtClean="0"/>
+                        <a:t>Suppression de l’écho</a:t>
+                      </a:r>
+                    </a:p>
+                    <a:p>
+                      <a:r>
+                        <a:rPr lang="fr-FR" dirty="0" smtClean="0"/>
+                        <a:t>Intégration avec le moteur de Reconnaissance Vocal de Windows (Windows Speech Recognition)</a:t>
+                      </a:r>
+                    </a:p>
+                    <a:p>
+                      <a:pPr lvl="1"/>
+                      <a:r>
+                        <a:rPr lang="fr-FR" dirty="0" smtClean="0"/>
+                        <a:t>Indice de confiance réglable entre 0 et 1.0f</a:t>
+                      </a:r>
+                    </a:p>
+                    <a:p>
+                      <a:pPr lvl="1"/>
+                      <a:r>
+                        <a:rPr lang="fr-FR" dirty="0" smtClean="0"/>
+                        <a:t>Gestion des mots reconnus, des mots hypothétiques</a:t>
+                      </a:r>
+                    </a:p>
+                    <a:p>
+                      <a:endParaRPr lang="en-GB" dirty="0"/>
+                    </a:p>
+                  </a:txBody>
+                  <a:tcPr/>
+                </a:tc>
+              </a:tr>
+            </a:tbl>
+          </a:graphicData>
+        </a:graphic>
+      </p:graphicFrame>
       <p:sp>
         <p:nvSpPr>
           <p:cNvPr id="3" name="Titre 2"/>
@@ -50889,7 +51240,7 @@
           <a:p>
             <a:r>
               <a:rPr lang="fr-FR" dirty="0" smtClean="0"/>
-              <a:t>Microphones</a:t>
+              <a:t>Capteurs</a:t>
             </a:r>
             <a:endParaRPr lang="fr-FR" dirty="0"/>
           </a:p>
@@ -50922,7 +51273,7 @@
     </p:spTree>
     <p:extLst>
       <p:ext uri="{BB962C8B-B14F-4D97-AF65-F5344CB8AC3E}">
-        <p14:creationId xmlns:p14="http://schemas.microsoft.com/office/powerpoint/2010/main" val="1907910503"/>
+        <p14:creationId xmlns:p14="http://schemas.microsoft.com/office/powerpoint/2010/main" val="2638487211"/>
       </p:ext>
     </p:extLst>
   </p:cSld>
@@ -50951,22 +51302,55 @@
       </p:grpSpPr>
       <p:sp>
         <p:nvSpPr>
+          <p:cNvPr id="2" name="Espace réservé du texte 1"/>
+          <p:cNvSpPr>
+            <a:spLocks noGrp="1"/>
+          </p:cNvSpPr>
+          <p:nvPr>
+            <p:ph type="body" sz="quarter" idx="11"/>
+          </p:nvPr>
+        </p:nvSpPr>
+        <p:spPr>
+          <a:xfrm>
+            <a:off x="4500880" y="2818798"/>
+            <a:ext cx="4643437" cy="776049"/>
+          </a:xfrm>
+        </p:spPr>
+        <p:txBody>
+          <a:bodyPr/>
+          <a:lstStyle/>
+          <a:p>
+            <a:endParaRPr lang="fr-FR" dirty="0"/>
+          </a:p>
+        </p:txBody>
+      </p:sp>
+      <p:sp>
+        <p:nvSpPr>
           <p:cNvPr id="3" name="Titre 2"/>
           <p:cNvSpPr>
             <a:spLocks noGrp="1"/>
           </p:cNvSpPr>
           <p:nvPr>
-            <p:ph type="title"/>
+            <p:ph type="ctrTitle"/>
           </p:nvPr>
         </p:nvSpPr>
-        <p:spPr/>
+        <p:spPr>
+          <a:xfrm>
+            <a:off x="609606" y="293037"/>
+            <a:ext cx="8241072" cy="1545939"/>
+          </a:xfrm>
+        </p:spPr>
         <p:txBody>
           <a:bodyPr/>
           <a:lstStyle/>
           <a:p>
             <a:r>
+              <a:rPr lang="fr-FR" dirty="0"/>
+              <a:t>Live Coding : Application Windows utilisant </a:t>
+            </a:r>
+            <a:r>
               <a:rPr lang="fr-FR" dirty="0" smtClean="0"/>
-              <a:t>Architecture – Accès aux flux d’information</a:t>
+              <a:t>Kinect</a:t>
             </a:r>
             <a:endParaRPr lang="fr-FR" dirty="0"/>
           </a:p>
@@ -50987,7 +51371,7 @@
           <a:bodyPr/>
           <a:lstStyle/>
           <a:p>
-            <a:fld id="{C47C2D81-940B-4685-92D1-3ECF90F4940E}" type="slidenum">
+            <a:fld id="{D8B8FD23-DCAD-4E0C-B199-CE60B1012E33}" type="slidenum">
               <a:rPr lang="fr-FR" smtClean="0"/>
               <a:pPr/>
               <a:t>9</a:t>
@@ -50996,34 +51380,58 @@
           </a:p>
         </p:txBody>
       </p:sp>
-      <p:graphicFrame>
-        <p:nvGraphicFramePr>
-          <p:cNvPr id="6" name="Espace réservé du contenu 3"/>
-          <p:cNvGraphicFramePr>
-            <a:graphicFrameLocks/>
-          </p:cNvGraphicFramePr>
+      <p:sp>
+        <p:nvSpPr>
+          <p:cNvPr id="5" name="Espace réservé du texte 4"/>
+          <p:cNvSpPr>
+            <a:spLocks noGrp="1"/>
+          </p:cNvSpPr>
           <p:nvPr>
-            <p:extLst>
-              <p:ext uri="{D42A27DB-BD31-4B8C-83A1-F6EECF244321}">
-                <p14:modId xmlns:p14="http://schemas.microsoft.com/office/powerpoint/2010/main" val="1241852078"/>
-              </p:ext>
-            </p:extLst>
+            <p:ph type="body" sz="quarter" idx="10"/>
           </p:nvPr>
-        </p:nvGraphicFramePr>
-        <p:xfrm>
-          <a:off x="233082" y="1744943"/>
-          <a:ext cx="8193742" cy="4351338"/>
-        </p:xfrm>
-        <a:graphic>
-          <a:graphicData uri="http://schemas.openxmlformats.org/drawingml/2006/diagram">
-            <dgm:relIds xmlns:dgm="http://schemas.openxmlformats.org/drawingml/2006/diagram" xmlns:r="http://schemas.openxmlformats.org/officeDocument/2006/relationships" r:dm="rId2" r:lo="rId3" r:qs="rId4" r:cs="rId5"/>
-          </a:graphicData>
-        </a:graphic>
-      </p:graphicFrame>
+        </p:nvSpPr>
+        <p:spPr/>
+        <p:txBody>
+          <a:bodyPr/>
+          <a:lstStyle/>
+          <a:p>
+            <a:r>
+              <a:rPr lang="fr-FR" dirty="0"/>
+              <a:t>Présentation du matériel</a:t>
+            </a:r>
+          </a:p>
+          <a:p>
+            <a:r>
+              <a:rPr lang="fr-FR" dirty="0"/>
+              <a:t>Live Coding : Application Windows utilisant Kinect</a:t>
+            </a:r>
+          </a:p>
+          <a:p>
+            <a:r>
+              <a:rPr lang="fr-FR" dirty="0"/>
+              <a:t>Démo : Focus sur les </a:t>
+            </a:r>
+            <a:r>
+              <a:rPr lang="fr-FR" dirty="0" err="1"/>
+              <a:t>Gestures</a:t>
+            </a:r>
+            <a:endParaRPr lang="fr-FR" dirty="0"/>
+          </a:p>
+          <a:p>
+            <a:r>
+              <a:rPr lang="fr-FR" dirty="0"/>
+              <a:t>Live Coding : Reconnaissance vocale et Robotique</a:t>
+            </a:r>
+          </a:p>
+          <a:p>
+            <a:endParaRPr lang="fr-FR" dirty="0"/>
+          </a:p>
+        </p:txBody>
+      </p:sp>
     </p:spTree>
     <p:extLst>
       <p:ext uri="{BB962C8B-B14F-4D97-AF65-F5344CB8AC3E}">
-        <p14:creationId xmlns:p14="http://schemas.microsoft.com/office/powerpoint/2010/main" val="233628240"/>
+        <p14:creationId xmlns:p14="http://schemas.microsoft.com/office/powerpoint/2010/main" val="2490615142"/>
       </p:ext>
     </p:extLst>
   </p:cSld>
@@ -52006,21 +52414,6 @@
 </file>
 
 <file path=customXml/item1.xml><?xml version="1.0" encoding="utf-8"?>
-<p:properties xmlns:p="http://schemas.microsoft.com/office/2006/metadata/properties" xmlns:xsi="http://www.w3.org/2001/XMLSchema-instance" xmlns:pc="http://schemas.microsoft.com/office/infopath/2007/PartnerControls">
-  <documentManagement/>
-</p:properties>
-</file>
-
-<file path=customXml/item2.xml><?xml version="1.0" encoding="utf-8"?>
-<?mso-contentType ?>
-<FormTemplates xmlns="http://schemas.microsoft.com/sharepoint/v3/contenttype/forms">
-  <Display>DocumentLibraryForm</Display>
-  <Edit>DocumentLibraryForm</Edit>
-  <New>DocumentLibraryForm</New>
-</FormTemplates>
-</file>
-
-<file path=customXml/item3.xml><?xml version="1.0" encoding="utf-8"?>
 <ct:contentTypeSchema xmlns:ct="http://schemas.microsoft.com/office/2006/metadata/contentType" xmlns:ma="http://schemas.microsoft.com/office/2006/metadata/properties/metaAttributes" ct:_="" ma:_="" ma:contentTypeName="Document" ma:contentTypeID="0x010100DB557686CAEF394BA510AD1A9D4B96D9" ma:contentTypeVersion="0" ma:contentTypeDescription="Crée un document." ma:contentTypeScope="" ma:versionID="6bdde8ca07fbe4779f455e2b2462959b">
   <xsd:schema xmlns:xsd="http://www.w3.org/2001/XMLSchema" xmlns:xs="http://www.w3.org/2001/XMLSchema" xmlns:p="http://schemas.microsoft.com/office/2006/metadata/properties" targetNamespace="http://schemas.microsoft.com/office/2006/metadata/properties" ma:root="true" ma:fieldsID="7f54f395c53e97cb256f6376e394fd4f">
     <xsd:element name="properties">
@@ -52134,10 +52527,32 @@
 </ct:contentTypeSchema>
 </file>
 
+<file path=customXml/item2.xml><?xml version="1.0" encoding="utf-8"?>
+<?mso-contentType ?>
+<FormTemplates xmlns="http://schemas.microsoft.com/sharepoint/v3/contenttype/forms">
+  <Display>DocumentLibraryForm</Display>
+  <Edit>DocumentLibraryForm</Edit>
+  <New>DocumentLibraryForm</New>
+</FormTemplates>
+</file>
+
+<file path=customXml/item3.xml><?xml version="1.0" encoding="utf-8"?>
+<p:properties xmlns:p="http://schemas.microsoft.com/office/2006/metadata/properties" xmlns:xsi="http://www.w3.org/2001/XMLSchema-instance" xmlns:pc="http://schemas.microsoft.com/office/infopath/2007/PartnerControls">
+  <documentManagement/>
+</p:properties>
+</file>
+
 <file path=customXml/itemProps1.xml><?xml version="1.0" encoding="utf-8"?>
-<ds:datastoreItem xmlns:ds="http://schemas.openxmlformats.org/officeDocument/2006/customXml" ds:itemID="{76459249-2168-4084-A479-1289D424349D}">
+<ds:datastoreItem xmlns:ds="http://schemas.openxmlformats.org/officeDocument/2006/customXml" ds:itemID="{F64200F9-F1C7-4AF4-8613-860EE2E9155A}">
   <ds:schemaRefs>
+    <ds:schemaRef ds:uri="http://schemas.microsoft.com/office/2006/metadata/contentType"/>
+    <ds:schemaRef ds:uri="http://schemas.microsoft.com/office/2006/metadata/properties/metaAttributes"/>
+    <ds:schemaRef ds:uri="http://www.w3.org/2001/XMLSchema"/>
     <ds:schemaRef ds:uri="http://schemas.microsoft.com/office/2006/metadata/properties"/>
+    <ds:schemaRef ds:uri="http://schemas.openxmlformats.org/package/2006/metadata/core-properties"/>
+    <ds:schemaRef ds:uri="http://purl.org/dc/elements/1.1/"/>
+    <ds:schemaRef ds:uri="http://purl.org/dc/terms/"/>
+    <ds:schemaRef ds:uri="http://schemas.microsoft.com/internal/obd"/>
     <ds:schemaRef ds:uri="http://schemas.microsoft.com/office/infopath/2007/PartnerControls"/>
   </ds:schemaRefs>
 </ds:datastoreItem>
@@ -52152,16 +52567,9 @@
 </file>
 
 <file path=customXml/itemProps3.xml><?xml version="1.0" encoding="utf-8"?>
-<ds:datastoreItem xmlns:ds="http://schemas.openxmlformats.org/officeDocument/2006/customXml" ds:itemID="{F64200F9-F1C7-4AF4-8613-860EE2E9155A}">
+<ds:datastoreItem xmlns:ds="http://schemas.openxmlformats.org/officeDocument/2006/customXml" ds:itemID="{76459249-2168-4084-A479-1289D424349D}">
   <ds:schemaRefs>
-    <ds:schemaRef ds:uri="http://schemas.microsoft.com/office/2006/metadata/contentType"/>
-    <ds:schemaRef ds:uri="http://schemas.microsoft.com/office/2006/metadata/properties/metaAttributes"/>
-    <ds:schemaRef ds:uri="http://www.w3.org/2001/XMLSchema"/>
     <ds:schemaRef ds:uri="http://schemas.microsoft.com/office/2006/metadata/properties"/>
-    <ds:schemaRef ds:uri="http://schemas.openxmlformats.org/package/2006/metadata/core-properties"/>
-    <ds:schemaRef ds:uri="http://purl.org/dc/elements/1.1/"/>
-    <ds:schemaRef ds:uri="http://purl.org/dc/terms/"/>
-    <ds:schemaRef ds:uri="http://schemas.microsoft.com/internal/obd"/>
     <ds:schemaRef ds:uri="http://schemas.microsoft.com/office/infopath/2007/PartnerControls"/>
   </ds:schemaRefs>
 </ds:datastoreItem>

</xml_diff>

<commit_message>
Mise à jour de la prez
</commit_message>
<xml_diff>
--- a/Talentsoft-RD-Academy-Kinect.pptx
+++ b/Talentsoft-RD-Academy-Kinect.pptx
@@ -5,10 +5,10 @@
     <p:sldMasterId id="2147483648" r:id="rId4"/>
   </p:sldMasterIdLst>
   <p:notesMasterIdLst>
-    <p:notesMasterId r:id="rId29"/>
+    <p:notesMasterId r:id="rId30"/>
   </p:notesMasterIdLst>
   <p:handoutMasterIdLst>
-    <p:handoutMasterId r:id="rId30"/>
+    <p:handoutMasterId r:id="rId31"/>
   </p:handoutMasterIdLst>
   <p:sldIdLst>
     <p:sldId id="256" r:id="rId5"/>
@@ -33,8 +33,9 @@
     <p:sldId id="276" r:id="rId24"/>
     <p:sldId id="279" r:id="rId25"/>
     <p:sldId id="286" r:id="rId26"/>
-    <p:sldId id="273" r:id="rId27"/>
-    <p:sldId id="272" r:id="rId28"/>
+    <p:sldId id="287" r:id="rId27"/>
+    <p:sldId id="273" r:id="rId28"/>
+    <p:sldId id="272" r:id="rId29"/>
   </p:sldIdLst>
   <p:sldSz cx="9144000" cy="6858000" type="screen4x3"/>
   <p:notesSz cx="6858000" cy="9144000"/>
@@ -3160,6 +3161,1055 @@
       <dsp:cNvGrpSpPr/>
     </dsp:nvGrpSpPr>
     <dsp:grpSpPr/>
+    <dsp:sp modelId="{6AE05DB0-81DD-4B53-B6C9-DCF6E09A544C}">
+      <dsp:nvSpPr>
+        <dsp:cNvPr id="0" name=""/>
+        <dsp:cNvSpPr/>
+      </dsp:nvSpPr>
+      <dsp:spPr>
+        <a:xfrm>
+          <a:off x="1442011" y="2318001"/>
+          <a:ext cx="506864" cy="482912"/>
+        </a:xfrm>
+        <a:custGeom>
+          <a:avLst/>
+          <a:gdLst/>
+          <a:ahLst/>
+          <a:cxnLst/>
+          <a:rect l="0" t="0" r="0" b="0"/>
+          <a:pathLst>
+            <a:path>
+              <a:moveTo>
+                <a:pt x="0" y="0"/>
+              </a:moveTo>
+              <a:lnTo>
+                <a:pt x="253432" y="0"/>
+              </a:lnTo>
+              <a:lnTo>
+                <a:pt x="253432" y="482912"/>
+              </a:lnTo>
+              <a:lnTo>
+                <a:pt x="506864" y="482912"/>
+              </a:lnTo>
+            </a:path>
+          </a:pathLst>
+        </a:custGeom>
+        <a:noFill/>
+        <a:ln w="25400" cap="flat" cmpd="sng" algn="ctr">
+          <a:solidFill>
+            <a:schemeClr val="accent1">
+              <a:shade val="60000"/>
+              <a:hueOff val="0"/>
+              <a:satOff val="0"/>
+              <a:lumOff val="0"/>
+              <a:alphaOff val="0"/>
+            </a:schemeClr>
+          </a:solidFill>
+          <a:prstDash val="solid"/>
+        </a:ln>
+        <a:effectLst/>
+      </dsp:spPr>
+      <dsp:style>
+        <a:lnRef idx="2">
+          <a:scrgbClr r="0" g="0" b="0"/>
+        </a:lnRef>
+        <a:fillRef idx="0">
+          <a:scrgbClr r="0" g="0" b="0"/>
+        </a:fillRef>
+        <a:effectRef idx="0">
+          <a:scrgbClr r="0" g="0" b="0"/>
+        </a:effectRef>
+        <a:fontRef idx="minor"/>
+      </dsp:style>
+      <dsp:txBody>
+        <a:bodyPr spcFirstLastPara="0" vert="horz" wrap="square" lIns="12700" tIns="0" rIns="12700" bIns="0" numCol="1" spcCol="1270" anchor="ctr" anchorCtr="0">
+          <a:noAutofit/>
+        </a:bodyPr>
+        <a:lstStyle/>
+        <a:p>
+          <a:pPr lvl="0" algn="ctr" defTabSz="222250">
+            <a:lnSpc>
+              <a:spcPct val="90000"/>
+            </a:lnSpc>
+            <a:spcBef>
+              <a:spcPct val="0"/>
+            </a:spcBef>
+            <a:spcAft>
+              <a:spcPct val="35000"/>
+            </a:spcAft>
+          </a:pPr>
+          <a:endParaRPr lang="en-GB" sz="500" kern="1200"/>
+        </a:p>
+      </dsp:txBody>
+      <dsp:txXfrm>
+        <a:off x="1677941" y="2541955"/>
+        <a:ext cx="35004" cy="35004"/>
+      </dsp:txXfrm>
+    </dsp:sp>
+    <dsp:sp modelId="{A98987D5-FA05-4121-AE3F-B7C993FF2431}">
+      <dsp:nvSpPr>
+        <dsp:cNvPr id="0" name=""/>
+        <dsp:cNvSpPr/>
+      </dsp:nvSpPr>
+      <dsp:spPr>
+        <a:xfrm>
+          <a:off x="4483200" y="1835088"/>
+          <a:ext cx="506864" cy="1448737"/>
+        </a:xfrm>
+        <a:custGeom>
+          <a:avLst/>
+          <a:gdLst/>
+          <a:ahLst/>
+          <a:cxnLst/>
+          <a:rect l="0" t="0" r="0" b="0"/>
+          <a:pathLst>
+            <a:path>
+              <a:moveTo>
+                <a:pt x="0" y="0"/>
+              </a:moveTo>
+              <a:lnTo>
+                <a:pt x="253432" y="0"/>
+              </a:lnTo>
+              <a:lnTo>
+                <a:pt x="253432" y="1448737"/>
+              </a:lnTo>
+              <a:lnTo>
+                <a:pt x="506864" y="1448737"/>
+              </a:lnTo>
+            </a:path>
+          </a:pathLst>
+        </a:custGeom>
+        <a:noFill/>
+        <a:ln w="25400" cap="flat" cmpd="sng" algn="ctr">
+          <a:solidFill>
+            <a:schemeClr val="accent1">
+              <a:shade val="80000"/>
+              <a:hueOff val="0"/>
+              <a:satOff val="0"/>
+              <a:lumOff val="0"/>
+              <a:alphaOff val="0"/>
+            </a:schemeClr>
+          </a:solidFill>
+          <a:prstDash val="solid"/>
+        </a:ln>
+        <a:effectLst/>
+      </dsp:spPr>
+      <dsp:style>
+        <a:lnRef idx="2">
+          <a:scrgbClr r="0" g="0" b="0"/>
+        </a:lnRef>
+        <a:fillRef idx="0">
+          <a:scrgbClr r="0" g="0" b="0"/>
+        </a:fillRef>
+        <a:effectRef idx="0">
+          <a:scrgbClr r="0" g="0" b="0"/>
+        </a:effectRef>
+        <a:fontRef idx="minor"/>
+      </dsp:style>
+      <dsp:txBody>
+        <a:bodyPr spcFirstLastPara="0" vert="horz" wrap="square" lIns="12700" tIns="0" rIns="12700" bIns="0" numCol="1" spcCol="1270" anchor="ctr" anchorCtr="0">
+          <a:noAutofit/>
+        </a:bodyPr>
+        <a:lstStyle/>
+        <a:p>
+          <a:pPr lvl="0" algn="ctr" defTabSz="222250">
+            <a:lnSpc>
+              <a:spcPct val="90000"/>
+            </a:lnSpc>
+            <a:spcBef>
+              <a:spcPct val="0"/>
+            </a:spcBef>
+            <a:spcAft>
+              <a:spcPct val="35000"/>
+            </a:spcAft>
+          </a:pPr>
+          <a:endParaRPr lang="en-GB" sz="500" kern="1200"/>
+        </a:p>
+      </dsp:txBody>
+      <dsp:txXfrm>
+        <a:off x="4698262" y="2521086"/>
+        <a:ext cx="76742" cy="76742"/>
+      </dsp:txXfrm>
+    </dsp:sp>
+    <dsp:sp modelId="{79C0D080-7C81-4BAA-B474-551C51642B59}">
+      <dsp:nvSpPr>
+        <dsp:cNvPr id="0" name=""/>
+        <dsp:cNvSpPr/>
+      </dsp:nvSpPr>
+      <dsp:spPr>
+        <a:xfrm>
+          <a:off x="4483200" y="1835088"/>
+          <a:ext cx="506864" cy="482912"/>
+        </a:xfrm>
+        <a:custGeom>
+          <a:avLst/>
+          <a:gdLst/>
+          <a:ahLst/>
+          <a:cxnLst/>
+          <a:rect l="0" t="0" r="0" b="0"/>
+          <a:pathLst>
+            <a:path>
+              <a:moveTo>
+                <a:pt x="0" y="0"/>
+              </a:moveTo>
+              <a:lnTo>
+                <a:pt x="253432" y="0"/>
+              </a:lnTo>
+              <a:lnTo>
+                <a:pt x="253432" y="482912"/>
+              </a:lnTo>
+              <a:lnTo>
+                <a:pt x="506864" y="482912"/>
+              </a:lnTo>
+            </a:path>
+          </a:pathLst>
+        </a:custGeom>
+        <a:noFill/>
+        <a:ln w="25400" cap="flat" cmpd="sng" algn="ctr">
+          <a:solidFill>
+            <a:schemeClr val="accent1">
+              <a:shade val="80000"/>
+              <a:hueOff val="0"/>
+              <a:satOff val="0"/>
+              <a:lumOff val="0"/>
+              <a:alphaOff val="0"/>
+            </a:schemeClr>
+          </a:solidFill>
+          <a:prstDash val="solid"/>
+        </a:ln>
+        <a:effectLst/>
+      </dsp:spPr>
+      <dsp:style>
+        <a:lnRef idx="2">
+          <a:scrgbClr r="0" g="0" b="0"/>
+        </a:lnRef>
+        <a:fillRef idx="0">
+          <a:scrgbClr r="0" g="0" b="0"/>
+        </a:fillRef>
+        <a:effectRef idx="0">
+          <a:scrgbClr r="0" g="0" b="0"/>
+        </a:effectRef>
+        <a:fontRef idx="minor"/>
+      </dsp:style>
+      <dsp:txBody>
+        <a:bodyPr spcFirstLastPara="0" vert="horz" wrap="square" lIns="12700" tIns="0" rIns="12700" bIns="0" numCol="1" spcCol="1270" anchor="ctr" anchorCtr="0">
+          <a:noAutofit/>
+        </a:bodyPr>
+        <a:lstStyle/>
+        <a:p>
+          <a:pPr lvl="0" algn="ctr" defTabSz="222250">
+            <a:lnSpc>
+              <a:spcPct val="90000"/>
+            </a:lnSpc>
+            <a:spcBef>
+              <a:spcPct val="0"/>
+            </a:spcBef>
+            <a:spcAft>
+              <a:spcPct val="35000"/>
+            </a:spcAft>
+          </a:pPr>
+          <a:endParaRPr lang="en-GB" sz="500" kern="1200"/>
+        </a:p>
+      </dsp:txBody>
+      <dsp:txXfrm>
+        <a:off x="4719131" y="2059042"/>
+        <a:ext cx="35004" cy="35004"/>
+      </dsp:txXfrm>
+    </dsp:sp>
+    <dsp:sp modelId="{A7AC904B-7897-4475-8D7A-3A23194F1455}">
+      <dsp:nvSpPr>
+        <dsp:cNvPr id="0" name=""/>
+        <dsp:cNvSpPr/>
+      </dsp:nvSpPr>
+      <dsp:spPr>
+        <a:xfrm>
+          <a:off x="4483200" y="1352176"/>
+          <a:ext cx="506864" cy="482912"/>
+        </a:xfrm>
+        <a:custGeom>
+          <a:avLst/>
+          <a:gdLst/>
+          <a:ahLst/>
+          <a:cxnLst/>
+          <a:rect l="0" t="0" r="0" b="0"/>
+          <a:pathLst>
+            <a:path>
+              <a:moveTo>
+                <a:pt x="0" y="482912"/>
+              </a:moveTo>
+              <a:lnTo>
+                <a:pt x="253432" y="482912"/>
+              </a:lnTo>
+              <a:lnTo>
+                <a:pt x="253432" y="0"/>
+              </a:lnTo>
+              <a:lnTo>
+                <a:pt x="506864" y="0"/>
+              </a:lnTo>
+            </a:path>
+          </a:pathLst>
+        </a:custGeom>
+        <a:noFill/>
+        <a:ln w="25400" cap="flat" cmpd="sng" algn="ctr">
+          <a:solidFill>
+            <a:schemeClr val="accent1">
+              <a:shade val="80000"/>
+              <a:hueOff val="0"/>
+              <a:satOff val="0"/>
+              <a:lumOff val="0"/>
+              <a:alphaOff val="0"/>
+            </a:schemeClr>
+          </a:solidFill>
+          <a:prstDash val="solid"/>
+        </a:ln>
+        <a:effectLst/>
+      </dsp:spPr>
+      <dsp:style>
+        <a:lnRef idx="2">
+          <a:scrgbClr r="0" g="0" b="0"/>
+        </a:lnRef>
+        <a:fillRef idx="0">
+          <a:scrgbClr r="0" g="0" b="0"/>
+        </a:fillRef>
+        <a:effectRef idx="0">
+          <a:scrgbClr r="0" g="0" b="0"/>
+        </a:effectRef>
+        <a:fontRef idx="minor"/>
+      </dsp:style>
+      <dsp:txBody>
+        <a:bodyPr spcFirstLastPara="0" vert="horz" wrap="square" lIns="12700" tIns="0" rIns="12700" bIns="0" numCol="1" spcCol="1270" anchor="ctr" anchorCtr="0">
+          <a:noAutofit/>
+        </a:bodyPr>
+        <a:lstStyle/>
+        <a:p>
+          <a:pPr lvl="0" algn="ctr" defTabSz="222250">
+            <a:lnSpc>
+              <a:spcPct val="90000"/>
+            </a:lnSpc>
+            <a:spcBef>
+              <a:spcPct val="0"/>
+            </a:spcBef>
+            <a:spcAft>
+              <a:spcPct val="35000"/>
+            </a:spcAft>
+          </a:pPr>
+          <a:endParaRPr lang="en-GB" sz="500" kern="1200"/>
+        </a:p>
+      </dsp:txBody>
+      <dsp:txXfrm>
+        <a:off x="4719131" y="1576130"/>
+        <a:ext cx="35004" cy="35004"/>
+      </dsp:txXfrm>
+    </dsp:sp>
+    <dsp:sp modelId="{42461136-7391-4FC7-942F-658B7E697049}">
+      <dsp:nvSpPr>
+        <dsp:cNvPr id="0" name=""/>
+        <dsp:cNvSpPr/>
+      </dsp:nvSpPr>
+      <dsp:spPr>
+        <a:xfrm>
+          <a:off x="4483200" y="386351"/>
+          <a:ext cx="506864" cy="1448737"/>
+        </a:xfrm>
+        <a:custGeom>
+          <a:avLst/>
+          <a:gdLst/>
+          <a:ahLst/>
+          <a:cxnLst/>
+          <a:rect l="0" t="0" r="0" b="0"/>
+          <a:pathLst>
+            <a:path>
+              <a:moveTo>
+                <a:pt x="0" y="1448737"/>
+              </a:moveTo>
+              <a:lnTo>
+                <a:pt x="253432" y="1448737"/>
+              </a:lnTo>
+              <a:lnTo>
+                <a:pt x="253432" y="0"/>
+              </a:lnTo>
+              <a:lnTo>
+                <a:pt x="506864" y="0"/>
+              </a:lnTo>
+            </a:path>
+          </a:pathLst>
+        </a:custGeom>
+        <a:noFill/>
+        <a:ln w="25400" cap="flat" cmpd="sng" algn="ctr">
+          <a:solidFill>
+            <a:schemeClr val="accent1">
+              <a:shade val="80000"/>
+              <a:hueOff val="0"/>
+              <a:satOff val="0"/>
+              <a:lumOff val="0"/>
+              <a:alphaOff val="0"/>
+            </a:schemeClr>
+          </a:solidFill>
+          <a:prstDash val="solid"/>
+        </a:ln>
+        <a:effectLst/>
+      </dsp:spPr>
+      <dsp:style>
+        <a:lnRef idx="2">
+          <a:scrgbClr r="0" g="0" b="0"/>
+        </a:lnRef>
+        <a:fillRef idx="0">
+          <a:scrgbClr r="0" g="0" b="0"/>
+        </a:fillRef>
+        <a:effectRef idx="0">
+          <a:scrgbClr r="0" g="0" b="0"/>
+        </a:effectRef>
+        <a:fontRef idx="minor"/>
+      </dsp:style>
+      <dsp:txBody>
+        <a:bodyPr spcFirstLastPara="0" vert="horz" wrap="square" lIns="12700" tIns="0" rIns="12700" bIns="0" numCol="1" spcCol="1270" anchor="ctr" anchorCtr="0">
+          <a:noAutofit/>
+        </a:bodyPr>
+        <a:lstStyle/>
+        <a:p>
+          <a:pPr lvl="0" algn="ctr" defTabSz="222250">
+            <a:lnSpc>
+              <a:spcPct val="90000"/>
+            </a:lnSpc>
+            <a:spcBef>
+              <a:spcPct val="0"/>
+            </a:spcBef>
+            <a:spcAft>
+              <a:spcPct val="35000"/>
+            </a:spcAft>
+          </a:pPr>
+          <a:endParaRPr lang="en-GB" sz="500" kern="1200"/>
+        </a:p>
+      </dsp:txBody>
+      <dsp:txXfrm>
+        <a:off x="4698262" y="1072348"/>
+        <a:ext cx="76742" cy="76742"/>
+      </dsp:txXfrm>
+    </dsp:sp>
+    <dsp:sp modelId="{76BB12F2-3AE3-42DF-A479-5F5DB6C9852C}">
+      <dsp:nvSpPr>
+        <dsp:cNvPr id="0" name=""/>
+        <dsp:cNvSpPr/>
+      </dsp:nvSpPr>
+      <dsp:spPr>
+        <a:xfrm>
+          <a:off x="1442011" y="1835088"/>
+          <a:ext cx="506864" cy="482912"/>
+        </a:xfrm>
+        <a:custGeom>
+          <a:avLst/>
+          <a:gdLst/>
+          <a:ahLst/>
+          <a:cxnLst/>
+          <a:rect l="0" t="0" r="0" b="0"/>
+          <a:pathLst>
+            <a:path>
+              <a:moveTo>
+                <a:pt x="0" y="482912"/>
+              </a:moveTo>
+              <a:lnTo>
+                <a:pt x="253432" y="482912"/>
+              </a:lnTo>
+              <a:lnTo>
+                <a:pt x="253432" y="0"/>
+              </a:lnTo>
+              <a:lnTo>
+                <a:pt x="506864" y="0"/>
+              </a:lnTo>
+            </a:path>
+          </a:pathLst>
+        </a:custGeom>
+        <a:noFill/>
+        <a:ln w="25400" cap="flat" cmpd="sng" algn="ctr">
+          <a:solidFill>
+            <a:schemeClr val="accent1">
+              <a:shade val="60000"/>
+              <a:hueOff val="0"/>
+              <a:satOff val="0"/>
+              <a:lumOff val="0"/>
+              <a:alphaOff val="0"/>
+            </a:schemeClr>
+          </a:solidFill>
+          <a:prstDash val="solid"/>
+        </a:ln>
+        <a:effectLst/>
+      </dsp:spPr>
+      <dsp:style>
+        <a:lnRef idx="2">
+          <a:scrgbClr r="0" g="0" b="0"/>
+        </a:lnRef>
+        <a:fillRef idx="0">
+          <a:scrgbClr r="0" g="0" b="0"/>
+        </a:fillRef>
+        <a:effectRef idx="0">
+          <a:scrgbClr r="0" g="0" b="0"/>
+        </a:effectRef>
+        <a:fontRef idx="minor"/>
+      </dsp:style>
+      <dsp:txBody>
+        <a:bodyPr spcFirstLastPara="0" vert="horz" wrap="square" lIns="12700" tIns="0" rIns="12700" bIns="0" numCol="1" spcCol="1270" anchor="ctr" anchorCtr="0">
+          <a:noAutofit/>
+        </a:bodyPr>
+        <a:lstStyle/>
+        <a:p>
+          <a:pPr lvl="0" algn="ctr" defTabSz="222250">
+            <a:lnSpc>
+              <a:spcPct val="90000"/>
+            </a:lnSpc>
+            <a:spcBef>
+              <a:spcPct val="0"/>
+            </a:spcBef>
+            <a:spcAft>
+              <a:spcPct val="35000"/>
+            </a:spcAft>
+          </a:pPr>
+          <a:endParaRPr lang="en-GB" sz="500" kern="1200"/>
+        </a:p>
+      </dsp:txBody>
+      <dsp:txXfrm>
+        <a:off x="1677941" y="2059042"/>
+        <a:ext cx="35004" cy="35004"/>
+      </dsp:txXfrm>
+    </dsp:sp>
+    <dsp:sp modelId="{FA24E170-A0A3-4F83-98CE-11DA8E19AC6F}">
+      <dsp:nvSpPr>
+        <dsp:cNvPr id="0" name=""/>
+        <dsp:cNvSpPr/>
+      </dsp:nvSpPr>
+      <dsp:spPr>
+        <a:xfrm rot="16200000">
+          <a:off x="-977634" y="1931671"/>
+          <a:ext cx="4066631" cy="772659"/>
+        </a:xfrm>
+        <a:prstGeom prst="rect">
+          <a:avLst/>
+        </a:prstGeom>
+        <a:solidFill>
+          <a:schemeClr val="accent1">
+            <a:hueOff val="0"/>
+            <a:satOff val="0"/>
+            <a:lumOff val="0"/>
+            <a:alphaOff val="0"/>
+          </a:schemeClr>
+        </a:solidFill>
+        <a:ln w="25400" cap="flat" cmpd="sng" algn="ctr">
+          <a:solidFill>
+            <a:schemeClr val="lt1">
+              <a:hueOff val="0"/>
+              <a:satOff val="0"/>
+              <a:lumOff val="0"/>
+              <a:alphaOff val="0"/>
+            </a:schemeClr>
+          </a:solidFill>
+          <a:prstDash val="solid"/>
+        </a:ln>
+        <a:effectLst/>
+      </dsp:spPr>
+      <dsp:style>
+        <a:lnRef idx="2">
+          <a:scrgbClr r="0" g="0" b="0"/>
+        </a:lnRef>
+        <a:fillRef idx="1">
+          <a:scrgbClr r="0" g="0" b="0"/>
+        </a:fillRef>
+        <a:effectRef idx="0">
+          <a:scrgbClr r="0" g="0" b="0"/>
+        </a:effectRef>
+        <a:fontRef idx="minor">
+          <a:schemeClr val="lt1"/>
+        </a:fontRef>
+      </dsp:style>
+      <dsp:txBody>
+        <a:bodyPr spcFirstLastPara="0" vert="horz" wrap="square" lIns="19050" tIns="19050" rIns="19050" bIns="19050" numCol="1" spcCol="1270" anchor="ctr" anchorCtr="0">
+          <a:noAutofit/>
+        </a:bodyPr>
+        <a:lstStyle/>
+        <a:p>
+          <a:pPr lvl="0" algn="ctr" defTabSz="1333500">
+            <a:lnSpc>
+              <a:spcPct val="90000"/>
+            </a:lnSpc>
+            <a:spcBef>
+              <a:spcPct val="0"/>
+            </a:spcBef>
+            <a:spcAft>
+              <a:spcPct val="35000"/>
+            </a:spcAft>
+          </a:pPr>
+          <a:r>
+            <a:rPr lang="en-GB" sz="3000" kern="1200" dirty="0" err="1" smtClean="0"/>
+            <a:t>KinectSensorCollection</a:t>
+          </a:r>
+          <a:endParaRPr lang="en-GB" sz="3000" kern="1200" dirty="0"/>
+        </a:p>
+      </dsp:txBody>
+      <dsp:txXfrm>
+        <a:off x="-977634" y="1931671"/>
+        <a:ext cx="4066631" cy="772659"/>
+      </dsp:txXfrm>
+    </dsp:sp>
+    <dsp:sp modelId="{2E2FE10D-F20C-495B-ACAF-EDB5CFBC0902}">
+      <dsp:nvSpPr>
+        <dsp:cNvPr id="0" name=""/>
+        <dsp:cNvSpPr/>
+      </dsp:nvSpPr>
+      <dsp:spPr>
+        <a:xfrm>
+          <a:off x="1948876" y="1448758"/>
+          <a:ext cx="2534324" cy="772659"/>
+        </a:xfrm>
+        <a:prstGeom prst="rect">
+          <a:avLst/>
+        </a:prstGeom>
+        <a:solidFill>
+          <a:schemeClr val="accent1">
+            <a:hueOff val="0"/>
+            <a:satOff val="0"/>
+            <a:lumOff val="0"/>
+            <a:alphaOff val="0"/>
+          </a:schemeClr>
+        </a:solidFill>
+        <a:ln w="25400" cap="flat" cmpd="sng" algn="ctr">
+          <a:solidFill>
+            <a:schemeClr val="lt1">
+              <a:hueOff val="0"/>
+              <a:satOff val="0"/>
+              <a:lumOff val="0"/>
+              <a:alphaOff val="0"/>
+            </a:schemeClr>
+          </a:solidFill>
+          <a:prstDash val="solid"/>
+        </a:ln>
+        <a:effectLst/>
+      </dsp:spPr>
+      <dsp:style>
+        <a:lnRef idx="2">
+          <a:scrgbClr r="0" g="0" b="0"/>
+        </a:lnRef>
+        <a:fillRef idx="1">
+          <a:scrgbClr r="0" g="0" b="0"/>
+        </a:fillRef>
+        <a:effectRef idx="0">
+          <a:scrgbClr r="0" g="0" b="0"/>
+        </a:effectRef>
+        <a:fontRef idx="minor">
+          <a:schemeClr val="lt1"/>
+        </a:fontRef>
+      </dsp:style>
+      <dsp:txBody>
+        <a:bodyPr spcFirstLastPara="0" vert="horz" wrap="square" lIns="17145" tIns="17145" rIns="17145" bIns="17145" numCol="1" spcCol="1270" anchor="ctr" anchorCtr="0">
+          <a:noAutofit/>
+        </a:bodyPr>
+        <a:lstStyle/>
+        <a:p>
+          <a:pPr lvl="0" algn="ctr" defTabSz="1200150">
+            <a:lnSpc>
+              <a:spcPct val="90000"/>
+            </a:lnSpc>
+            <a:spcBef>
+              <a:spcPct val="0"/>
+            </a:spcBef>
+            <a:spcAft>
+              <a:spcPct val="35000"/>
+            </a:spcAft>
+          </a:pPr>
+          <a:r>
+            <a:rPr lang="en-GB" sz="2700" kern="1200" dirty="0" err="1" smtClean="0"/>
+            <a:t>KinectSensor</a:t>
+          </a:r>
+          <a:endParaRPr lang="en-GB" sz="2700" kern="1200" dirty="0"/>
+        </a:p>
+      </dsp:txBody>
+      <dsp:txXfrm>
+        <a:off x="1948876" y="1448758"/>
+        <a:ext cx="2534324" cy="772659"/>
+      </dsp:txXfrm>
+    </dsp:sp>
+    <dsp:sp modelId="{4E60E23A-623F-4D56-862A-98A609C6FBF7}">
+      <dsp:nvSpPr>
+        <dsp:cNvPr id="0" name=""/>
+        <dsp:cNvSpPr/>
+      </dsp:nvSpPr>
+      <dsp:spPr>
+        <a:xfrm>
+          <a:off x="4990065" y="21"/>
+          <a:ext cx="2534324" cy="772659"/>
+        </a:xfrm>
+        <a:prstGeom prst="rect">
+          <a:avLst/>
+        </a:prstGeom>
+        <a:solidFill>
+          <a:schemeClr val="accent1">
+            <a:hueOff val="0"/>
+            <a:satOff val="0"/>
+            <a:lumOff val="0"/>
+            <a:alphaOff val="0"/>
+          </a:schemeClr>
+        </a:solidFill>
+        <a:ln w="25400" cap="flat" cmpd="sng" algn="ctr">
+          <a:solidFill>
+            <a:schemeClr val="lt1">
+              <a:hueOff val="0"/>
+              <a:satOff val="0"/>
+              <a:lumOff val="0"/>
+              <a:alphaOff val="0"/>
+            </a:schemeClr>
+          </a:solidFill>
+          <a:prstDash val="solid"/>
+        </a:ln>
+        <a:effectLst/>
+      </dsp:spPr>
+      <dsp:style>
+        <a:lnRef idx="2">
+          <a:scrgbClr r="0" g="0" b="0"/>
+        </a:lnRef>
+        <a:fillRef idx="1">
+          <a:scrgbClr r="0" g="0" b="0"/>
+        </a:fillRef>
+        <a:effectRef idx="0">
+          <a:scrgbClr r="0" g="0" b="0"/>
+        </a:effectRef>
+        <a:fontRef idx="minor">
+          <a:schemeClr val="lt1"/>
+        </a:fontRef>
+      </dsp:style>
+      <dsp:txBody>
+        <a:bodyPr spcFirstLastPara="0" vert="horz" wrap="square" lIns="17145" tIns="17145" rIns="17145" bIns="17145" numCol="1" spcCol="1270" anchor="ctr" anchorCtr="0">
+          <a:noAutofit/>
+        </a:bodyPr>
+        <a:lstStyle/>
+        <a:p>
+          <a:pPr lvl="0" algn="ctr" defTabSz="1200150">
+            <a:lnSpc>
+              <a:spcPct val="90000"/>
+            </a:lnSpc>
+            <a:spcBef>
+              <a:spcPct val="0"/>
+            </a:spcBef>
+            <a:spcAft>
+              <a:spcPct val="35000"/>
+            </a:spcAft>
+          </a:pPr>
+          <a:r>
+            <a:rPr lang="en-GB" sz="2700" kern="1200" dirty="0" smtClean="0"/>
+            <a:t>ColorStream</a:t>
+          </a:r>
+          <a:endParaRPr lang="en-GB" sz="2700" kern="1200" dirty="0"/>
+        </a:p>
+      </dsp:txBody>
+      <dsp:txXfrm>
+        <a:off x="4990065" y="21"/>
+        <a:ext cx="2534324" cy="772659"/>
+      </dsp:txXfrm>
+    </dsp:sp>
+    <dsp:sp modelId="{3EEC6F6A-9421-417D-A692-4B64D4E3E11D}">
+      <dsp:nvSpPr>
+        <dsp:cNvPr id="0" name=""/>
+        <dsp:cNvSpPr/>
+      </dsp:nvSpPr>
+      <dsp:spPr>
+        <a:xfrm>
+          <a:off x="4990065" y="965846"/>
+          <a:ext cx="2534324" cy="772659"/>
+        </a:xfrm>
+        <a:prstGeom prst="rect">
+          <a:avLst/>
+        </a:prstGeom>
+        <a:solidFill>
+          <a:schemeClr val="accent1">
+            <a:hueOff val="0"/>
+            <a:satOff val="0"/>
+            <a:lumOff val="0"/>
+            <a:alphaOff val="0"/>
+          </a:schemeClr>
+        </a:solidFill>
+        <a:ln w="25400" cap="flat" cmpd="sng" algn="ctr">
+          <a:solidFill>
+            <a:schemeClr val="lt1">
+              <a:hueOff val="0"/>
+              <a:satOff val="0"/>
+              <a:lumOff val="0"/>
+              <a:alphaOff val="0"/>
+            </a:schemeClr>
+          </a:solidFill>
+          <a:prstDash val="solid"/>
+        </a:ln>
+        <a:effectLst/>
+      </dsp:spPr>
+      <dsp:style>
+        <a:lnRef idx="2">
+          <a:scrgbClr r="0" g="0" b="0"/>
+        </a:lnRef>
+        <a:fillRef idx="1">
+          <a:scrgbClr r="0" g="0" b="0"/>
+        </a:fillRef>
+        <a:effectRef idx="0">
+          <a:scrgbClr r="0" g="0" b="0"/>
+        </a:effectRef>
+        <a:fontRef idx="minor">
+          <a:schemeClr val="lt1"/>
+        </a:fontRef>
+      </dsp:style>
+      <dsp:txBody>
+        <a:bodyPr spcFirstLastPara="0" vert="horz" wrap="square" lIns="17145" tIns="17145" rIns="17145" bIns="17145" numCol="1" spcCol="1270" anchor="ctr" anchorCtr="0">
+          <a:noAutofit/>
+        </a:bodyPr>
+        <a:lstStyle/>
+        <a:p>
+          <a:pPr lvl="0" algn="ctr" defTabSz="1200150">
+            <a:lnSpc>
+              <a:spcPct val="90000"/>
+            </a:lnSpc>
+            <a:spcBef>
+              <a:spcPct val="0"/>
+            </a:spcBef>
+            <a:spcAft>
+              <a:spcPct val="35000"/>
+            </a:spcAft>
+          </a:pPr>
+          <a:r>
+            <a:rPr lang="en-GB" sz="2700" kern="1200" dirty="0" err="1" smtClean="0"/>
+            <a:t>DepthStream</a:t>
+          </a:r>
+          <a:endParaRPr lang="en-GB" sz="2700" kern="1200" dirty="0"/>
+        </a:p>
+      </dsp:txBody>
+      <dsp:txXfrm>
+        <a:off x="4990065" y="965846"/>
+        <a:ext cx="2534324" cy="772659"/>
+      </dsp:txXfrm>
+    </dsp:sp>
+    <dsp:sp modelId="{A9DA000B-3124-4DB5-807C-C005A19529B0}">
+      <dsp:nvSpPr>
+        <dsp:cNvPr id="0" name=""/>
+        <dsp:cNvSpPr/>
+      </dsp:nvSpPr>
+      <dsp:spPr>
+        <a:xfrm>
+          <a:off x="4990065" y="1931671"/>
+          <a:ext cx="2534324" cy="772659"/>
+        </a:xfrm>
+        <a:prstGeom prst="rect">
+          <a:avLst/>
+        </a:prstGeom>
+        <a:solidFill>
+          <a:schemeClr val="accent1">
+            <a:hueOff val="0"/>
+            <a:satOff val="0"/>
+            <a:lumOff val="0"/>
+            <a:alphaOff val="0"/>
+          </a:schemeClr>
+        </a:solidFill>
+        <a:ln w="25400" cap="flat" cmpd="sng" algn="ctr">
+          <a:solidFill>
+            <a:schemeClr val="lt1">
+              <a:hueOff val="0"/>
+              <a:satOff val="0"/>
+              <a:lumOff val="0"/>
+              <a:alphaOff val="0"/>
+            </a:schemeClr>
+          </a:solidFill>
+          <a:prstDash val="solid"/>
+        </a:ln>
+        <a:effectLst/>
+      </dsp:spPr>
+      <dsp:style>
+        <a:lnRef idx="2">
+          <a:scrgbClr r="0" g="0" b="0"/>
+        </a:lnRef>
+        <a:fillRef idx="1">
+          <a:scrgbClr r="0" g="0" b="0"/>
+        </a:fillRef>
+        <a:effectRef idx="0">
+          <a:scrgbClr r="0" g="0" b="0"/>
+        </a:effectRef>
+        <a:fontRef idx="minor">
+          <a:schemeClr val="lt1"/>
+        </a:fontRef>
+      </dsp:style>
+      <dsp:txBody>
+        <a:bodyPr spcFirstLastPara="0" vert="horz" wrap="square" lIns="17145" tIns="17145" rIns="17145" bIns="17145" numCol="1" spcCol="1270" anchor="ctr" anchorCtr="0">
+          <a:noAutofit/>
+        </a:bodyPr>
+        <a:lstStyle/>
+        <a:p>
+          <a:pPr lvl="0" algn="ctr" defTabSz="1200150">
+            <a:lnSpc>
+              <a:spcPct val="90000"/>
+            </a:lnSpc>
+            <a:spcBef>
+              <a:spcPct val="0"/>
+            </a:spcBef>
+            <a:spcAft>
+              <a:spcPct val="35000"/>
+            </a:spcAft>
+          </a:pPr>
+          <a:r>
+            <a:rPr lang="en-GB" sz="2700" kern="1200" dirty="0" err="1" smtClean="0"/>
+            <a:t>SkeletonStream</a:t>
+          </a:r>
+          <a:endParaRPr lang="en-GB" sz="2700" kern="1200" dirty="0" smtClean="0"/>
+        </a:p>
+      </dsp:txBody>
+      <dsp:txXfrm>
+        <a:off x="4990065" y="1931671"/>
+        <a:ext cx="2534324" cy="772659"/>
+      </dsp:txXfrm>
+    </dsp:sp>
+    <dsp:sp modelId="{9D88EFF1-E955-4894-BDDE-D93E7A2D5317}">
+      <dsp:nvSpPr>
+        <dsp:cNvPr id="0" name=""/>
+        <dsp:cNvSpPr/>
+      </dsp:nvSpPr>
+      <dsp:spPr>
+        <a:xfrm>
+          <a:off x="4990065" y="2897496"/>
+          <a:ext cx="2534324" cy="772659"/>
+        </a:xfrm>
+        <a:prstGeom prst="rect">
+          <a:avLst/>
+        </a:prstGeom>
+        <a:solidFill>
+          <a:schemeClr val="accent1">
+            <a:hueOff val="0"/>
+            <a:satOff val="0"/>
+            <a:lumOff val="0"/>
+            <a:alphaOff val="0"/>
+          </a:schemeClr>
+        </a:solidFill>
+        <a:ln w="25400" cap="flat" cmpd="sng" algn="ctr">
+          <a:solidFill>
+            <a:schemeClr val="lt1">
+              <a:hueOff val="0"/>
+              <a:satOff val="0"/>
+              <a:lumOff val="0"/>
+              <a:alphaOff val="0"/>
+            </a:schemeClr>
+          </a:solidFill>
+          <a:prstDash val="solid"/>
+        </a:ln>
+        <a:effectLst/>
+      </dsp:spPr>
+      <dsp:style>
+        <a:lnRef idx="2">
+          <a:scrgbClr r="0" g="0" b="0"/>
+        </a:lnRef>
+        <a:fillRef idx="1">
+          <a:scrgbClr r="0" g="0" b="0"/>
+        </a:fillRef>
+        <a:effectRef idx="0">
+          <a:scrgbClr r="0" g="0" b="0"/>
+        </a:effectRef>
+        <a:fontRef idx="minor">
+          <a:schemeClr val="lt1"/>
+        </a:fontRef>
+      </dsp:style>
+      <dsp:txBody>
+        <a:bodyPr spcFirstLastPara="0" vert="horz" wrap="square" lIns="17145" tIns="17145" rIns="17145" bIns="17145" numCol="1" spcCol="1270" anchor="ctr" anchorCtr="0">
+          <a:noAutofit/>
+        </a:bodyPr>
+        <a:lstStyle/>
+        <a:p>
+          <a:pPr lvl="0" algn="ctr" defTabSz="1200150">
+            <a:lnSpc>
+              <a:spcPct val="90000"/>
+            </a:lnSpc>
+            <a:spcBef>
+              <a:spcPct val="0"/>
+            </a:spcBef>
+            <a:spcAft>
+              <a:spcPct val="35000"/>
+            </a:spcAft>
+          </a:pPr>
+          <a:r>
+            <a:rPr lang="en-GB" sz="2700" kern="1200" smtClean="0"/>
+            <a:t>AudioSource</a:t>
+          </a:r>
+          <a:endParaRPr lang="en-GB" sz="2700" kern="1200" dirty="0" smtClean="0"/>
+        </a:p>
+      </dsp:txBody>
+      <dsp:txXfrm>
+        <a:off x="4990065" y="2897496"/>
+        <a:ext cx="2534324" cy="772659"/>
+      </dsp:txXfrm>
+    </dsp:sp>
+    <dsp:sp modelId="{44054F06-BA03-4F2B-9BE6-65E51AB622EB}">
+      <dsp:nvSpPr>
+        <dsp:cNvPr id="0" name=""/>
+        <dsp:cNvSpPr/>
+      </dsp:nvSpPr>
+      <dsp:spPr>
+        <a:xfrm>
+          <a:off x="1948876" y="2414583"/>
+          <a:ext cx="2534324" cy="772659"/>
+        </a:xfrm>
+        <a:prstGeom prst="rect">
+          <a:avLst/>
+        </a:prstGeom>
+        <a:solidFill>
+          <a:schemeClr val="accent1">
+            <a:hueOff val="0"/>
+            <a:satOff val="0"/>
+            <a:lumOff val="0"/>
+            <a:alphaOff val="0"/>
+          </a:schemeClr>
+        </a:solidFill>
+        <a:ln w="25400" cap="flat" cmpd="sng" algn="ctr">
+          <a:solidFill>
+            <a:schemeClr val="lt1">
+              <a:hueOff val="0"/>
+              <a:satOff val="0"/>
+              <a:lumOff val="0"/>
+              <a:alphaOff val="0"/>
+            </a:schemeClr>
+          </a:solidFill>
+          <a:prstDash val="solid"/>
+        </a:ln>
+        <a:effectLst/>
+      </dsp:spPr>
+      <dsp:style>
+        <a:lnRef idx="2">
+          <a:scrgbClr r="0" g="0" b="0"/>
+        </a:lnRef>
+        <a:fillRef idx="1">
+          <a:scrgbClr r="0" g="0" b="0"/>
+        </a:fillRef>
+        <a:effectRef idx="0">
+          <a:scrgbClr r="0" g="0" b="0"/>
+        </a:effectRef>
+        <a:fontRef idx="minor">
+          <a:schemeClr val="lt1"/>
+        </a:fontRef>
+      </dsp:style>
+      <dsp:txBody>
+        <a:bodyPr spcFirstLastPara="0" vert="horz" wrap="square" lIns="17145" tIns="17145" rIns="17145" bIns="17145" numCol="1" spcCol="1270" anchor="ctr" anchorCtr="0">
+          <a:noAutofit/>
+        </a:bodyPr>
+        <a:lstStyle/>
+        <a:p>
+          <a:pPr lvl="0" algn="ctr" defTabSz="1200150">
+            <a:lnSpc>
+              <a:spcPct val="90000"/>
+            </a:lnSpc>
+            <a:spcBef>
+              <a:spcPct val="0"/>
+            </a:spcBef>
+            <a:spcAft>
+              <a:spcPct val="35000"/>
+            </a:spcAft>
+          </a:pPr>
+          <a:r>
+            <a:rPr lang="en-GB" sz="2700" kern="1200" dirty="0" err="1" smtClean="0"/>
+            <a:t>KinectSensor</a:t>
+          </a:r>
+          <a:endParaRPr lang="en-GB" sz="2700" kern="1200" dirty="0"/>
+        </a:p>
+      </dsp:txBody>
+      <dsp:txXfrm>
+        <a:off x="1948876" y="2414583"/>
+        <a:ext cx="2534324" cy="772659"/>
+      </dsp:txXfrm>
+    </dsp:sp>
   </dsp:spTree>
 </dsp:drawing>
 </file>
@@ -3172,6 +4222,1375 @@
       <dsp:cNvGrpSpPr/>
     </dsp:nvGrpSpPr>
     <dsp:grpSpPr/>
+    <dsp:sp modelId="{7F643089-6469-430C-9825-2C08B5D3ACC9}">
+      <dsp:nvSpPr>
+        <dsp:cNvPr id="0" name=""/>
+        <dsp:cNvSpPr/>
+      </dsp:nvSpPr>
+      <dsp:spPr>
+        <a:xfrm>
+          <a:off x="522225" y="2271151"/>
+          <a:ext cx="340028" cy="323960"/>
+        </a:xfrm>
+        <a:custGeom>
+          <a:avLst/>
+          <a:gdLst/>
+          <a:ahLst/>
+          <a:cxnLst/>
+          <a:rect l="0" t="0" r="0" b="0"/>
+          <a:pathLst>
+            <a:path>
+              <a:moveTo>
+                <a:pt x="0" y="0"/>
+              </a:moveTo>
+              <a:lnTo>
+                <a:pt x="170014" y="0"/>
+              </a:lnTo>
+              <a:lnTo>
+                <a:pt x="170014" y="323960"/>
+              </a:lnTo>
+              <a:lnTo>
+                <a:pt x="340028" y="323960"/>
+              </a:lnTo>
+            </a:path>
+          </a:pathLst>
+        </a:custGeom>
+        <a:noFill/>
+        <a:ln w="25400" cap="flat" cmpd="sng" algn="ctr">
+          <a:solidFill>
+            <a:schemeClr val="accent1">
+              <a:shade val="60000"/>
+              <a:hueOff val="0"/>
+              <a:satOff val="0"/>
+              <a:lumOff val="0"/>
+              <a:alphaOff val="0"/>
+            </a:schemeClr>
+          </a:solidFill>
+          <a:prstDash val="solid"/>
+        </a:ln>
+        <a:effectLst/>
+      </dsp:spPr>
+      <dsp:style>
+        <a:lnRef idx="2">
+          <a:scrgbClr r="0" g="0" b="0"/>
+        </a:lnRef>
+        <a:fillRef idx="0">
+          <a:scrgbClr r="0" g="0" b="0"/>
+        </a:fillRef>
+        <a:effectRef idx="0">
+          <a:scrgbClr r="0" g="0" b="0"/>
+        </a:effectRef>
+        <a:fontRef idx="minor"/>
+      </dsp:style>
+      <dsp:txBody>
+        <a:bodyPr spcFirstLastPara="0" vert="horz" wrap="square" lIns="12700" tIns="0" rIns="12700" bIns="0" numCol="1" spcCol="1270" anchor="ctr" anchorCtr="0">
+          <a:noAutofit/>
+        </a:bodyPr>
+        <a:lstStyle/>
+        <a:p>
+          <a:pPr lvl="0" algn="ctr" defTabSz="222250">
+            <a:lnSpc>
+              <a:spcPct val="90000"/>
+            </a:lnSpc>
+            <a:spcBef>
+              <a:spcPct val="0"/>
+            </a:spcBef>
+            <a:spcAft>
+              <a:spcPct val="35000"/>
+            </a:spcAft>
+          </a:pPr>
+          <a:endParaRPr lang="en-GB" sz="500" kern="1200"/>
+        </a:p>
+      </dsp:txBody>
+      <dsp:txXfrm>
+        <a:off x="680499" y="2421390"/>
+        <a:ext cx="23482" cy="23482"/>
+      </dsp:txXfrm>
+    </dsp:sp>
+    <dsp:sp modelId="{21CA0C30-08D6-48C7-A620-502125517B71}">
+      <dsp:nvSpPr>
+        <dsp:cNvPr id="0" name=""/>
+        <dsp:cNvSpPr/>
+      </dsp:nvSpPr>
+      <dsp:spPr>
+        <a:xfrm>
+          <a:off x="4602568" y="1947191"/>
+          <a:ext cx="340028" cy="647920"/>
+        </a:xfrm>
+        <a:custGeom>
+          <a:avLst/>
+          <a:gdLst/>
+          <a:ahLst/>
+          <a:cxnLst/>
+          <a:rect l="0" t="0" r="0" b="0"/>
+          <a:pathLst>
+            <a:path>
+              <a:moveTo>
+                <a:pt x="0" y="0"/>
+              </a:moveTo>
+              <a:lnTo>
+                <a:pt x="170014" y="0"/>
+              </a:lnTo>
+              <a:lnTo>
+                <a:pt x="170014" y="647920"/>
+              </a:lnTo>
+              <a:lnTo>
+                <a:pt x="340028" y="647920"/>
+              </a:lnTo>
+            </a:path>
+          </a:pathLst>
+        </a:custGeom>
+        <a:noFill/>
+        <a:ln w="25400" cap="flat" cmpd="sng" algn="ctr">
+          <a:solidFill>
+            <a:schemeClr val="accent1">
+              <a:shade val="80000"/>
+              <a:hueOff val="0"/>
+              <a:satOff val="0"/>
+              <a:lumOff val="0"/>
+              <a:alphaOff val="0"/>
+            </a:schemeClr>
+          </a:solidFill>
+          <a:prstDash val="solid"/>
+        </a:ln>
+        <a:effectLst/>
+      </dsp:spPr>
+      <dsp:style>
+        <a:lnRef idx="2">
+          <a:scrgbClr r="0" g="0" b="0"/>
+        </a:lnRef>
+        <a:fillRef idx="0">
+          <a:scrgbClr r="0" g="0" b="0"/>
+        </a:fillRef>
+        <a:effectRef idx="0">
+          <a:scrgbClr r="0" g="0" b="0"/>
+        </a:effectRef>
+        <a:fontRef idx="minor"/>
+      </dsp:style>
+      <dsp:txBody>
+        <a:bodyPr spcFirstLastPara="0" vert="horz" wrap="square" lIns="12700" tIns="0" rIns="12700" bIns="0" numCol="1" spcCol="1270" anchor="ctr" anchorCtr="0">
+          <a:noAutofit/>
+        </a:bodyPr>
+        <a:lstStyle/>
+        <a:p>
+          <a:pPr lvl="0" algn="ctr" defTabSz="222250">
+            <a:lnSpc>
+              <a:spcPct val="90000"/>
+            </a:lnSpc>
+            <a:spcBef>
+              <a:spcPct val="0"/>
+            </a:spcBef>
+            <a:spcAft>
+              <a:spcPct val="35000"/>
+            </a:spcAft>
+          </a:pPr>
+          <a:endParaRPr lang="en-GB" sz="500" kern="1200"/>
+        </a:p>
+      </dsp:txBody>
+      <dsp:txXfrm>
+        <a:off x="4754289" y="2252858"/>
+        <a:ext cx="36586" cy="36586"/>
+      </dsp:txXfrm>
+    </dsp:sp>
+    <dsp:sp modelId="{0BB23B30-A573-470E-9231-5E4B0A21E095}">
+      <dsp:nvSpPr>
+        <dsp:cNvPr id="0" name=""/>
+        <dsp:cNvSpPr/>
+      </dsp:nvSpPr>
+      <dsp:spPr>
+        <a:xfrm>
+          <a:off x="4602568" y="1901471"/>
+          <a:ext cx="340028" cy="91440"/>
+        </a:xfrm>
+        <a:custGeom>
+          <a:avLst/>
+          <a:gdLst/>
+          <a:ahLst/>
+          <a:cxnLst/>
+          <a:rect l="0" t="0" r="0" b="0"/>
+          <a:pathLst>
+            <a:path>
+              <a:moveTo>
+                <a:pt x="0" y="45720"/>
+              </a:moveTo>
+              <a:lnTo>
+                <a:pt x="340028" y="45720"/>
+              </a:lnTo>
+            </a:path>
+          </a:pathLst>
+        </a:custGeom>
+        <a:noFill/>
+        <a:ln w="25400" cap="flat" cmpd="sng" algn="ctr">
+          <a:solidFill>
+            <a:schemeClr val="accent1">
+              <a:shade val="80000"/>
+              <a:hueOff val="0"/>
+              <a:satOff val="0"/>
+              <a:lumOff val="0"/>
+              <a:alphaOff val="0"/>
+            </a:schemeClr>
+          </a:solidFill>
+          <a:prstDash val="solid"/>
+        </a:ln>
+        <a:effectLst/>
+      </dsp:spPr>
+      <dsp:style>
+        <a:lnRef idx="2">
+          <a:scrgbClr r="0" g="0" b="0"/>
+        </a:lnRef>
+        <a:fillRef idx="0">
+          <a:scrgbClr r="0" g="0" b="0"/>
+        </a:fillRef>
+        <a:effectRef idx="0">
+          <a:scrgbClr r="0" g="0" b="0"/>
+        </a:effectRef>
+        <a:fontRef idx="minor"/>
+      </dsp:style>
+      <dsp:txBody>
+        <a:bodyPr spcFirstLastPara="0" vert="horz" wrap="square" lIns="12700" tIns="0" rIns="12700" bIns="0" numCol="1" spcCol="1270" anchor="ctr" anchorCtr="0">
+          <a:noAutofit/>
+        </a:bodyPr>
+        <a:lstStyle/>
+        <a:p>
+          <a:pPr lvl="0" algn="ctr" defTabSz="222250">
+            <a:lnSpc>
+              <a:spcPct val="90000"/>
+            </a:lnSpc>
+            <a:spcBef>
+              <a:spcPct val="0"/>
+            </a:spcBef>
+            <a:spcAft>
+              <a:spcPct val="35000"/>
+            </a:spcAft>
+          </a:pPr>
+          <a:endParaRPr lang="en-GB" sz="500" kern="1200"/>
+        </a:p>
+      </dsp:txBody>
+      <dsp:txXfrm>
+        <a:off x="4764081" y="1938691"/>
+        <a:ext cx="17001" cy="17001"/>
+      </dsp:txXfrm>
+    </dsp:sp>
+    <dsp:sp modelId="{D058330C-637B-4FBE-A0F2-D2946C5536E1}">
+      <dsp:nvSpPr>
+        <dsp:cNvPr id="0" name=""/>
+        <dsp:cNvSpPr/>
+      </dsp:nvSpPr>
+      <dsp:spPr>
+        <a:xfrm>
+          <a:off x="6642739" y="1299271"/>
+          <a:ext cx="340028" cy="323960"/>
+        </a:xfrm>
+        <a:custGeom>
+          <a:avLst/>
+          <a:gdLst/>
+          <a:ahLst/>
+          <a:cxnLst/>
+          <a:rect l="0" t="0" r="0" b="0"/>
+          <a:pathLst>
+            <a:path>
+              <a:moveTo>
+                <a:pt x="0" y="0"/>
+              </a:moveTo>
+              <a:lnTo>
+                <a:pt x="170014" y="0"/>
+              </a:lnTo>
+              <a:lnTo>
+                <a:pt x="170014" y="323960"/>
+              </a:lnTo>
+              <a:lnTo>
+                <a:pt x="340028" y="323960"/>
+              </a:lnTo>
+            </a:path>
+          </a:pathLst>
+        </a:custGeom>
+        <a:noFill/>
+        <a:ln w="25400" cap="flat" cmpd="sng" algn="ctr">
+          <a:solidFill>
+            <a:schemeClr val="accent1">
+              <a:shade val="80000"/>
+              <a:hueOff val="0"/>
+              <a:satOff val="0"/>
+              <a:lumOff val="0"/>
+              <a:alphaOff val="0"/>
+            </a:schemeClr>
+          </a:solidFill>
+          <a:prstDash val="solid"/>
+        </a:ln>
+        <a:effectLst/>
+      </dsp:spPr>
+      <dsp:style>
+        <a:lnRef idx="2">
+          <a:scrgbClr r="0" g="0" b="0"/>
+        </a:lnRef>
+        <a:fillRef idx="0">
+          <a:scrgbClr r="0" g="0" b="0"/>
+        </a:fillRef>
+        <a:effectRef idx="0">
+          <a:scrgbClr r="0" g="0" b="0"/>
+        </a:effectRef>
+        <a:fontRef idx="minor"/>
+      </dsp:style>
+      <dsp:txBody>
+        <a:bodyPr spcFirstLastPara="0" vert="horz" wrap="square" lIns="12700" tIns="0" rIns="12700" bIns="0" numCol="1" spcCol="1270" anchor="ctr" anchorCtr="0">
+          <a:noAutofit/>
+        </a:bodyPr>
+        <a:lstStyle/>
+        <a:p>
+          <a:pPr lvl="0" algn="ctr" defTabSz="222250">
+            <a:lnSpc>
+              <a:spcPct val="90000"/>
+            </a:lnSpc>
+            <a:spcBef>
+              <a:spcPct val="0"/>
+            </a:spcBef>
+            <a:spcAft>
+              <a:spcPct val="35000"/>
+            </a:spcAft>
+          </a:pPr>
+          <a:endParaRPr lang="en-GB" sz="500" kern="1200"/>
+        </a:p>
+      </dsp:txBody>
+      <dsp:txXfrm>
+        <a:off x="6801012" y="1449510"/>
+        <a:ext cx="23482" cy="23482"/>
+      </dsp:txXfrm>
+    </dsp:sp>
+    <dsp:sp modelId="{27A01B87-38E6-4E4D-8C28-AFD8884C6951}">
+      <dsp:nvSpPr>
+        <dsp:cNvPr id="0" name=""/>
+        <dsp:cNvSpPr/>
+      </dsp:nvSpPr>
+      <dsp:spPr>
+        <a:xfrm>
+          <a:off x="6642739" y="975311"/>
+          <a:ext cx="340028" cy="323960"/>
+        </a:xfrm>
+        <a:custGeom>
+          <a:avLst/>
+          <a:gdLst/>
+          <a:ahLst/>
+          <a:cxnLst/>
+          <a:rect l="0" t="0" r="0" b="0"/>
+          <a:pathLst>
+            <a:path>
+              <a:moveTo>
+                <a:pt x="0" y="323960"/>
+              </a:moveTo>
+              <a:lnTo>
+                <a:pt x="170014" y="323960"/>
+              </a:lnTo>
+              <a:lnTo>
+                <a:pt x="170014" y="0"/>
+              </a:lnTo>
+              <a:lnTo>
+                <a:pt x="340028" y="0"/>
+              </a:lnTo>
+            </a:path>
+          </a:pathLst>
+        </a:custGeom>
+        <a:noFill/>
+        <a:ln w="25400" cap="flat" cmpd="sng" algn="ctr">
+          <a:solidFill>
+            <a:schemeClr val="accent1">
+              <a:shade val="80000"/>
+              <a:hueOff val="0"/>
+              <a:satOff val="0"/>
+              <a:lumOff val="0"/>
+              <a:alphaOff val="0"/>
+            </a:schemeClr>
+          </a:solidFill>
+          <a:prstDash val="solid"/>
+        </a:ln>
+        <a:effectLst/>
+      </dsp:spPr>
+      <dsp:style>
+        <a:lnRef idx="2">
+          <a:scrgbClr r="0" g="0" b="0"/>
+        </a:lnRef>
+        <a:fillRef idx="0">
+          <a:scrgbClr r="0" g="0" b="0"/>
+        </a:fillRef>
+        <a:effectRef idx="0">
+          <a:scrgbClr r="0" g="0" b="0"/>
+        </a:effectRef>
+        <a:fontRef idx="minor"/>
+      </dsp:style>
+      <dsp:txBody>
+        <a:bodyPr spcFirstLastPara="0" vert="horz" wrap="square" lIns="12700" tIns="0" rIns="12700" bIns="0" numCol="1" spcCol="1270" anchor="ctr" anchorCtr="0">
+          <a:noAutofit/>
+        </a:bodyPr>
+        <a:lstStyle/>
+        <a:p>
+          <a:pPr lvl="0" algn="ctr" defTabSz="222250">
+            <a:lnSpc>
+              <a:spcPct val="90000"/>
+            </a:lnSpc>
+            <a:spcBef>
+              <a:spcPct val="0"/>
+            </a:spcBef>
+            <a:spcAft>
+              <a:spcPct val="35000"/>
+            </a:spcAft>
+          </a:pPr>
+          <a:endParaRPr lang="en-GB" sz="500" kern="1200"/>
+        </a:p>
+      </dsp:txBody>
+      <dsp:txXfrm>
+        <a:off x="6801012" y="1125550"/>
+        <a:ext cx="23482" cy="23482"/>
+      </dsp:txXfrm>
+    </dsp:sp>
+    <dsp:sp modelId="{19B96C5C-0F70-4740-85D0-073D8D74D664}">
+      <dsp:nvSpPr>
+        <dsp:cNvPr id="0" name=""/>
+        <dsp:cNvSpPr/>
+      </dsp:nvSpPr>
+      <dsp:spPr>
+        <a:xfrm>
+          <a:off x="4602568" y="1299271"/>
+          <a:ext cx="340028" cy="647920"/>
+        </a:xfrm>
+        <a:custGeom>
+          <a:avLst/>
+          <a:gdLst/>
+          <a:ahLst/>
+          <a:cxnLst/>
+          <a:rect l="0" t="0" r="0" b="0"/>
+          <a:pathLst>
+            <a:path>
+              <a:moveTo>
+                <a:pt x="0" y="647920"/>
+              </a:moveTo>
+              <a:lnTo>
+                <a:pt x="170014" y="647920"/>
+              </a:lnTo>
+              <a:lnTo>
+                <a:pt x="170014" y="0"/>
+              </a:lnTo>
+              <a:lnTo>
+                <a:pt x="340028" y="0"/>
+              </a:lnTo>
+            </a:path>
+          </a:pathLst>
+        </a:custGeom>
+        <a:noFill/>
+        <a:ln w="25400" cap="flat" cmpd="sng" algn="ctr">
+          <a:solidFill>
+            <a:schemeClr val="accent1">
+              <a:shade val="80000"/>
+              <a:hueOff val="0"/>
+              <a:satOff val="0"/>
+              <a:lumOff val="0"/>
+              <a:alphaOff val="0"/>
+            </a:schemeClr>
+          </a:solidFill>
+          <a:prstDash val="solid"/>
+        </a:ln>
+        <a:effectLst/>
+      </dsp:spPr>
+      <dsp:style>
+        <a:lnRef idx="2">
+          <a:scrgbClr r="0" g="0" b="0"/>
+        </a:lnRef>
+        <a:fillRef idx="0">
+          <a:scrgbClr r="0" g="0" b="0"/>
+        </a:fillRef>
+        <a:effectRef idx="0">
+          <a:scrgbClr r="0" g="0" b="0"/>
+        </a:effectRef>
+        <a:fontRef idx="minor"/>
+      </dsp:style>
+      <dsp:txBody>
+        <a:bodyPr spcFirstLastPara="0" vert="horz" wrap="square" lIns="12700" tIns="0" rIns="12700" bIns="0" numCol="1" spcCol="1270" anchor="ctr" anchorCtr="0">
+          <a:noAutofit/>
+        </a:bodyPr>
+        <a:lstStyle/>
+        <a:p>
+          <a:pPr lvl="0" algn="ctr" defTabSz="222250">
+            <a:lnSpc>
+              <a:spcPct val="90000"/>
+            </a:lnSpc>
+            <a:spcBef>
+              <a:spcPct val="0"/>
+            </a:spcBef>
+            <a:spcAft>
+              <a:spcPct val="35000"/>
+            </a:spcAft>
+          </a:pPr>
+          <a:endParaRPr lang="en-GB" sz="500" kern="1200"/>
+        </a:p>
+      </dsp:txBody>
+      <dsp:txXfrm>
+        <a:off x="4754289" y="1604938"/>
+        <a:ext cx="36586" cy="36586"/>
+      </dsp:txXfrm>
+    </dsp:sp>
+    <dsp:sp modelId="{5C72FA64-B834-4714-8F6A-E0503A02C6C5}">
+      <dsp:nvSpPr>
+        <dsp:cNvPr id="0" name=""/>
+        <dsp:cNvSpPr/>
+      </dsp:nvSpPr>
+      <dsp:spPr>
+        <a:xfrm>
+          <a:off x="2562397" y="1901471"/>
+          <a:ext cx="340028" cy="91440"/>
+        </a:xfrm>
+        <a:custGeom>
+          <a:avLst/>
+          <a:gdLst/>
+          <a:ahLst/>
+          <a:cxnLst/>
+          <a:rect l="0" t="0" r="0" b="0"/>
+          <a:pathLst>
+            <a:path>
+              <a:moveTo>
+                <a:pt x="0" y="45720"/>
+              </a:moveTo>
+              <a:lnTo>
+                <a:pt x="340028" y="45720"/>
+              </a:lnTo>
+            </a:path>
+          </a:pathLst>
+        </a:custGeom>
+        <a:noFill/>
+        <a:ln w="25400" cap="flat" cmpd="sng" algn="ctr">
+          <a:solidFill>
+            <a:schemeClr val="accent1">
+              <a:shade val="80000"/>
+              <a:hueOff val="0"/>
+              <a:satOff val="0"/>
+              <a:lumOff val="0"/>
+              <a:alphaOff val="0"/>
+            </a:schemeClr>
+          </a:solidFill>
+          <a:prstDash val="solid"/>
+        </a:ln>
+        <a:effectLst/>
+      </dsp:spPr>
+      <dsp:style>
+        <a:lnRef idx="2">
+          <a:scrgbClr r="0" g="0" b="0"/>
+        </a:lnRef>
+        <a:fillRef idx="0">
+          <a:scrgbClr r="0" g="0" b="0"/>
+        </a:fillRef>
+        <a:effectRef idx="0">
+          <a:scrgbClr r="0" g="0" b="0"/>
+        </a:effectRef>
+        <a:fontRef idx="minor"/>
+      </dsp:style>
+      <dsp:txBody>
+        <a:bodyPr spcFirstLastPara="0" vert="horz" wrap="square" lIns="12700" tIns="0" rIns="12700" bIns="0" numCol="1" spcCol="1270" anchor="ctr" anchorCtr="0">
+          <a:noAutofit/>
+        </a:bodyPr>
+        <a:lstStyle/>
+        <a:p>
+          <a:pPr lvl="0" algn="ctr" defTabSz="222250">
+            <a:lnSpc>
+              <a:spcPct val="90000"/>
+            </a:lnSpc>
+            <a:spcBef>
+              <a:spcPct val="0"/>
+            </a:spcBef>
+            <a:spcAft>
+              <a:spcPct val="35000"/>
+            </a:spcAft>
+          </a:pPr>
+          <a:endParaRPr lang="en-GB" sz="500" kern="1200"/>
+        </a:p>
+      </dsp:txBody>
+      <dsp:txXfrm>
+        <a:off x="2723910" y="1938691"/>
+        <a:ext cx="17001" cy="17001"/>
+      </dsp:txXfrm>
+    </dsp:sp>
+    <dsp:sp modelId="{527CFB76-F6DD-4E24-A590-9648F746A015}">
+      <dsp:nvSpPr>
+        <dsp:cNvPr id="0" name=""/>
+        <dsp:cNvSpPr/>
+      </dsp:nvSpPr>
+      <dsp:spPr>
+        <a:xfrm>
+          <a:off x="522225" y="1947191"/>
+          <a:ext cx="340028" cy="323960"/>
+        </a:xfrm>
+        <a:custGeom>
+          <a:avLst/>
+          <a:gdLst/>
+          <a:ahLst/>
+          <a:cxnLst/>
+          <a:rect l="0" t="0" r="0" b="0"/>
+          <a:pathLst>
+            <a:path>
+              <a:moveTo>
+                <a:pt x="0" y="323960"/>
+              </a:moveTo>
+              <a:lnTo>
+                <a:pt x="170014" y="323960"/>
+              </a:lnTo>
+              <a:lnTo>
+                <a:pt x="170014" y="0"/>
+              </a:lnTo>
+              <a:lnTo>
+                <a:pt x="340028" y="0"/>
+              </a:lnTo>
+            </a:path>
+          </a:pathLst>
+        </a:custGeom>
+        <a:noFill/>
+        <a:ln w="25400" cap="flat" cmpd="sng" algn="ctr">
+          <a:solidFill>
+            <a:schemeClr val="accent1">
+              <a:shade val="60000"/>
+              <a:hueOff val="0"/>
+              <a:satOff val="0"/>
+              <a:lumOff val="0"/>
+              <a:alphaOff val="0"/>
+            </a:schemeClr>
+          </a:solidFill>
+          <a:prstDash val="solid"/>
+        </a:ln>
+        <a:effectLst/>
+      </dsp:spPr>
+      <dsp:style>
+        <a:lnRef idx="2">
+          <a:scrgbClr r="0" g="0" b="0"/>
+        </a:lnRef>
+        <a:fillRef idx="0">
+          <a:scrgbClr r="0" g="0" b="0"/>
+        </a:fillRef>
+        <a:effectRef idx="0">
+          <a:scrgbClr r="0" g="0" b="0"/>
+        </a:effectRef>
+        <a:fontRef idx="minor"/>
+      </dsp:style>
+      <dsp:txBody>
+        <a:bodyPr spcFirstLastPara="0" vert="horz" wrap="square" lIns="12700" tIns="0" rIns="12700" bIns="0" numCol="1" spcCol="1270" anchor="ctr" anchorCtr="0">
+          <a:noAutofit/>
+        </a:bodyPr>
+        <a:lstStyle/>
+        <a:p>
+          <a:pPr lvl="0" algn="ctr" defTabSz="222250">
+            <a:lnSpc>
+              <a:spcPct val="90000"/>
+            </a:lnSpc>
+            <a:spcBef>
+              <a:spcPct val="0"/>
+            </a:spcBef>
+            <a:spcAft>
+              <a:spcPct val="35000"/>
+            </a:spcAft>
+          </a:pPr>
+          <a:endParaRPr lang="en-GB" sz="500" kern="1200"/>
+        </a:p>
+      </dsp:txBody>
+      <dsp:txXfrm>
+        <a:off x="680499" y="2097430"/>
+        <a:ext cx="23482" cy="23482"/>
+      </dsp:txXfrm>
+    </dsp:sp>
+    <dsp:sp modelId="{A27D57A4-0D9A-4F5C-B33A-AC7BD075B3E3}">
+      <dsp:nvSpPr>
+        <dsp:cNvPr id="0" name=""/>
+        <dsp:cNvSpPr/>
+      </dsp:nvSpPr>
+      <dsp:spPr>
+        <a:xfrm rot="16200000">
+          <a:off x="-1100984" y="2011983"/>
+          <a:ext cx="2728084" cy="518336"/>
+        </a:xfrm>
+        <a:prstGeom prst="rect">
+          <a:avLst/>
+        </a:prstGeom>
+        <a:solidFill>
+          <a:schemeClr val="accent1">
+            <a:hueOff val="0"/>
+            <a:satOff val="0"/>
+            <a:lumOff val="0"/>
+            <a:alphaOff val="0"/>
+          </a:schemeClr>
+        </a:solidFill>
+        <a:ln w="25400" cap="flat" cmpd="sng" algn="ctr">
+          <a:solidFill>
+            <a:schemeClr val="lt1">
+              <a:hueOff val="0"/>
+              <a:satOff val="0"/>
+              <a:lumOff val="0"/>
+              <a:alphaOff val="0"/>
+            </a:schemeClr>
+          </a:solidFill>
+          <a:prstDash val="solid"/>
+        </a:ln>
+        <a:effectLst/>
+      </dsp:spPr>
+      <dsp:style>
+        <a:lnRef idx="2">
+          <a:scrgbClr r="0" g="0" b="0"/>
+        </a:lnRef>
+        <a:fillRef idx="1">
+          <a:scrgbClr r="0" g="0" b="0"/>
+        </a:fillRef>
+        <a:effectRef idx="0">
+          <a:scrgbClr r="0" g="0" b="0"/>
+        </a:effectRef>
+        <a:fontRef idx="minor">
+          <a:schemeClr val="lt1"/>
+        </a:fontRef>
+      </dsp:style>
+      <dsp:txBody>
+        <a:bodyPr spcFirstLastPara="0" vert="horz" wrap="square" lIns="19685" tIns="19685" rIns="19685" bIns="19685" numCol="1" spcCol="1270" anchor="ctr" anchorCtr="0">
+          <a:noAutofit/>
+        </a:bodyPr>
+        <a:lstStyle/>
+        <a:p>
+          <a:pPr lvl="0" algn="ctr" defTabSz="1377950">
+            <a:lnSpc>
+              <a:spcPct val="90000"/>
+            </a:lnSpc>
+            <a:spcBef>
+              <a:spcPct val="0"/>
+            </a:spcBef>
+            <a:spcAft>
+              <a:spcPct val="35000"/>
+            </a:spcAft>
+          </a:pPr>
+          <a:r>
+            <a:rPr lang="en-GB" sz="3100" kern="1200" dirty="0" err="1" smtClean="0"/>
+            <a:t>SkeletonFrame</a:t>
+          </a:r>
+          <a:endParaRPr lang="en-GB" sz="3100" kern="1200" dirty="0"/>
+        </a:p>
+      </dsp:txBody>
+      <dsp:txXfrm>
+        <a:off x="-1100984" y="2011983"/>
+        <a:ext cx="2728084" cy="518336"/>
+      </dsp:txXfrm>
+    </dsp:sp>
+    <dsp:sp modelId="{384B65CE-B393-44D3-8585-7EAFC1E06B75}">
+      <dsp:nvSpPr>
+        <dsp:cNvPr id="0" name=""/>
+        <dsp:cNvSpPr/>
+      </dsp:nvSpPr>
+      <dsp:spPr>
+        <a:xfrm>
+          <a:off x="862254" y="1688023"/>
+          <a:ext cx="1700142" cy="518336"/>
+        </a:xfrm>
+        <a:prstGeom prst="rect">
+          <a:avLst/>
+        </a:prstGeom>
+        <a:solidFill>
+          <a:schemeClr val="accent1">
+            <a:hueOff val="0"/>
+            <a:satOff val="0"/>
+            <a:lumOff val="0"/>
+            <a:alphaOff val="0"/>
+          </a:schemeClr>
+        </a:solidFill>
+        <a:ln w="25400" cap="flat" cmpd="sng" algn="ctr">
+          <a:solidFill>
+            <a:schemeClr val="lt1">
+              <a:hueOff val="0"/>
+              <a:satOff val="0"/>
+              <a:lumOff val="0"/>
+              <a:alphaOff val="0"/>
+            </a:schemeClr>
+          </a:solidFill>
+          <a:prstDash val="solid"/>
+        </a:ln>
+        <a:effectLst/>
+      </dsp:spPr>
+      <dsp:style>
+        <a:lnRef idx="2">
+          <a:scrgbClr r="0" g="0" b="0"/>
+        </a:lnRef>
+        <a:fillRef idx="1">
+          <a:scrgbClr r="0" g="0" b="0"/>
+        </a:fillRef>
+        <a:effectRef idx="0">
+          <a:scrgbClr r="0" g="0" b="0"/>
+        </a:effectRef>
+        <a:fontRef idx="minor">
+          <a:schemeClr val="lt1"/>
+        </a:fontRef>
+      </dsp:style>
+      <dsp:txBody>
+        <a:bodyPr spcFirstLastPara="0" vert="horz" wrap="square" lIns="10795" tIns="10795" rIns="10795" bIns="10795" numCol="1" spcCol="1270" anchor="ctr" anchorCtr="0">
+          <a:noAutofit/>
+        </a:bodyPr>
+        <a:lstStyle/>
+        <a:p>
+          <a:pPr lvl="0" algn="ctr" defTabSz="755650">
+            <a:lnSpc>
+              <a:spcPct val="90000"/>
+            </a:lnSpc>
+            <a:spcBef>
+              <a:spcPct val="0"/>
+            </a:spcBef>
+            <a:spcAft>
+              <a:spcPct val="35000"/>
+            </a:spcAft>
+          </a:pPr>
+          <a:r>
+            <a:rPr lang="en-GB" sz="1700" kern="1200" dirty="0" smtClean="0"/>
+            <a:t>Skeleton</a:t>
+          </a:r>
+          <a:endParaRPr lang="en-GB" sz="1700" kern="1200" dirty="0"/>
+        </a:p>
+      </dsp:txBody>
+      <dsp:txXfrm>
+        <a:off x="862254" y="1688023"/>
+        <a:ext cx="1700142" cy="518336"/>
+      </dsp:txXfrm>
+    </dsp:sp>
+    <dsp:sp modelId="{E96B9B08-7ACE-4822-A017-AD90FF4ECA9B}">
+      <dsp:nvSpPr>
+        <dsp:cNvPr id="0" name=""/>
+        <dsp:cNvSpPr/>
+      </dsp:nvSpPr>
+      <dsp:spPr>
+        <a:xfrm>
+          <a:off x="2902425" y="1688023"/>
+          <a:ext cx="1700142" cy="518336"/>
+        </a:xfrm>
+        <a:prstGeom prst="rect">
+          <a:avLst/>
+        </a:prstGeom>
+        <a:solidFill>
+          <a:schemeClr val="accent1">
+            <a:hueOff val="0"/>
+            <a:satOff val="0"/>
+            <a:lumOff val="0"/>
+            <a:alphaOff val="0"/>
+          </a:schemeClr>
+        </a:solidFill>
+        <a:ln w="25400" cap="flat" cmpd="sng" algn="ctr">
+          <a:solidFill>
+            <a:schemeClr val="lt1">
+              <a:hueOff val="0"/>
+              <a:satOff val="0"/>
+              <a:lumOff val="0"/>
+              <a:alphaOff val="0"/>
+            </a:schemeClr>
+          </a:solidFill>
+          <a:prstDash val="solid"/>
+        </a:ln>
+        <a:effectLst/>
+      </dsp:spPr>
+      <dsp:style>
+        <a:lnRef idx="2">
+          <a:scrgbClr r="0" g="0" b="0"/>
+        </a:lnRef>
+        <a:fillRef idx="1">
+          <a:scrgbClr r="0" g="0" b="0"/>
+        </a:fillRef>
+        <a:effectRef idx="0">
+          <a:scrgbClr r="0" g="0" b="0"/>
+        </a:effectRef>
+        <a:fontRef idx="minor">
+          <a:schemeClr val="lt1"/>
+        </a:fontRef>
+      </dsp:style>
+      <dsp:txBody>
+        <a:bodyPr spcFirstLastPara="0" vert="horz" wrap="square" lIns="10795" tIns="10795" rIns="10795" bIns="10795" numCol="1" spcCol="1270" anchor="ctr" anchorCtr="0">
+          <a:noAutofit/>
+        </a:bodyPr>
+        <a:lstStyle/>
+        <a:p>
+          <a:pPr lvl="0" algn="ctr" defTabSz="755650">
+            <a:lnSpc>
+              <a:spcPct val="90000"/>
+            </a:lnSpc>
+            <a:spcBef>
+              <a:spcPct val="0"/>
+            </a:spcBef>
+            <a:spcAft>
+              <a:spcPct val="35000"/>
+            </a:spcAft>
+          </a:pPr>
+          <a:r>
+            <a:rPr lang="en-GB" sz="1700" kern="1200" dirty="0" err="1" smtClean="0"/>
+            <a:t>JointCollection</a:t>
+          </a:r>
+          <a:endParaRPr lang="en-GB" sz="1700" kern="1200" dirty="0"/>
+        </a:p>
+      </dsp:txBody>
+      <dsp:txXfrm>
+        <a:off x="2902425" y="1688023"/>
+        <a:ext cx="1700142" cy="518336"/>
+      </dsp:txXfrm>
+    </dsp:sp>
+    <dsp:sp modelId="{C11C71FA-FCF6-480B-9B01-41CE5DD2EB5C}">
+      <dsp:nvSpPr>
+        <dsp:cNvPr id="0" name=""/>
+        <dsp:cNvSpPr/>
+      </dsp:nvSpPr>
+      <dsp:spPr>
+        <a:xfrm>
+          <a:off x="4942596" y="1040103"/>
+          <a:ext cx="1700142" cy="518336"/>
+        </a:xfrm>
+        <a:prstGeom prst="rect">
+          <a:avLst/>
+        </a:prstGeom>
+        <a:solidFill>
+          <a:schemeClr val="accent1">
+            <a:hueOff val="0"/>
+            <a:satOff val="0"/>
+            <a:lumOff val="0"/>
+            <a:alphaOff val="0"/>
+          </a:schemeClr>
+        </a:solidFill>
+        <a:ln w="25400" cap="flat" cmpd="sng" algn="ctr">
+          <a:solidFill>
+            <a:schemeClr val="lt1">
+              <a:hueOff val="0"/>
+              <a:satOff val="0"/>
+              <a:lumOff val="0"/>
+              <a:alphaOff val="0"/>
+            </a:schemeClr>
+          </a:solidFill>
+          <a:prstDash val="solid"/>
+        </a:ln>
+        <a:effectLst/>
+      </dsp:spPr>
+      <dsp:style>
+        <a:lnRef idx="2">
+          <a:scrgbClr r="0" g="0" b="0"/>
+        </a:lnRef>
+        <a:fillRef idx="1">
+          <a:scrgbClr r="0" g="0" b="0"/>
+        </a:fillRef>
+        <a:effectRef idx="0">
+          <a:scrgbClr r="0" g="0" b="0"/>
+        </a:effectRef>
+        <a:fontRef idx="minor">
+          <a:schemeClr val="lt1"/>
+        </a:fontRef>
+      </dsp:style>
+      <dsp:txBody>
+        <a:bodyPr spcFirstLastPara="0" vert="horz" wrap="square" lIns="10795" tIns="10795" rIns="10795" bIns="10795" numCol="1" spcCol="1270" anchor="ctr" anchorCtr="0">
+          <a:noAutofit/>
+        </a:bodyPr>
+        <a:lstStyle/>
+        <a:p>
+          <a:pPr lvl="0" algn="ctr" defTabSz="755650">
+            <a:lnSpc>
+              <a:spcPct val="90000"/>
+            </a:lnSpc>
+            <a:spcBef>
+              <a:spcPct val="0"/>
+            </a:spcBef>
+            <a:spcAft>
+              <a:spcPct val="35000"/>
+            </a:spcAft>
+          </a:pPr>
+          <a:r>
+            <a:rPr lang="en-GB" sz="1700" kern="1200" dirty="0" smtClean="0"/>
+            <a:t>Joint (Head)</a:t>
+          </a:r>
+          <a:endParaRPr lang="en-GB" sz="1700" kern="1200" dirty="0"/>
+        </a:p>
+      </dsp:txBody>
+      <dsp:txXfrm>
+        <a:off x="4942596" y="1040103"/>
+        <a:ext cx="1700142" cy="518336"/>
+      </dsp:txXfrm>
+    </dsp:sp>
+    <dsp:sp modelId="{FA13CC6F-F5E4-4286-8406-9F84487E98F7}">
+      <dsp:nvSpPr>
+        <dsp:cNvPr id="0" name=""/>
+        <dsp:cNvSpPr/>
+      </dsp:nvSpPr>
+      <dsp:spPr>
+        <a:xfrm>
+          <a:off x="6982767" y="716143"/>
+          <a:ext cx="1700142" cy="518336"/>
+        </a:xfrm>
+        <a:prstGeom prst="rect">
+          <a:avLst/>
+        </a:prstGeom>
+        <a:solidFill>
+          <a:schemeClr val="accent1">
+            <a:hueOff val="0"/>
+            <a:satOff val="0"/>
+            <a:lumOff val="0"/>
+            <a:alphaOff val="0"/>
+          </a:schemeClr>
+        </a:solidFill>
+        <a:ln w="25400" cap="flat" cmpd="sng" algn="ctr">
+          <a:solidFill>
+            <a:schemeClr val="lt1">
+              <a:hueOff val="0"/>
+              <a:satOff val="0"/>
+              <a:lumOff val="0"/>
+              <a:alphaOff val="0"/>
+            </a:schemeClr>
+          </a:solidFill>
+          <a:prstDash val="solid"/>
+        </a:ln>
+        <a:effectLst/>
+      </dsp:spPr>
+      <dsp:style>
+        <a:lnRef idx="2">
+          <a:scrgbClr r="0" g="0" b="0"/>
+        </a:lnRef>
+        <a:fillRef idx="1">
+          <a:scrgbClr r="0" g="0" b="0"/>
+        </a:fillRef>
+        <a:effectRef idx="0">
+          <a:scrgbClr r="0" g="0" b="0"/>
+        </a:effectRef>
+        <a:fontRef idx="minor">
+          <a:schemeClr val="lt1"/>
+        </a:fontRef>
+      </dsp:style>
+      <dsp:txBody>
+        <a:bodyPr spcFirstLastPara="0" vert="horz" wrap="square" lIns="10795" tIns="10795" rIns="10795" bIns="10795" numCol="1" spcCol="1270" anchor="ctr" anchorCtr="0">
+          <a:noAutofit/>
+        </a:bodyPr>
+        <a:lstStyle/>
+        <a:p>
+          <a:pPr lvl="0" algn="ctr" defTabSz="755650">
+            <a:lnSpc>
+              <a:spcPct val="90000"/>
+            </a:lnSpc>
+            <a:spcBef>
+              <a:spcPct val="0"/>
+            </a:spcBef>
+            <a:spcAft>
+              <a:spcPct val="35000"/>
+            </a:spcAft>
+          </a:pPr>
+          <a:r>
+            <a:rPr lang="en-GB" sz="1700" kern="1200" dirty="0" err="1" smtClean="0"/>
+            <a:t>SkeletonPoint</a:t>
+          </a:r>
+          <a:endParaRPr lang="en-GB" sz="1700" kern="1200" dirty="0"/>
+        </a:p>
+      </dsp:txBody>
+      <dsp:txXfrm>
+        <a:off x="6982767" y="716143"/>
+        <a:ext cx="1700142" cy="518336"/>
+      </dsp:txXfrm>
+    </dsp:sp>
+    <dsp:sp modelId="{6498ADF7-34C3-4D0A-A1AA-B4BFE77A8577}">
+      <dsp:nvSpPr>
+        <dsp:cNvPr id="0" name=""/>
+        <dsp:cNvSpPr/>
+      </dsp:nvSpPr>
+      <dsp:spPr>
+        <a:xfrm>
+          <a:off x="6982767" y="1364063"/>
+          <a:ext cx="1700142" cy="518336"/>
+        </a:xfrm>
+        <a:prstGeom prst="rect">
+          <a:avLst/>
+        </a:prstGeom>
+        <a:solidFill>
+          <a:schemeClr val="accent1">
+            <a:hueOff val="0"/>
+            <a:satOff val="0"/>
+            <a:lumOff val="0"/>
+            <a:alphaOff val="0"/>
+          </a:schemeClr>
+        </a:solidFill>
+        <a:ln w="25400" cap="flat" cmpd="sng" algn="ctr">
+          <a:solidFill>
+            <a:schemeClr val="lt1">
+              <a:hueOff val="0"/>
+              <a:satOff val="0"/>
+              <a:lumOff val="0"/>
+              <a:alphaOff val="0"/>
+            </a:schemeClr>
+          </a:solidFill>
+          <a:prstDash val="solid"/>
+        </a:ln>
+        <a:effectLst/>
+      </dsp:spPr>
+      <dsp:style>
+        <a:lnRef idx="2">
+          <a:scrgbClr r="0" g="0" b="0"/>
+        </a:lnRef>
+        <a:fillRef idx="1">
+          <a:scrgbClr r="0" g="0" b="0"/>
+        </a:fillRef>
+        <a:effectRef idx="0">
+          <a:scrgbClr r="0" g="0" b="0"/>
+        </a:effectRef>
+        <a:fontRef idx="minor">
+          <a:schemeClr val="lt1"/>
+        </a:fontRef>
+      </dsp:style>
+      <dsp:txBody>
+        <a:bodyPr spcFirstLastPara="0" vert="horz" wrap="square" lIns="10795" tIns="10795" rIns="10795" bIns="10795" numCol="1" spcCol="1270" anchor="ctr" anchorCtr="0">
+          <a:noAutofit/>
+        </a:bodyPr>
+        <a:lstStyle/>
+        <a:p>
+          <a:pPr lvl="0" algn="ctr" defTabSz="755650">
+            <a:lnSpc>
+              <a:spcPct val="90000"/>
+            </a:lnSpc>
+            <a:spcBef>
+              <a:spcPct val="0"/>
+            </a:spcBef>
+            <a:spcAft>
+              <a:spcPct val="35000"/>
+            </a:spcAft>
+          </a:pPr>
+          <a:r>
+            <a:rPr lang="en-GB" sz="1700" kern="1200" dirty="0" err="1" smtClean="0"/>
+            <a:t>JointType</a:t>
+          </a:r>
+          <a:endParaRPr lang="en-GB" sz="1700" kern="1200" dirty="0"/>
+        </a:p>
+      </dsp:txBody>
+      <dsp:txXfrm>
+        <a:off x="6982767" y="1364063"/>
+        <a:ext cx="1700142" cy="518336"/>
+      </dsp:txXfrm>
+    </dsp:sp>
+    <dsp:sp modelId="{8105312F-24EA-47D4-A519-3D6C44DD0F86}">
+      <dsp:nvSpPr>
+        <dsp:cNvPr id="0" name=""/>
+        <dsp:cNvSpPr/>
+      </dsp:nvSpPr>
+      <dsp:spPr>
+        <a:xfrm>
+          <a:off x="4942596" y="1688023"/>
+          <a:ext cx="1700142" cy="518336"/>
+        </a:xfrm>
+        <a:prstGeom prst="rect">
+          <a:avLst/>
+        </a:prstGeom>
+        <a:solidFill>
+          <a:schemeClr val="accent1">
+            <a:hueOff val="0"/>
+            <a:satOff val="0"/>
+            <a:lumOff val="0"/>
+            <a:alphaOff val="0"/>
+          </a:schemeClr>
+        </a:solidFill>
+        <a:ln w="25400" cap="flat" cmpd="sng" algn="ctr">
+          <a:solidFill>
+            <a:schemeClr val="lt1">
+              <a:hueOff val="0"/>
+              <a:satOff val="0"/>
+              <a:lumOff val="0"/>
+              <a:alphaOff val="0"/>
+            </a:schemeClr>
+          </a:solidFill>
+          <a:prstDash val="solid"/>
+        </a:ln>
+        <a:effectLst/>
+      </dsp:spPr>
+      <dsp:style>
+        <a:lnRef idx="2">
+          <a:scrgbClr r="0" g="0" b="0"/>
+        </a:lnRef>
+        <a:fillRef idx="1">
+          <a:scrgbClr r="0" g="0" b="0"/>
+        </a:fillRef>
+        <a:effectRef idx="0">
+          <a:scrgbClr r="0" g="0" b="0"/>
+        </a:effectRef>
+        <a:fontRef idx="minor">
+          <a:schemeClr val="lt1"/>
+        </a:fontRef>
+      </dsp:style>
+      <dsp:txBody>
+        <a:bodyPr spcFirstLastPara="0" vert="horz" wrap="square" lIns="10795" tIns="10795" rIns="10795" bIns="10795" numCol="1" spcCol="1270" anchor="ctr" anchorCtr="0">
+          <a:noAutofit/>
+        </a:bodyPr>
+        <a:lstStyle/>
+        <a:p>
+          <a:pPr lvl="0" algn="ctr" defTabSz="755650">
+            <a:lnSpc>
+              <a:spcPct val="90000"/>
+            </a:lnSpc>
+            <a:spcBef>
+              <a:spcPct val="0"/>
+            </a:spcBef>
+            <a:spcAft>
+              <a:spcPct val="35000"/>
+            </a:spcAft>
+          </a:pPr>
+          <a:r>
+            <a:rPr lang="en-GB" sz="1700" kern="1200" dirty="0" smtClean="0"/>
+            <a:t>Joint (</a:t>
+          </a:r>
+          <a:r>
+            <a:rPr lang="en-GB" sz="1700" kern="1200" dirty="0" err="1" smtClean="0"/>
+            <a:t>ShoulderCenter</a:t>
+          </a:r>
+          <a:r>
+            <a:rPr lang="en-GB" sz="1700" kern="1200" dirty="0" smtClean="0"/>
+            <a:t>)</a:t>
+          </a:r>
+          <a:endParaRPr lang="en-GB" sz="1700" kern="1200" dirty="0"/>
+        </a:p>
+      </dsp:txBody>
+      <dsp:txXfrm>
+        <a:off x="4942596" y="1688023"/>
+        <a:ext cx="1700142" cy="518336"/>
+      </dsp:txXfrm>
+    </dsp:sp>
+    <dsp:sp modelId="{4B109746-A58F-4BFA-9EFA-545B948793F2}">
+      <dsp:nvSpPr>
+        <dsp:cNvPr id="0" name=""/>
+        <dsp:cNvSpPr/>
+      </dsp:nvSpPr>
+      <dsp:spPr>
+        <a:xfrm>
+          <a:off x="4942596" y="2335943"/>
+          <a:ext cx="1700142" cy="518336"/>
+        </a:xfrm>
+        <a:prstGeom prst="rect">
+          <a:avLst/>
+        </a:prstGeom>
+        <a:solidFill>
+          <a:schemeClr val="accent1">
+            <a:hueOff val="0"/>
+            <a:satOff val="0"/>
+            <a:lumOff val="0"/>
+            <a:alphaOff val="0"/>
+          </a:schemeClr>
+        </a:solidFill>
+        <a:ln w="25400" cap="flat" cmpd="sng" algn="ctr">
+          <a:solidFill>
+            <a:schemeClr val="lt1">
+              <a:hueOff val="0"/>
+              <a:satOff val="0"/>
+              <a:lumOff val="0"/>
+              <a:alphaOff val="0"/>
+            </a:schemeClr>
+          </a:solidFill>
+          <a:prstDash val="solid"/>
+        </a:ln>
+        <a:effectLst/>
+      </dsp:spPr>
+      <dsp:style>
+        <a:lnRef idx="2">
+          <a:scrgbClr r="0" g="0" b="0"/>
+        </a:lnRef>
+        <a:fillRef idx="1">
+          <a:scrgbClr r="0" g="0" b="0"/>
+        </a:fillRef>
+        <a:effectRef idx="0">
+          <a:scrgbClr r="0" g="0" b="0"/>
+        </a:effectRef>
+        <a:fontRef idx="minor">
+          <a:schemeClr val="lt1"/>
+        </a:fontRef>
+      </dsp:style>
+      <dsp:txBody>
+        <a:bodyPr spcFirstLastPara="0" vert="horz" wrap="square" lIns="10795" tIns="10795" rIns="10795" bIns="10795" numCol="1" spcCol="1270" anchor="ctr" anchorCtr="0">
+          <a:noAutofit/>
+        </a:bodyPr>
+        <a:lstStyle/>
+        <a:p>
+          <a:pPr lvl="0" algn="ctr" defTabSz="755650">
+            <a:lnSpc>
+              <a:spcPct val="90000"/>
+            </a:lnSpc>
+            <a:spcBef>
+              <a:spcPct val="0"/>
+            </a:spcBef>
+            <a:spcAft>
+              <a:spcPct val="35000"/>
+            </a:spcAft>
+          </a:pPr>
+          <a:r>
+            <a:rPr lang="en-GB" sz="1700" kern="1200" dirty="0" smtClean="0"/>
+            <a:t>Etc.</a:t>
+          </a:r>
+          <a:endParaRPr lang="en-GB" sz="1700" kern="1200" dirty="0"/>
+        </a:p>
+      </dsp:txBody>
+      <dsp:txXfrm>
+        <a:off x="4942596" y="2335943"/>
+        <a:ext cx="1700142" cy="518336"/>
+      </dsp:txXfrm>
+    </dsp:sp>
+    <dsp:sp modelId="{BA086C77-B8C8-41E5-981F-2D9344ACCB06}">
+      <dsp:nvSpPr>
+        <dsp:cNvPr id="0" name=""/>
+        <dsp:cNvSpPr/>
+      </dsp:nvSpPr>
+      <dsp:spPr>
+        <a:xfrm>
+          <a:off x="862254" y="2335943"/>
+          <a:ext cx="1700142" cy="518336"/>
+        </a:xfrm>
+        <a:prstGeom prst="rect">
+          <a:avLst/>
+        </a:prstGeom>
+        <a:solidFill>
+          <a:schemeClr val="accent1">
+            <a:hueOff val="0"/>
+            <a:satOff val="0"/>
+            <a:lumOff val="0"/>
+            <a:alphaOff val="0"/>
+          </a:schemeClr>
+        </a:solidFill>
+        <a:ln w="25400" cap="flat" cmpd="sng" algn="ctr">
+          <a:solidFill>
+            <a:schemeClr val="lt1">
+              <a:hueOff val="0"/>
+              <a:satOff val="0"/>
+              <a:lumOff val="0"/>
+              <a:alphaOff val="0"/>
+            </a:schemeClr>
+          </a:solidFill>
+          <a:prstDash val="solid"/>
+        </a:ln>
+        <a:effectLst/>
+      </dsp:spPr>
+      <dsp:style>
+        <a:lnRef idx="2">
+          <a:scrgbClr r="0" g="0" b="0"/>
+        </a:lnRef>
+        <a:fillRef idx="1">
+          <a:scrgbClr r="0" g="0" b="0"/>
+        </a:fillRef>
+        <a:effectRef idx="0">
+          <a:scrgbClr r="0" g="0" b="0"/>
+        </a:effectRef>
+        <a:fontRef idx="minor">
+          <a:schemeClr val="lt1"/>
+        </a:fontRef>
+      </dsp:style>
+      <dsp:txBody>
+        <a:bodyPr spcFirstLastPara="0" vert="horz" wrap="square" lIns="10795" tIns="10795" rIns="10795" bIns="10795" numCol="1" spcCol="1270" anchor="ctr" anchorCtr="0">
+          <a:noAutofit/>
+        </a:bodyPr>
+        <a:lstStyle/>
+        <a:p>
+          <a:pPr lvl="0" algn="ctr" defTabSz="755650">
+            <a:lnSpc>
+              <a:spcPct val="90000"/>
+            </a:lnSpc>
+            <a:spcBef>
+              <a:spcPct val="0"/>
+            </a:spcBef>
+            <a:spcAft>
+              <a:spcPct val="35000"/>
+            </a:spcAft>
+          </a:pPr>
+          <a:r>
+            <a:rPr lang="en-GB" sz="1700" kern="1200" dirty="0" smtClean="0"/>
+            <a:t>Skeleton</a:t>
+          </a:r>
+          <a:endParaRPr lang="en-GB" sz="1700" kern="1200" dirty="0"/>
+        </a:p>
+      </dsp:txBody>
+      <dsp:txXfrm>
+        <a:off x="862254" y="2335943"/>
+        <a:ext cx="1700142" cy="518336"/>
+      </dsp:txXfrm>
+    </dsp:sp>
   </dsp:spTree>
 </dsp:drawing>
 </file>
@@ -47092,6 +49511,260 @@
       </p:grpSpPr>
       <p:sp>
         <p:nvSpPr>
+          <p:cNvPr id="2" name="Espace réservé du contenu 1"/>
+          <p:cNvSpPr>
+            <a:spLocks noGrp="1"/>
+          </p:cNvSpPr>
+          <p:nvPr>
+            <p:ph idx="1"/>
+          </p:nvPr>
+        </p:nvSpPr>
+        <p:spPr/>
+        <p:txBody>
+          <a:bodyPr>
+            <a:normAutofit fontScale="92500" lnSpcReduction="10000"/>
+          </a:bodyPr>
+          <a:lstStyle/>
+          <a:p>
+            <a:r>
+              <a:rPr lang="en-GB" dirty="0" smtClean="0"/>
+              <a:t>Wikipedia</a:t>
+            </a:r>
+          </a:p>
+          <a:p>
+            <a:pPr lvl="1"/>
+            <a:r>
+              <a:rPr lang="en-GB" dirty="0">
+                <a:hlinkClick r:id="rId2"/>
+              </a:rPr>
+              <a:t>http://</a:t>
+            </a:r>
+            <a:r>
+              <a:rPr lang="en-GB" dirty="0" smtClean="0">
+                <a:hlinkClick r:id="rId2"/>
+              </a:rPr>
+              <a:t>fr.wikipedia.org/wiki/Kinect</a:t>
+            </a:r>
+            <a:endParaRPr lang="en-GB" dirty="0" smtClean="0"/>
+          </a:p>
+          <a:p>
+            <a:r>
+              <a:rPr lang="en-GB" dirty="0" err="1" smtClean="0"/>
+              <a:t>PluralSight</a:t>
+            </a:r>
+            <a:endParaRPr lang="en-GB" dirty="0" smtClean="0"/>
+          </a:p>
+          <a:p>
+            <a:pPr lvl="1"/>
+            <a:r>
+              <a:rPr lang="en-GB" dirty="0">
+                <a:hlinkClick r:id="rId3"/>
+              </a:rPr>
+              <a:t>http://</a:t>
+            </a:r>
+            <a:r>
+              <a:rPr lang="en-GB" dirty="0" smtClean="0">
+                <a:hlinkClick r:id="rId3"/>
+              </a:rPr>
+              <a:t>www.pluralsight.com/courses/building-real-kinect-application</a:t>
+            </a:r>
+            <a:endParaRPr lang="en-GB" dirty="0" smtClean="0"/>
+          </a:p>
+          <a:p>
+            <a:r>
+              <a:rPr lang="en-GB" dirty="0" smtClean="0"/>
+              <a:t>MSDN</a:t>
+            </a:r>
+          </a:p>
+          <a:p>
+            <a:pPr lvl="1"/>
+            <a:r>
+              <a:rPr lang="en-GB" dirty="0" smtClean="0">
+                <a:hlinkClick r:id="rId4"/>
+              </a:rPr>
+              <a:t>https</a:t>
+            </a:r>
+            <a:r>
+              <a:rPr lang="en-GB" dirty="0">
+                <a:hlinkClick r:id="rId4"/>
+              </a:rPr>
+              <a:t>://</a:t>
+            </a:r>
+            <a:r>
+              <a:rPr lang="en-GB" dirty="0" smtClean="0">
+                <a:hlinkClick r:id="rId4"/>
+              </a:rPr>
+              <a:t>msdn.microsoft.com/en-us/library/hh855354.aspx</a:t>
+            </a:r>
+            <a:endParaRPr lang="en-GB" dirty="0" smtClean="0"/>
+          </a:p>
+          <a:p>
+            <a:r>
+              <a:rPr lang="en-GB" dirty="0" smtClean="0"/>
+              <a:t>GitHub</a:t>
+            </a:r>
+          </a:p>
+          <a:p>
+            <a:pPr lvl="1"/>
+            <a:r>
+              <a:rPr lang="en-GB" dirty="0" smtClean="0">
+                <a:hlinkClick r:id="rId5"/>
+              </a:rPr>
+              <a:t>https</a:t>
+            </a:r>
+            <a:r>
+              <a:rPr lang="en-GB" dirty="0">
+                <a:hlinkClick r:id="rId5"/>
+              </a:rPr>
+              <a:t>://</a:t>
+            </a:r>
+            <a:r>
+              <a:rPr lang="en-GB" dirty="0" smtClean="0">
+                <a:hlinkClick r:id="rId5"/>
+              </a:rPr>
+              <a:t>github.com/mnivet/cen-info-kinect</a:t>
+            </a:r>
+            <a:endParaRPr lang="en-GB" dirty="0" smtClean="0"/>
+          </a:p>
+          <a:p>
+            <a:pPr lvl="1"/>
+            <a:endParaRPr lang="en-GB" dirty="0" smtClean="0"/>
+          </a:p>
+          <a:p>
+            <a:pPr marL="20637" lvl="1" indent="0">
+              <a:buNone/>
+            </a:pPr>
+            <a:r>
+              <a:rPr lang="en-GB" sz="2000" b="1" dirty="0">
+                <a:solidFill>
+                  <a:schemeClr val="tx2"/>
+                </a:solidFill>
+              </a:rPr>
+              <a:t>Kinect </a:t>
+            </a:r>
+            <a:r>
+              <a:rPr lang="en-GB" sz="2000" b="1" dirty="0" err="1" smtClean="0">
+                <a:solidFill>
+                  <a:schemeClr val="tx2"/>
+                </a:solidFill>
+              </a:rPr>
+              <a:t>ToolBox</a:t>
+            </a:r>
+            <a:endParaRPr lang="en-GB" sz="2000" b="1" dirty="0" smtClean="0">
+              <a:solidFill>
+                <a:schemeClr val="tx2"/>
+              </a:solidFill>
+            </a:endParaRPr>
+          </a:p>
+          <a:p>
+            <a:pPr lvl="1"/>
+            <a:r>
+              <a:rPr lang="en-GB" dirty="0" smtClean="0">
+                <a:hlinkClick r:id="rId6"/>
+              </a:rPr>
+              <a:t>https</a:t>
+            </a:r>
+            <a:r>
+              <a:rPr lang="en-GB" dirty="0">
+                <a:hlinkClick r:id="rId6"/>
+              </a:rPr>
+              <a:t>://</a:t>
+            </a:r>
+            <a:r>
+              <a:rPr lang="en-GB" dirty="0" smtClean="0">
+                <a:hlinkClick r:id="rId6"/>
+              </a:rPr>
+              <a:t>kinecttoolbox.codeplex.com</a:t>
+            </a:r>
+            <a:endParaRPr lang="en-GB" dirty="0" smtClean="0"/>
+          </a:p>
+          <a:p>
+            <a:pPr marL="20637" lvl="1" indent="0">
+              <a:buNone/>
+            </a:pPr>
+            <a:endParaRPr lang="en-GB" dirty="0"/>
+          </a:p>
+        </p:txBody>
+      </p:sp>
+      <p:sp>
+        <p:nvSpPr>
+          <p:cNvPr id="3" name="Titre 2"/>
+          <p:cNvSpPr>
+            <a:spLocks noGrp="1"/>
+          </p:cNvSpPr>
+          <p:nvPr>
+            <p:ph type="title"/>
+          </p:nvPr>
+        </p:nvSpPr>
+        <p:spPr/>
+        <p:txBody>
+          <a:bodyPr/>
+          <a:lstStyle/>
+          <a:p>
+            <a:r>
+              <a:rPr lang="en-GB" dirty="0" err="1" smtClean="0"/>
+              <a:t>Reférences</a:t>
+            </a:r>
+            <a:endParaRPr lang="en-GB" dirty="0"/>
+          </a:p>
+        </p:txBody>
+      </p:sp>
+      <p:sp>
+        <p:nvSpPr>
+          <p:cNvPr id="4" name="Espace réservé du numéro de diapositive 3"/>
+          <p:cNvSpPr>
+            <a:spLocks noGrp="1"/>
+          </p:cNvSpPr>
+          <p:nvPr>
+            <p:ph type="sldNum" sz="quarter" idx="4"/>
+          </p:nvPr>
+        </p:nvSpPr>
+        <p:spPr/>
+        <p:txBody>
+          <a:bodyPr/>
+          <a:lstStyle/>
+          <a:p>
+            <a:fld id="{C47C2D81-940B-4685-92D1-3ECF90F4940E}" type="slidenum">
+              <a:rPr lang="fr-FR" smtClean="0"/>
+              <a:pPr/>
+              <a:t>23</a:t>
+            </a:fld>
+            <a:endParaRPr lang="fr-FR" dirty="0"/>
+          </a:p>
+        </p:txBody>
+      </p:sp>
+    </p:spTree>
+    <p:extLst>
+      <p:ext uri="{BB962C8B-B14F-4D97-AF65-F5344CB8AC3E}">
+        <p14:creationId xmlns:p14="http://schemas.microsoft.com/office/powerpoint/2010/main" val="477461076"/>
+      </p:ext>
+    </p:extLst>
+  </p:cSld>
+  <p:clrMapOvr>
+    <a:masterClrMapping/>
+  </p:clrMapOvr>
+</p:sld>
+</file>
+
+<file path=ppt/slides/slide24.xml><?xml version="1.0" encoding="utf-8"?>
+<p:sld xmlns:a="http://schemas.openxmlformats.org/drawingml/2006/main" xmlns:r="http://schemas.openxmlformats.org/officeDocument/2006/relationships" xmlns:p="http://schemas.openxmlformats.org/presentationml/2006/main">
+  <p:cSld>
+    <p:spTree>
+      <p:nvGrpSpPr>
+        <p:cNvPr id="1" name=""/>
+        <p:cNvGrpSpPr/>
+        <p:nvPr/>
+      </p:nvGrpSpPr>
+      <p:grpSpPr>
+        <a:xfrm>
+          <a:off x="0" y="0"/>
+          <a:ext cx="0" cy="0"/>
+          <a:chOff x="0" y="0"/>
+          <a:chExt cx="0" cy="0"/>
+        </a:xfrm>
+      </p:grpSpPr>
+      <p:sp>
+        <p:nvSpPr>
           <p:cNvPr id="2" name="Titre 1"/>
           <p:cNvSpPr>
             <a:spLocks noGrp="1"/>
@@ -47137,7 +49810,7 @@
             <a:fld id="{1AA167F7-1AE4-034A-99C2-C615EB6F9492}" type="slidenum">
               <a:rPr lang="fr-FR" smtClean="0"/>
               <a:pPr/>
-              <a:t>23</a:t>
+              <a:t>24</a:t>
             </a:fld>
             <a:endParaRPr lang="fr-FR" dirty="0"/>
           </a:p>
@@ -47156,7 +49829,7 @@
 </p:sld>
 </file>
 
-<file path=ppt/slides/slide24.xml><?xml version="1.0" encoding="utf-8"?>
+<file path=ppt/slides/slide25.xml><?xml version="1.0" encoding="utf-8"?>
 <p:sld xmlns:a="http://schemas.openxmlformats.org/drawingml/2006/main" xmlns:r="http://schemas.openxmlformats.org/officeDocument/2006/relationships" xmlns:p="http://schemas.openxmlformats.org/presentationml/2006/main">
   <p:cSld>
     <p:spTree>
@@ -50217,6 +52890,21 @@
 </file>
 
 <file path=customXml/item1.xml><?xml version="1.0" encoding="utf-8"?>
+<p:properties xmlns:p="http://schemas.microsoft.com/office/2006/metadata/properties" xmlns:xsi="http://www.w3.org/2001/XMLSchema-instance" xmlns:pc="http://schemas.microsoft.com/office/infopath/2007/PartnerControls">
+  <documentManagement/>
+</p:properties>
+</file>
+
+<file path=customXml/item2.xml><?xml version="1.0" encoding="utf-8"?>
+<?mso-contentType ?>
+<FormTemplates xmlns="http://schemas.microsoft.com/sharepoint/v3/contenttype/forms">
+  <Display>DocumentLibraryForm</Display>
+  <Edit>DocumentLibraryForm</Edit>
+  <New>DocumentLibraryForm</New>
+</FormTemplates>
+</file>
+
+<file path=customXml/item3.xml><?xml version="1.0" encoding="utf-8"?>
 <ct:contentTypeSchema xmlns:ct="http://schemas.microsoft.com/office/2006/metadata/contentType" xmlns:ma="http://schemas.microsoft.com/office/2006/metadata/properties/metaAttributes" ct:_="" ma:_="" ma:contentTypeName="Document" ma:contentTypeID="0x010100DB557686CAEF394BA510AD1A9D4B96D9" ma:contentTypeVersion="0" ma:contentTypeDescription="Crée un document." ma:contentTypeScope="" ma:versionID="6bdde8ca07fbe4779f455e2b2462959b">
   <xsd:schema xmlns:xsd="http://www.w3.org/2001/XMLSchema" xmlns:xs="http://www.w3.org/2001/XMLSchema" xmlns:p="http://schemas.microsoft.com/office/2006/metadata/properties" targetNamespace="http://schemas.microsoft.com/office/2006/metadata/properties" ma:root="true" ma:fieldsID="7f54f395c53e97cb256f6376e394fd4f">
     <xsd:element name="properties">
@@ -50330,32 +53018,10 @@
 </ct:contentTypeSchema>
 </file>
 
-<file path=customXml/item2.xml><?xml version="1.0" encoding="utf-8"?>
-<?mso-contentType ?>
-<FormTemplates xmlns="http://schemas.microsoft.com/sharepoint/v3/contenttype/forms">
-  <Display>DocumentLibraryForm</Display>
-  <Edit>DocumentLibraryForm</Edit>
-  <New>DocumentLibraryForm</New>
-</FormTemplates>
-</file>
-
-<file path=customXml/item3.xml><?xml version="1.0" encoding="utf-8"?>
-<p:properties xmlns:p="http://schemas.microsoft.com/office/2006/metadata/properties" xmlns:xsi="http://www.w3.org/2001/XMLSchema-instance" xmlns:pc="http://schemas.microsoft.com/office/infopath/2007/PartnerControls">
-  <documentManagement/>
-</p:properties>
-</file>
-
 <file path=customXml/itemProps1.xml><?xml version="1.0" encoding="utf-8"?>
-<ds:datastoreItem xmlns:ds="http://schemas.openxmlformats.org/officeDocument/2006/customXml" ds:itemID="{F64200F9-F1C7-4AF4-8613-860EE2E9155A}">
+<ds:datastoreItem xmlns:ds="http://schemas.openxmlformats.org/officeDocument/2006/customXml" ds:itemID="{76459249-2168-4084-A479-1289D424349D}">
   <ds:schemaRefs>
-    <ds:schemaRef ds:uri="http://schemas.microsoft.com/office/2006/metadata/contentType"/>
-    <ds:schemaRef ds:uri="http://schemas.microsoft.com/office/2006/metadata/properties/metaAttributes"/>
-    <ds:schemaRef ds:uri="http://www.w3.org/2001/XMLSchema"/>
     <ds:schemaRef ds:uri="http://schemas.microsoft.com/office/2006/metadata/properties"/>
-    <ds:schemaRef ds:uri="http://schemas.openxmlformats.org/package/2006/metadata/core-properties"/>
-    <ds:schemaRef ds:uri="http://purl.org/dc/elements/1.1/"/>
-    <ds:schemaRef ds:uri="http://purl.org/dc/terms/"/>
-    <ds:schemaRef ds:uri="http://schemas.microsoft.com/internal/obd"/>
     <ds:schemaRef ds:uri="http://schemas.microsoft.com/office/infopath/2007/PartnerControls"/>
   </ds:schemaRefs>
 </ds:datastoreItem>
@@ -50370,9 +53036,16 @@
 </file>
 
 <file path=customXml/itemProps3.xml><?xml version="1.0" encoding="utf-8"?>
-<ds:datastoreItem xmlns:ds="http://schemas.openxmlformats.org/officeDocument/2006/customXml" ds:itemID="{76459249-2168-4084-A479-1289D424349D}">
+<ds:datastoreItem xmlns:ds="http://schemas.openxmlformats.org/officeDocument/2006/customXml" ds:itemID="{F64200F9-F1C7-4AF4-8613-860EE2E9155A}">
   <ds:schemaRefs>
+    <ds:schemaRef ds:uri="http://schemas.microsoft.com/office/2006/metadata/contentType"/>
+    <ds:schemaRef ds:uri="http://schemas.microsoft.com/office/2006/metadata/properties/metaAttributes"/>
+    <ds:schemaRef ds:uri="http://www.w3.org/2001/XMLSchema"/>
     <ds:schemaRef ds:uri="http://schemas.microsoft.com/office/2006/metadata/properties"/>
+    <ds:schemaRef ds:uri="http://schemas.openxmlformats.org/package/2006/metadata/core-properties"/>
+    <ds:schemaRef ds:uri="http://purl.org/dc/elements/1.1/"/>
+    <ds:schemaRef ds:uri="http://purl.org/dc/terms/"/>
+    <ds:schemaRef ds:uri="http://schemas.microsoft.com/internal/obd"/>
     <ds:schemaRef ds:uri="http://schemas.microsoft.com/office/infopath/2007/PartnerControls"/>
   </ds:schemaRefs>
 </ds:datastoreItem>

</xml_diff>

<commit_message>
Fix some change on presentation : Air conditioning and Robot move
</commit_message>
<xml_diff>
--- a/Talentsoft-RD-Academy-Kinect.pptx
+++ b/Talentsoft-RD-Academy-Kinect.pptx
@@ -5,10 +5,10 @@
     <p:sldMasterId id="2147483648" r:id="rId4"/>
   </p:sldMasterIdLst>
   <p:notesMasterIdLst>
-    <p:notesMasterId r:id="rId29"/>
+    <p:notesMasterId r:id="rId30"/>
   </p:notesMasterIdLst>
   <p:handoutMasterIdLst>
-    <p:handoutMasterId r:id="rId30"/>
+    <p:handoutMasterId r:id="rId31"/>
   </p:handoutMasterIdLst>
   <p:sldIdLst>
     <p:sldId id="256" r:id="rId5"/>
@@ -30,11 +30,12 @@
     <p:sldId id="285" r:id="rId21"/>
     <p:sldId id="275" r:id="rId22"/>
     <p:sldId id="277" r:id="rId23"/>
-    <p:sldId id="276" r:id="rId24"/>
-    <p:sldId id="279" r:id="rId25"/>
-    <p:sldId id="286" r:id="rId26"/>
-    <p:sldId id="273" r:id="rId27"/>
-    <p:sldId id="272" r:id="rId28"/>
+    <p:sldId id="279" r:id="rId24"/>
+    <p:sldId id="287" r:id="rId25"/>
+    <p:sldId id="276" r:id="rId26"/>
+    <p:sldId id="286" r:id="rId27"/>
+    <p:sldId id="273" r:id="rId28"/>
+    <p:sldId id="272" r:id="rId29"/>
   </p:sldIdLst>
   <p:sldSz cx="9144000" cy="6858000" type="screen4x3"/>
   <p:notesSz cx="6858000" cy="9144000"/>
@@ -40783,10 +40784,12 @@
           <a:p>
             <a:r>
               <a:rPr lang="fr-FR" dirty="0"/>
-              <a:t>Live Coding : Reconnaissance vocale et Robotique</a:t>
-            </a:r>
-          </a:p>
-          <a:p>
+              <a:t>Live Coding : </a:t>
+            </a:r>
+            <a:r>
+              <a:rPr lang="fr-FR" dirty="0"/>
+              <a:t>Kinect et Robotique</a:t>
+            </a:r>
             <a:endParaRPr lang="fr-FR" dirty="0"/>
           </a:p>
         </p:txBody>
@@ -41697,15 +41700,7 @@
             </a:r>
             <a:r>
               <a:rPr lang="fr-FR" dirty="0" smtClean="0"/>
-              <a:t>Focus sur </a:t>
-            </a:r>
-            <a:r>
-              <a:rPr lang="fr-FR" dirty="0" err="1" smtClean="0"/>
-              <a:t>lA</a:t>
-            </a:r>
-            <a:r>
-              <a:rPr lang="fr-FR" dirty="0" smtClean="0"/>
-              <a:t> reconnaissance vocale</a:t>
+              <a:t>KINECT ET ROBOTIQUE</a:t>
             </a:r>
             <a:endParaRPr lang="fr-FR" dirty="0"/>
           </a:p>
@@ -41775,8 +41770,13 @@
           <a:p>
             <a:r>
               <a:rPr lang="fr-FR" dirty="0"/>
-              <a:t>Live Coding : Reconnaissance vocale et Robotique</a:t>
-            </a:r>
+              <a:t>Live Coding : </a:t>
+            </a:r>
+            <a:r>
+              <a:rPr lang="fr-FR" dirty="0" smtClean="0"/>
+              <a:t>Kinect et Robotique</a:t>
+            </a:r>
+            <a:endParaRPr lang="fr-FR" dirty="0"/>
           </a:p>
           <a:p>
             <a:endParaRPr lang="fr-FR" dirty="0"/>
@@ -45476,30 +45476,212 @@
           <a:chExt cx="0" cy="0"/>
         </a:xfrm>
       </p:grpSpPr>
+      <p:sp>
+        <p:nvSpPr>
+          <p:cNvPr id="2" name="Espace réservé du contenu 1"/>
+          <p:cNvSpPr>
+            <a:spLocks noGrp="1"/>
+          </p:cNvSpPr>
+          <p:nvPr>
+            <p:ph idx="1"/>
+          </p:nvPr>
+        </p:nvSpPr>
+        <p:spPr/>
+        <p:txBody>
+          <a:bodyPr/>
+          <a:lstStyle/>
+          <a:p>
+            <a:r>
+              <a:rPr lang="fr-FR" dirty="0" smtClean="0"/>
+              <a:t>Inclus dans le package </a:t>
+            </a:r>
+            <a:r>
+              <a:rPr lang="fr-FR" dirty="0" err="1" smtClean="0">
+                <a:latin typeface="Courier" pitchFamily="49" charset="0"/>
+              </a:rPr>
+              <a:t>System.IO.Ports</a:t>
+            </a:r>
+            <a:r>
+              <a:rPr lang="fr-FR" dirty="0" smtClean="0"/>
+              <a:t>  et la classe </a:t>
+            </a:r>
+            <a:r>
+              <a:rPr lang="fr-FR" dirty="0" err="1" smtClean="0">
+                <a:latin typeface="Courier" pitchFamily="49" charset="0"/>
+              </a:rPr>
+              <a:t>SerialPort</a:t>
+            </a:r>
+            <a:endParaRPr lang="fr-FR" dirty="0" smtClean="0">
+              <a:latin typeface="Courier" pitchFamily="49" charset="0"/>
+            </a:endParaRPr>
+          </a:p>
+          <a:p>
+            <a:r>
+              <a:rPr lang="fr-FR" dirty="0" smtClean="0"/>
+              <a:t>Permet d’avoir le même niveau de fonctionnalité que </a:t>
+            </a:r>
+            <a:r>
+              <a:rPr lang="fr-FR" dirty="0" smtClean="0">
+                <a:latin typeface="Courier" pitchFamily="49" charset="0"/>
+              </a:rPr>
+              <a:t>HyperTerminal</a:t>
+            </a:r>
+            <a:r>
+              <a:rPr lang="fr-FR" dirty="0" smtClean="0"/>
+              <a:t> ou </a:t>
+            </a:r>
+            <a:r>
+              <a:rPr lang="fr-FR" dirty="0" smtClean="0">
+                <a:latin typeface="Courier" pitchFamily="49" charset="0"/>
+              </a:rPr>
+              <a:t>Termite</a:t>
+            </a:r>
+          </a:p>
+          <a:p>
+            <a:r>
+              <a:rPr lang="fr-FR" dirty="0" smtClean="0"/>
+              <a:t>+ utilisé que l’USB ou l’Ethernet pour faire le lien entre des cartes mères et de l’embarqué</a:t>
+            </a:r>
+          </a:p>
+          <a:p>
+            <a:r>
+              <a:rPr lang="fr-FR" dirty="0" smtClean="0"/>
+              <a:t>Paramètres à intégrer</a:t>
+            </a:r>
+          </a:p>
+          <a:p>
+            <a:pPr lvl="1"/>
+            <a:r>
+              <a:rPr lang="fr-FR" dirty="0" smtClean="0"/>
+              <a:t>Taux de transmission (en bauds) : Ex : 115 200 bauds</a:t>
+            </a:r>
+          </a:p>
+          <a:p>
+            <a:pPr lvl="1"/>
+            <a:r>
+              <a:rPr lang="fr-FR" dirty="0" smtClean="0"/>
+              <a:t>Test de parité de bits (pour la correction d’erreurs). En général, aucun</a:t>
+            </a:r>
+          </a:p>
+          <a:p>
+            <a:pPr lvl="1"/>
+            <a:r>
+              <a:rPr lang="fr-FR" dirty="0" smtClean="0"/>
+              <a:t>Nombre de bits de données : Ex : 8</a:t>
+            </a:r>
+          </a:p>
+          <a:p>
+            <a:pPr lvl="1"/>
+            <a:r>
+              <a:rPr lang="fr-FR" dirty="0" smtClean="0"/>
+              <a:t>Bits de Stops (En général 1)</a:t>
+            </a:r>
+            <a:endParaRPr lang="fr-FR" dirty="0"/>
+          </a:p>
+        </p:txBody>
+      </p:sp>
+      <p:sp>
+        <p:nvSpPr>
+          <p:cNvPr id="3" name="Titre 2"/>
+          <p:cNvSpPr>
+            <a:spLocks noGrp="1"/>
+          </p:cNvSpPr>
+          <p:nvPr>
+            <p:ph type="title"/>
+          </p:nvPr>
+        </p:nvSpPr>
+        <p:spPr/>
+        <p:txBody>
+          <a:bodyPr/>
+          <a:lstStyle/>
+          <a:p>
+            <a:r>
+              <a:rPr lang="fr-FR" dirty="0" err="1"/>
+              <a:t>Uart</a:t>
+            </a:r>
+            <a:r>
+              <a:rPr lang="fr-FR" dirty="0"/>
+              <a:t> / Serial Module</a:t>
+            </a:r>
+            <a:br>
+              <a:rPr lang="fr-FR" dirty="0"/>
+            </a:br>
+            <a:endParaRPr lang="fr-FR" dirty="0"/>
+          </a:p>
+        </p:txBody>
+      </p:sp>
+      <p:sp>
+        <p:nvSpPr>
+          <p:cNvPr id="4" name="Espace réservé du numéro de diapositive 3"/>
+          <p:cNvSpPr>
+            <a:spLocks noGrp="1"/>
+          </p:cNvSpPr>
+          <p:nvPr>
+            <p:ph type="sldNum" sz="quarter" idx="4"/>
+          </p:nvPr>
+        </p:nvSpPr>
+        <p:spPr/>
+        <p:txBody>
+          <a:bodyPr/>
+          <a:lstStyle/>
+          <a:p>
+            <a:fld id="{C47C2D81-940B-4685-92D1-3ECF90F4940E}" type="slidenum">
+              <a:rPr lang="fr-FR" smtClean="0"/>
+              <a:pPr/>
+              <a:t>20</a:t>
+            </a:fld>
+            <a:endParaRPr lang="fr-FR" dirty="0"/>
+          </a:p>
+        </p:txBody>
+      </p:sp>
+    </p:spTree>
+    <p:extLst>
+      <p:ext uri="{BB962C8B-B14F-4D97-AF65-F5344CB8AC3E}">
+        <p14:creationId xmlns:p14="http://schemas.microsoft.com/office/powerpoint/2010/main" val="2624478632"/>
+      </p:ext>
+    </p:extLst>
+  </p:cSld>
+  <p:clrMapOvr>
+    <a:masterClrMapping/>
+  </p:clrMapOvr>
+</p:sld>
+</file>
+
+<file path=ppt/slides/slide21.xml><?xml version="1.0" encoding="utf-8"?>
+<p:sld xmlns:a="http://schemas.openxmlformats.org/drawingml/2006/main" xmlns:r="http://schemas.openxmlformats.org/officeDocument/2006/relationships" xmlns:p="http://schemas.openxmlformats.org/presentationml/2006/main">
+  <p:cSld>
+    <p:spTree>
+      <p:nvGrpSpPr>
+        <p:cNvPr id="1" name=""/>
+        <p:cNvGrpSpPr/>
+        <p:nvPr/>
+      </p:nvGrpSpPr>
+      <p:grpSpPr>
+        <a:xfrm>
+          <a:off x="0" y="0"/>
+          <a:ext cx="0" cy="0"/>
+          <a:chOff x="0" y="0"/>
+          <a:chExt cx="0" cy="0"/>
+        </a:xfrm>
+      </p:grpSpPr>
       <p:pic>
         <p:nvPicPr>
-          <p:cNvPr id="3" name="Image 2"/>
+          <p:cNvPr id="2" name="Image 1"/>
           <p:cNvPicPr>
             <a:picLocks noChangeAspect="1"/>
           </p:cNvPicPr>
           <p:nvPr/>
         </p:nvPicPr>
         <p:blipFill>
-          <a:blip r:embed="rId2">
-            <a:extLst>
-              <a:ext uri="{28A0092B-C50C-407E-A947-70E740481C1C}">
-                <a14:useLocalDpi xmlns:a14="http://schemas.microsoft.com/office/drawing/2010/main" val="0"/>
-              </a:ext>
-            </a:extLst>
-          </a:blip>
+          <a:blip r:embed="rId2"/>
           <a:stretch>
             <a:fillRect/>
           </a:stretch>
         </p:blipFill>
         <p:spPr>
           <a:xfrm>
-            <a:off x="102010" y="1727769"/>
-            <a:ext cx="1186697" cy="1181423"/>
+            <a:off x="64924" y="1669618"/>
+            <a:ext cx="1277853" cy="1135076"/>
           </a:xfrm>
           <a:prstGeom prst="rect">
             <a:avLst/>
@@ -45524,7 +45706,7 @@
             <a:fld id="{C47C2D81-940B-4685-92D1-3ECF90F4940E}" type="slidenum">
               <a:rPr lang="fr-FR" smtClean="0"/>
               <a:pPr/>
-              <a:t>20</a:t>
+              <a:t>21</a:t>
             </a:fld>
             <a:endParaRPr lang="fr-FR" dirty="0"/>
           </a:p>
@@ -45626,7 +45808,7 @@
           <a:p>
             <a:r>
               <a:rPr lang="fr-FR" dirty="0" smtClean="0"/>
-              <a:t>Focus sur la reconnaissance vocale</a:t>
+              <a:t>Commander à distance un robot avec la Kinect</a:t>
             </a:r>
             <a:endParaRPr lang="fr-FR" dirty="0"/>
           </a:p>
@@ -46755,7 +46937,7 @@
     </p:spTree>
     <p:extLst>
       <p:ext uri="{BB962C8B-B14F-4D97-AF65-F5344CB8AC3E}">
-        <p14:creationId xmlns:p14="http://schemas.microsoft.com/office/powerpoint/2010/main" val="208255331"/>
+        <p14:creationId xmlns:p14="http://schemas.microsoft.com/office/powerpoint/2010/main" val="1487022732"/>
       </p:ext>
     </p:extLst>
   </p:cSld>
@@ -46765,7 +46947,7 @@
 </p:sld>
 </file>
 
-<file path=ppt/slides/slide21.xml><?xml version="1.0" encoding="utf-8"?>
+<file path=ppt/slides/slide22.xml><?xml version="1.0" encoding="utf-8"?>
 <p:sld xmlns:a="http://schemas.openxmlformats.org/drawingml/2006/main" xmlns:r="http://schemas.openxmlformats.org/officeDocument/2006/relationships" xmlns:p="http://schemas.openxmlformats.org/presentationml/2006/main">
   <p:cSld>
     <p:spTree>
@@ -46782,140 +46964,36 @@
           <a:chExt cx="0" cy="0"/>
         </a:xfrm>
       </p:grpSpPr>
-      <p:sp>
-        <p:nvSpPr>
-          <p:cNvPr id="2" name="Espace réservé du contenu 1"/>
-          <p:cNvSpPr>
-            <a:spLocks noGrp="1"/>
-          </p:cNvSpPr>
-          <p:nvPr>
-            <p:ph idx="1"/>
-          </p:nvPr>
-        </p:nvSpPr>
-        <p:spPr/>
-        <p:txBody>
-          <a:bodyPr/>
-          <a:lstStyle/>
-          <a:p>
-            <a:r>
-              <a:rPr lang="fr-FR" dirty="0" smtClean="0"/>
-              <a:t>Inclus dans le package </a:t>
-            </a:r>
-            <a:r>
-              <a:rPr lang="fr-FR" dirty="0" err="1" smtClean="0">
-                <a:latin typeface="Courier" pitchFamily="49" charset="0"/>
-              </a:rPr>
-              <a:t>System.IO.Ports</a:t>
-            </a:r>
-            <a:r>
-              <a:rPr lang="fr-FR" dirty="0" smtClean="0"/>
-              <a:t>  et la classe </a:t>
-            </a:r>
-            <a:r>
-              <a:rPr lang="fr-FR" dirty="0" err="1" smtClean="0">
-                <a:latin typeface="Courier" pitchFamily="49" charset="0"/>
-              </a:rPr>
-              <a:t>SerialPort</a:t>
-            </a:r>
-            <a:endParaRPr lang="fr-FR" dirty="0" smtClean="0">
-              <a:latin typeface="Courier" pitchFamily="49" charset="0"/>
-            </a:endParaRPr>
-          </a:p>
-          <a:p>
-            <a:r>
-              <a:rPr lang="fr-FR" dirty="0" smtClean="0"/>
-              <a:t>Permet d’avoir le même niveau de fonctionnalité que </a:t>
-            </a:r>
-            <a:r>
-              <a:rPr lang="fr-FR" dirty="0" smtClean="0">
-                <a:latin typeface="Courier" pitchFamily="49" charset="0"/>
-              </a:rPr>
-              <a:t>HyperTerminal</a:t>
-            </a:r>
-            <a:r>
-              <a:rPr lang="fr-FR" dirty="0" smtClean="0"/>
-              <a:t> ou </a:t>
-            </a:r>
-            <a:r>
-              <a:rPr lang="fr-FR" dirty="0" smtClean="0">
-                <a:latin typeface="Courier" pitchFamily="49" charset="0"/>
-              </a:rPr>
-              <a:t>Termite</a:t>
-            </a:r>
-          </a:p>
-          <a:p>
-            <a:r>
-              <a:rPr lang="fr-FR" dirty="0" smtClean="0"/>
-              <a:t>+ utilisé que l’USB ou l’Ethernet pour faire le lien entre des cartes mères et de l’embarqué</a:t>
-            </a:r>
-          </a:p>
-          <a:p>
-            <a:r>
-              <a:rPr lang="fr-FR" dirty="0" smtClean="0"/>
-              <a:t>Paramètres à intégrer</a:t>
-            </a:r>
-          </a:p>
-          <a:p>
-            <a:pPr lvl="1"/>
-            <a:r>
-              <a:rPr lang="fr-FR" dirty="0" smtClean="0"/>
-              <a:t>Taux de transmission (en bauds) : Ex : 115 200 bauds</a:t>
-            </a:r>
-          </a:p>
-          <a:p>
-            <a:pPr lvl="1"/>
-            <a:r>
-              <a:rPr lang="fr-FR" dirty="0" smtClean="0"/>
-              <a:t>Test de parité de bits (pour la correction d’erreurs). En général, aucun</a:t>
-            </a:r>
-          </a:p>
-          <a:p>
-            <a:pPr lvl="1"/>
-            <a:r>
-              <a:rPr lang="fr-FR" dirty="0" smtClean="0"/>
-              <a:t>Nombre de bits de données : Ex : 8</a:t>
-            </a:r>
-          </a:p>
-          <a:p>
-            <a:pPr lvl="1"/>
-            <a:r>
-              <a:rPr lang="fr-FR" dirty="0" smtClean="0"/>
-              <a:t>Bits de Stops (En général 1)</a:t>
-            </a:r>
-            <a:endParaRPr lang="fr-FR" dirty="0"/>
-          </a:p>
-        </p:txBody>
-      </p:sp>
-      <p:sp>
-        <p:nvSpPr>
-          <p:cNvPr id="3" name="Titre 2"/>
-          <p:cNvSpPr>
-            <a:spLocks noGrp="1"/>
-          </p:cNvSpPr>
-          <p:nvPr>
-            <p:ph type="title"/>
-          </p:nvPr>
-        </p:nvSpPr>
-        <p:spPr/>
-        <p:txBody>
-          <a:bodyPr/>
-          <a:lstStyle/>
-          <a:p>
-            <a:r>
-              <a:rPr lang="fr-FR" dirty="0" err="1"/>
-              <a:t>Uart</a:t>
-            </a:r>
-            <a:r>
-              <a:rPr lang="fr-FR" dirty="0"/>
-              <a:t> / Serial Module</a:t>
-            </a:r>
-            <a:br>
-              <a:rPr lang="fr-FR" dirty="0"/>
-            </a:br>
-            <a:endParaRPr lang="fr-FR" dirty="0"/>
-          </a:p>
-        </p:txBody>
-      </p:sp>
+      <p:pic>
+        <p:nvPicPr>
+          <p:cNvPr id="3" name="Image 2"/>
+          <p:cNvPicPr>
+            <a:picLocks noChangeAspect="1"/>
+          </p:cNvPicPr>
+          <p:nvPr/>
+        </p:nvPicPr>
+        <p:blipFill>
+          <a:blip r:embed="rId2">
+            <a:extLst>
+              <a:ext uri="{28A0092B-C50C-407E-A947-70E740481C1C}">
+                <a14:useLocalDpi xmlns:a14="http://schemas.microsoft.com/office/drawing/2010/main" val="0"/>
+              </a:ext>
+            </a:extLst>
+          </a:blip>
+          <a:stretch>
+            <a:fillRect/>
+          </a:stretch>
+        </p:blipFill>
+        <p:spPr>
+          <a:xfrm>
+            <a:off x="102010" y="1727769"/>
+            <a:ext cx="1186697" cy="1181423"/>
+          </a:xfrm>
+          <a:prstGeom prst="rect">
+            <a:avLst/>
+          </a:prstGeom>
+        </p:spPr>
+      </p:pic>
       <p:sp>
         <p:nvSpPr>
           <p:cNvPr id="4" name="Espace réservé du numéro de diapositive 3"/>
@@ -46934,16 +47012,1176 @@
             <a:fld id="{C47C2D81-940B-4685-92D1-3ECF90F4940E}" type="slidenum">
               <a:rPr lang="fr-FR" smtClean="0"/>
               <a:pPr/>
-              <a:t>21</a:t>
+              <a:t>22</a:t>
             </a:fld>
             <a:endParaRPr lang="fr-FR" dirty="0"/>
           </a:p>
         </p:txBody>
       </p:sp>
+      <p:sp>
+        <p:nvSpPr>
+          <p:cNvPr id="6" name="Titre 2"/>
+          <p:cNvSpPr txBox="1">
+            <a:spLocks/>
+          </p:cNvSpPr>
+          <p:nvPr/>
+        </p:nvSpPr>
+        <p:spPr>
+          <a:xfrm>
+            <a:off x="360000" y="291739"/>
+            <a:ext cx="8460000" cy="1308462"/>
+          </a:xfrm>
+          <a:prstGeom prst="rect">
+            <a:avLst/>
+          </a:prstGeom>
+        </p:spPr>
+        <p:txBody>
+          <a:bodyPr vert="horz" lIns="91440" tIns="45720" rIns="91440" bIns="45720" rtlCol="0" anchor="ctr">
+            <a:normAutofit/>
+          </a:bodyPr>
+          <a:lstStyle>
+            <a:lvl1pPr algn="l" defTabSz="457200" rtl="0" eaLnBrk="1" latinLnBrk="0" hangingPunct="1">
+              <a:spcBef>
+                <a:spcPct val="0"/>
+              </a:spcBef>
+              <a:buNone/>
+              <a:defRPr sz="3000" b="0" i="0" kern="1200" cap="none">
+                <a:solidFill>
+                  <a:schemeClr val="tx2"/>
+                </a:solidFill>
+                <a:latin typeface="+mj-lt"/>
+                <a:ea typeface="+mj-ea"/>
+                <a:cs typeface="Arial Narrow"/>
+              </a:defRPr>
+            </a:lvl1pPr>
+            <a:lvl2pPr eaLnBrk="1" hangingPunct="1">
+              <a:defRPr>
+                <a:solidFill>
+                  <a:schemeClr val="tx2"/>
+                </a:solidFill>
+              </a:defRPr>
+            </a:lvl2pPr>
+            <a:lvl3pPr eaLnBrk="1" hangingPunct="1">
+              <a:defRPr>
+                <a:solidFill>
+                  <a:schemeClr val="tx2"/>
+                </a:solidFill>
+              </a:defRPr>
+            </a:lvl3pPr>
+            <a:lvl4pPr eaLnBrk="1" hangingPunct="1">
+              <a:defRPr>
+                <a:solidFill>
+                  <a:schemeClr val="tx2"/>
+                </a:solidFill>
+              </a:defRPr>
+            </a:lvl4pPr>
+            <a:lvl5pPr eaLnBrk="1" hangingPunct="1">
+              <a:defRPr>
+                <a:solidFill>
+                  <a:schemeClr val="tx2"/>
+                </a:solidFill>
+              </a:defRPr>
+            </a:lvl5pPr>
+            <a:lvl6pPr eaLnBrk="1" hangingPunct="1">
+              <a:defRPr>
+                <a:solidFill>
+                  <a:schemeClr val="tx2"/>
+                </a:solidFill>
+              </a:defRPr>
+            </a:lvl6pPr>
+            <a:lvl7pPr eaLnBrk="1" hangingPunct="1">
+              <a:defRPr>
+                <a:solidFill>
+                  <a:schemeClr val="tx2"/>
+                </a:solidFill>
+              </a:defRPr>
+            </a:lvl7pPr>
+            <a:lvl8pPr eaLnBrk="1" hangingPunct="1">
+              <a:defRPr>
+                <a:solidFill>
+                  <a:schemeClr val="tx2"/>
+                </a:solidFill>
+              </a:defRPr>
+            </a:lvl8pPr>
+            <a:lvl9pPr eaLnBrk="1" hangingPunct="1">
+              <a:defRPr>
+                <a:solidFill>
+                  <a:schemeClr val="tx2"/>
+                </a:solidFill>
+              </a:defRPr>
+            </a:lvl9pPr>
+          </a:lstStyle>
+          <a:p>
+            <a:r>
+              <a:rPr lang="fr-FR" dirty="0" smtClean="0"/>
+              <a:t>Focus sur la reconnaissance vocale</a:t>
+            </a:r>
+            <a:endParaRPr lang="fr-FR" dirty="0"/>
+          </a:p>
+        </p:txBody>
+      </p:sp>
+      <p:pic>
+        <p:nvPicPr>
+          <p:cNvPr id="8" name="Image 7"/>
+          <p:cNvPicPr>
+            <a:picLocks noChangeAspect="1"/>
+          </p:cNvPicPr>
+          <p:nvPr/>
+        </p:nvPicPr>
+        <p:blipFill>
+          <a:blip r:embed="rId3">
+            <a:extLst>
+              <a:ext uri="{28A0092B-C50C-407E-A947-70E740481C1C}">
+                <a14:useLocalDpi xmlns:a14="http://schemas.microsoft.com/office/drawing/2010/main" val="0"/>
+              </a:ext>
+            </a:extLst>
+          </a:blip>
+          <a:srcRect/>
+          <a:stretch>
+            <a:fillRect/>
+          </a:stretch>
+        </p:blipFill>
+        <p:spPr bwMode="auto">
+          <a:xfrm>
+            <a:off x="3793791" y="1926033"/>
+            <a:ext cx="1901875" cy="1097085"/>
+          </a:xfrm>
+          <a:prstGeom prst="rect">
+            <a:avLst/>
+          </a:prstGeom>
+          <a:noFill/>
+          <a:ln>
+            <a:noFill/>
+          </a:ln>
+          <a:extLst>
+            <a:ext uri="{909E8E84-426E-40DD-AFC4-6F175D3DCCD1}">
+              <a14:hiddenFill xmlns:a14="http://schemas.microsoft.com/office/drawing/2010/main">
+                <a:solidFill>
+                  <a:srgbClr val="FFFFFF"/>
+                </a:solidFill>
+              </a14:hiddenFill>
+            </a:ext>
+            <a:ext uri="{91240B29-F687-4F45-9708-019B960494DF}">
+              <a14:hiddenLine xmlns:a14="http://schemas.microsoft.com/office/drawing/2010/main" w="9525">
+                <a:solidFill>
+                  <a:srgbClr val="000000"/>
+                </a:solidFill>
+                <a:miter lim="800000"/>
+                <a:headEnd/>
+                <a:tailEnd/>
+              </a14:hiddenLine>
+            </a:ext>
+          </a:extLst>
+        </p:spPr>
+      </p:pic>
+      <p:pic>
+        <p:nvPicPr>
+          <p:cNvPr id="10" name="Image 8"/>
+          <p:cNvPicPr>
+            <a:picLocks noChangeAspect="1"/>
+          </p:cNvPicPr>
+          <p:nvPr/>
+        </p:nvPicPr>
+        <p:blipFill>
+          <a:blip r:embed="rId4">
+            <a:extLst>
+              <a:ext uri="{28A0092B-C50C-407E-A947-70E740481C1C}">
+                <a14:useLocalDpi xmlns:a14="http://schemas.microsoft.com/office/drawing/2010/main" val="0"/>
+              </a:ext>
+            </a:extLst>
+          </a:blip>
+          <a:srcRect/>
+          <a:stretch>
+            <a:fillRect/>
+          </a:stretch>
+        </p:blipFill>
+        <p:spPr bwMode="auto">
+          <a:xfrm>
+            <a:off x="5754405" y="2158793"/>
+            <a:ext cx="423862" cy="420688"/>
+          </a:xfrm>
+          <a:prstGeom prst="rect">
+            <a:avLst/>
+          </a:prstGeom>
+          <a:noFill/>
+          <a:ln>
+            <a:noFill/>
+          </a:ln>
+          <a:extLst>
+            <a:ext uri="{909E8E84-426E-40DD-AFC4-6F175D3DCCD1}">
+              <a14:hiddenFill xmlns:a14="http://schemas.microsoft.com/office/drawing/2010/main">
+                <a:solidFill>
+                  <a:srgbClr val="FFFFFF"/>
+                </a:solidFill>
+              </a14:hiddenFill>
+            </a:ext>
+            <a:ext uri="{91240B29-F687-4F45-9708-019B960494DF}">
+              <a14:hiddenLine xmlns:a14="http://schemas.microsoft.com/office/drawing/2010/main" w="9525">
+                <a:solidFill>
+                  <a:srgbClr val="000000"/>
+                </a:solidFill>
+                <a:miter lim="800000"/>
+                <a:headEnd/>
+                <a:tailEnd/>
+              </a14:hiddenLine>
+            </a:ext>
+          </a:extLst>
+        </p:spPr>
+      </p:pic>
+      <p:pic>
+        <p:nvPicPr>
+          <p:cNvPr id="12" name="Image 13"/>
+          <p:cNvPicPr>
+            <a:picLocks noChangeAspect="1"/>
+          </p:cNvPicPr>
+          <p:nvPr/>
+        </p:nvPicPr>
+        <p:blipFill>
+          <a:blip r:embed="rId5">
+            <a:extLst>
+              <a:ext uri="{28A0092B-C50C-407E-A947-70E740481C1C}">
+                <a14:useLocalDpi xmlns:a14="http://schemas.microsoft.com/office/drawing/2010/main" val="0"/>
+              </a:ext>
+            </a:extLst>
+          </a:blip>
+          <a:srcRect/>
+          <a:stretch>
+            <a:fillRect/>
+          </a:stretch>
+        </p:blipFill>
+        <p:spPr bwMode="auto">
+          <a:xfrm>
+            <a:off x="496468" y="3759795"/>
+            <a:ext cx="685800" cy="587375"/>
+          </a:xfrm>
+          <a:prstGeom prst="rect">
+            <a:avLst/>
+          </a:prstGeom>
+          <a:noFill/>
+          <a:ln>
+            <a:noFill/>
+          </a:ln>
+          <a:extLst>
+            <a:ext uri="{909E8E84-426E-40DD-AFC4-6F175D3DCCD1}">
+              <a14:hiddenFill xmlns:a14="http://schemas.microsoft.com/office/drawing/2010/main">
+                <a:solidFill>
+                  <a:srgbClr val="FFFFFF"/>
+                </a:solidFill>
+              </a14:hiddenFill>
+            </a:ext>
+            <a:ext uri="{91240B29-F687-4F45-9708-019B960494DF}">
+              <a14:hiddenLine xmlns:a14="http://schemas.microsoft.com/office/drawing/2010/main" w="9525">
+                <a:solidFill>
+                  <a:srgbClr val="000000"/>
+                </a:solidFill>
+                <a:miter lim="800000"/>
+                <a:headEnd/>
+                <a:tailEnd/>
+              </a14:hiddenLine>
+            </a:ext>
+          </a:extLst>
+        </p:spPr>
+      </p:pic>
+      <p:cxnSp>
+        <p:nvCxnSpPr>
+          <p:cNvPr id="13" name="Connecteur droit avec flèche 12"/>
+          <p:cNvCxnSpPr/>
+          <p:nvPr/>
+        </p:nvCxnSpPr>
+        <p:spPr bwMode="auto">
+          <a:xfrm>
+            <a:off x="1130846" y="2397810"/>
+            <a:ext cx="423863" cy="0"/>
+          </a:xfrm>
+          <a:prstGeom prst="straightConnector1">
+            <a:avLst/>
+          </a:prstGeom>
+          <a:ln>
+            <a:headEnd type="triangle" w="med" len="med"/>
+            <a:tailEnd type="triangle"/>
+          </a:ln>
+          <a:extLst/>
+        </p:spPr>
+        <p:style>
+          <a:lnRef idx="3">
+            <a:schemeClr val="accent4"/>
+          </a:lnRef>
+          <a:fillRef idx="0">
+            <a:schemeClr val="accent4"/>
+          </a:fillRef>
+          <a:effectRef idx="2">
+            <a:schemeClr val="accent4"/>
+          </a:effectRef>
+          <a:fontRef idx="minor">
+            <a:schemeClr val="tx1"/>
+          </a:fontRef>
+        </p:style>
+      </p:cxnSp>
+      <p:cxnSp>
+        <p:nvCxnSpPr>
+          <p:cNvPr id="14" name="Connecteur droit avec flèche 13"/>
+          <p:cNvCxnSpPr/>
+          <p:nvPr/>
+        </p:nvCxnSpPr>
+        <p:spPr bwMode="auto">
+          <a:xfrm flipH="1">
+            <a:off x="1554710" y="4084777"/>
+            <a:ext cx="1421755" cy="0"/>
+          </a:xfrm>
+          <a:prstGeom prst="straightConnector1">
+            <a:avLst/>
+          </a:prstGeom>
+          <a:ln>
+            <a:headEnd type="triangle" w="med" len="med"/>
+            <a:tailEnd type="triangle"/>
+          </a:ln>
+          <a:extLst/>
+        </p:spPr>
+        <p:style>
+          <a:lnRef idx="3">
+            <a:schemeClr val="accent1"/>
+          </a:lnRef>
+          <a:fillRef idx="0">
+            <a:schemeClr val="accent1"/>
+          </a:fillRef>
+          <a:effectRef idx="2">
+            <a:schemeClr val="accent1"/>
+          </a:effectRef>
+          <a:fontRef idx="minor">
+            <a:schemeClr val="tx1"/>
+          </a:fontRef>
+        </p:style>
+      </p:cxnSp>
+      <p:sp>
+        <p:nvSpPr>
+          <p:cNvPr id="15" name="ZoneTexte 22"/>
+          <p:cNvSpPr txBox="1">
+            <a:spLocks noChangeArrowheads="1"/>
+          </p:cNvSpPr>
+          <p:nvPr/>
+        </p:nvSpPr>
+        <p:spPr bwMode="auto">
+          <a:xfrm>
+            <a:off x="1956818" y="3794440"/>
+            <a:ext cx="617537" cy="261937"/>
+          </a:xfrm>
+          <a:prstGeom prst="rect">
+            <a:avLst/>
+          </a:prstGeom>
+          <a:noFill/>
+          <a:ln>
+            <a:noFill/>
+          </a:ln>
+          <a:extLst>
+            <a:ext uri="{909E8E84-426E-40DD-AFC4-6F175D3DCCD1}">
+              <a14:hiddenFill xmlns:a14="http://schemas.microsoft.com/office/drawing/2010/main">
+                <a:solidFill>
+                  <a:srgbClr val="FFFFFF"/>
+                </a:solidFill>
+              </a14:hiddenFill>
+            </a:ext>
+            <a:ext uri="{91240B29-F687-4F45-9708-019B960494DF}">
+              <a14:hiddenLine xmlns:a14="http://schemas.microsoft.com/office/drawing/2010/main" w="9525">
+                <a:solidFill>
+                  <a:srgbClr val="000000"/>
+                </a:solidFill>
+                <a:miter lim="800000"/>
+                <a:headEnd/>
+                <a:tailEnd/>
+              </a14:hiddenLine>
+            </a:ext>
+          </a:extLst>
+        </p:spPr>
+        <p:txBody>
+          <a:bodyPr wrap="none">
+            <a:spAutoFit/>
+          </a:bodyPr>
+          <a:lstStyle/>
+          <a:p>
+            <a:pPr eaLnBrk="1" hangingPunct="1">
+              <a:buClr>
+                <a:srgbClr val="000000"/>
+              </a:buClr>
+              <a:buSzPct val="100000"/>
+              <a:buFont typeface="Times New Roman" panose="02020603050405020304" pitchFamily="18" charset="0"/>
+              <a:buNone/>
+            </a:pPr>
+            <a:r>
+              <a:rPr lang="fr-FR" altLang="fr-FR" sz="1100" dirty="0">
+                <a:solidFill>
+                  <a:schemeClr val="tx1"/>
+                </a:solidFill>
+              </a:rPr>
+              <a:t>RS232</a:t>
+            </a:r>
+          </a:p>
+        </p:txBody>
+      </p:sp>
+      <p:pic>
+        <p:nvPicPr>
+          <p:cNvPr id="16" name="Image 23"/>
+          <p:cNvPicPr>
+            <a:picLocks noChangeAspect="1"/>
+          </p:cNvPicPr>
+          <p:nvPr/>
+        </p:nvPicPr>
+        <p:blipFill>
+          <a:blip r:embed="rId6">
+            <a:extLst>
+              <a:ext uri="{28A0092B-C50C-407E-A947-70E740481C1C}">
+                <a14:useLocalDpi xmlns:a14="http://schemas.microsoft.com/office/drawing/2010/main" val="0"/>
+              </a:ext>
+            </a:extLst>
+          </a:blip>
+          <a:srcRect/>
+          <a:stretch>
+            <a:fillRect/>
+          </a:stretch>
+        </p:blipFill>
+        <p:spPr bwMode="auto">
+          <a:xfrm>
+            <a:off x="1554709" y="2060575"/>
+            <a:ext cx="1550897" cy="750887"/>
+          </a:xfrm>
+          <a:prstGeom prst="rect">
+            <a:avLst/>
+          </a:prstGeom>
+          <a:noFill/>
+          <a:ln>
+            <a:noFill/>
+          </a:ln>
+          <a:extLst>
+            <a:ext uri="{909E8E84-426E-40DD-AFC4-6F175D3DCCD1}">
+              <a14:hiddenFill xmlns:a14="http://schemas.microsoft.com/office/drawing/2010/main">
+                <a:solidFill>
+                  <a:srgbClr val="FFFFFF"/>
+                </a:solidFill>
+              </a14:hiddenFill>
+            </a:ext>
+            <a:ext uri="{91240B29-F687-4F45-9708-019B960494DF}">
+              <a14:hiddenLine xmlns:a14="http://schemas.microsoft.com/office/drawing/2010/main" w="9525">
+                <a:solidFill>
+                  <a:srgbClr val="000000"/>
+                </a:solidFill>
+                <a:miter lim="800000"/>
+                <a:headEnd/>
+                <a:tailEnd/>
+              </a14:hiddenLine>
+            </a:ext>
+          </a:extLst>
+        </p:spPr>
+      </p:pic>
+      <p:pic>
+        <p:nvPicPr>
+          <p:cNvPr id="19" name="Image 27"/>
+          <p:cNvPicPr>
+            <a:picLocks noChangeAspect="1"/>
+          </p:cNvPicPr>
+          <p:nvPr/>
+        </p:nvPicPr>
+        <p:blipFill>
+          <a:blip r:embed="rId7">
+            <a:extLst>
+              <a:ext uri="{28A0092B-C50C-407E-A947-70E740481C1C}">
+                <a14:useLocalDpi xmlns:a14="http://schemas.microsoft.com/office/drawing/2010/main" val="0"/>
+              </a:ext>
+            </a:extLst>
+          </a:blip>
+          <a:srcRect/>
+          <a:stretch>
+            <a:fillRect/>
+          </a:stretch>
+        </p:blipFill>
+        <p:spPr bwMode="auto">
+          <a:xfrm>
+            <a:off x="3210360" y="2451687"/>
+            <a:ext cx="420687" cy="255588"/>
+          </a:xfrm>
+          <a:prstGeom prst="rect">
+            <a:avLst/>
+          </a:prstGeom>
+          <a:noFill/>
+          <a:ln>
+            <a:noFill/>
+          </a:ln>
+          <a:extLst>
+            <a:ext uri="{909E8E84-426E-40DD-AFC4-6F175D3DCCD1}">
+              <a14:hiddenFill xmlns:a14="http://schemas.microsoft.com/office/drawing/2010/main">
+                <a:solidFill>
+                  <a:srgbClr val="FFFFFF"/>
+                </a:solidFill>
+              </a14:hiddenFill>
+            </a:ext>
+            <a:ext uri="{91240B29-F687-4F45-9708-019B960494DF}">
+              <a14:hiddenLine xmlns:a14="http://schemas.microsoft.com/office/drawing/2010/main" w="9525">
+                <a:solidFill>
+                  <a:srgbClr val="000000"/>
+                </a:solidFill>
+                <a:miter lim="800000"/>
+                <a:headEnd/>
+                <a:tailEnd/>
+              </a14:hiddenLine>
+            </a:ext>
+          </a:extLst>
+        </p:spPr>
+      </p:pic>
+      <p:sp>
+        <p:nvSpPr>
+          <p:cNvPr id="20" name="ZoneTexte 28"/>
+          <p:cNvSpPr txBox="1">
+            <a:spLocks noChangeArrowheads="1"/>
+          </p:cNvSpPr>
+          <p:nvPr/>
+        </p:nvSpPr>
+        <p:spPr bwMode="auto">
+          <a:xfrm>
+            <a:off x="4272437" y="3087305"/>
+            <a:ext cx="1322388" cy="261937"/>
+          </a:xfrm>
+          <a:prstGeom prst="rect">
+            <a:avLst/>
+          </a:prstGeom>
+          <a:noFill/>
+          <a:ln>
+            <a:noFill/>
+          </a:ln>
+          <a:extLst>
+            <a:ext uri="{909E8E84-426E-40DD-AFC4-6F175D3DCCD1}">
+              <a14:hiddenFill xmlns:a14="http://schemas.microsoft.com/office/drawing/2010/main">
+                <a:solidFill>
+                  <a:srgbClr val="FFFFFF"/>
+                </a:solidFill>
+              </a14:hiddenFill>
+            </a:ext>
+            <a:ext uri="{91240B29-F687-4F45-9708-019B960494DF}">
+              <a14:hiddenLine xmlns:a14="http://schemas.microsoft.com/office/drawing/2010/main" w="9525">
+                <a:solidFill>
+                  <a:srgbClr val="000000"/>
+                </a:solidFill>
+                <a:miter lim="800000"/>
+                <a:headEnd/>
+                <a:tailEnd/>
+              </a14:hiddenLine>
+            </a:ext>
+          </a:extLst>
+        </p:spPr>
+        <p:txBody>
+          <a:bodyPr wrap="none">
+            <a:spAutoFit/>
+          </a:bodyPr>
+          <a:lstStyle/>
+          <a:p>
+            <a:pPr eaLnBrk="1" hangingPunct="1">
+              <a:buClr>
+                <a:srgbClr val="000000"/>
+              </a:buClr>
+              <a:buSzPct val="100000"/>
+              <a:buFont typeface="Times New Roman" panose="02020603050405020304" pitchFamily="18" charset="0"/>
+              <a:buNone/>
+            </a:pPr>
+            <a:r>
+              <a:rPr lang="fr-FR" altLang="fr-FR" sz="1100">
+                <a:solidFill>
+                  <a:schemeClr val="tx1"/>
+                </a:solidFill>
+              </a:rPr>
+              <a:t>EPIA NANO P920</a:t>
+            </a:r>
+          </a:p>
+        </p:txBody>
+      </p:sp>
+      <p:pic>
+        <p:nvPicPr>
+          <p:cNvPr id="21" name="Image 47"/>
+          <p:cNvPicPr>
+            <a:picLocks noChangeAspect="1"/>
+          </p:cNvPicPr>
+          <p:nvPr/>
+        </p:nvPicPr>
+        <p:blipFill>
+          <a:blip r:embed="rId8">
+            <a:extLst>
+              <a:ext uri="{28A0092B-C50C-407E-A947-70E740481C1C}">
+                <a14:useLocalDpi xmlns:a14="http://schemas.microsoft.com/office/drawing/2010/main" val="0"/>
+              </a:ext>
+            </a:extLst>
+          </a:blip>
+          <a:srcRect/>
+          <a:stretch>
+            <a:fillRect/>
+          </a:stretch>
+        </p:blipFill>
+        <p:spPr bwMode="auto">
+          <a:xfrm>
+            <a:off x="3105606" y="3603184"/>
+            <a:ext cx="1441450" cy="1035050"/>
+          </a:xfrm>
+          <a:prstGeom prst="rect">
+            <a:avLst/>
+          </a:prstGeom>
+          <a:noFill/>
+          <a:ln>
+            <a:noFill/>
+          </a:ln>
+          <a:extLst>
+            <a:ext uri="{909E8E84-426E-40DD-AFC4-6F175D3DCCD1}">
+              <a14:hiddenFill xmlns:a14="http://schemas.microsoft.com/office/drawing/2010/main">
+                <a:solidFill>
+                  <a:srgbClr val="FFFFFF"/>
+                </a:solidFill>
+              </a14:hiddenFill>
+            </a:ext>
+            <a:ext uri="{91240B29-F687-4F45-9708-019B960494DF}">
+              <a14:hiddenLine xmlns:a14="http://schemas.microsoft.com/office/drawing/2010/main" w="9525">
+                <a:solidFill>
+                  <a:srgbClr val="000000"/>
+                </a:solidFill>
+                <a:miter lim="800000"/>
+                <a:headEnd/>
+                <a:tailEnd/>
+              </a14:hiddenLine>
+            </a:ext>
+          </a:extLst>
+        </p:spPr>
+      </p:pic>
+      <p:cxnSp>
+        <p:nvCxnSpPr>
+          <p:cNvPr id="22" name="Connecteur droit avec flèche 21"/>
+          <p:cNvCxnSpPr/>
+          <p:nvPr/>
+        </p:nvCxnSpPr>
+        <p:spPr bwMode="auto">
+          <a:xfrm flipH="1" flipV="1">
+            <a:off x="10558086" y="6955356"/>
+            <a:ext cx="579437" cy="828675"/>
+          </a:xfrm>
+          <a:prstGeom prst="straightConnector1">
+            <a:avLst/>
+          </a:prstGeom>
+          <a:ln>
+            <a:headEnd type="triangle" w="med" len="med"/>
+            <a:tailEnd type="triangle"/>
+          </a:ln>
+          <a:extLst/>
+        </p:spPr>
+        <p:style>
+          <a:lnRef idx="3">
+            <a:schemeClr val="accent2"/>
+          </a:lnRef>
+          <a:fillRef idx="0">
+            <a:schemeClr val="accent2"/>
+          </a:fillRef>
+          <a:effectRef idx="2">
+            <a:schemeClr val="accent2"/>
+          </a:effectRef>
+          <a:fontRef idx="minor">
+            <a:schemeClr val="tx1"/>
+          </a:fontRef>
+        </p:style>
+      </p:cxnSp>
+      <p:cxnSp>
+        <p:nvCxnSpPr>
+          <p:cNvPr id="36" name="Connecteur droit avec flèche 35"/>
+          <p:cNvCxnSpPr/>
+          <p:nvPr/>
+        </p:nvCxnSpPr>
+        <p:spPr bwMode="auto">
+          <a:xfrm>
+            <a:off x="3207184" y="2349425"/>
+            <a:ext cx="423863" cy="0"/>
+          </a:xfrm>
+          <a:prstGeom prst="straightConnector1">
+            <a:avLst/>
+          </a:prstGeom>
+          <a:ln>
+            <a:headEnd type="triangle" w="med" len="med"/>
+            <a:tailEnd type="triangle"/>
+          </a:ln>
+          <a:extLst/>
+        </p:spPr>
+        <p:style>
+          <a:lnRef idx="3">
+            <a:schemeClr val="accent4"/>
+          </a:lnRef>
+          <a:fillRef idx="0">
+            <a:schemeClr val="accent4"/>
+          </a:fillRef>
+          <a:effectRef idx="2">
+            <a:schemeClr val="accent4"/>
+          </a:effectRef>
+          <a:fontRef idx="minor">
+            <a:schemeClr val="tx1"/>
+          </a:fontRef>
+        </p:style>
+      </p:cxnSp>
+      <p:pic>
+        <p:nvPicPr>
+          <p:cNvPr id="37" name="Image 27"/>
+          <p:cNvPicPr>
+            <a:picLocks noChangeAspect="1"/>
+          </p:cNvPicPr>
+          <p:nvPr/>
+        </p:nvPicPr>
+        <p:blipFill>
+          <a:blip r:embed="rId7">
+            <a:extLst>
+              <a:ext uri="{28A0092B-C50C-407E-A947-70E740481C1C}">
+                <a14:useLocalDpi xmlns:a14="http://schemas.microsoft.com/office/drawing/2010/main" val="0"/>
+              </a:ext>
+            </a:extLst>
+          </a:blip>
+          <a:srcRect/>
+          <a:stretch>
+            <a:fillRect/>
+          </a:stretch>
+        </p:blipFill>
+        <p:spPr bwMode="auto">
+          <a:xfrm>
+            <a:off x="2365013" y="3107039"/>
+            <a:ext cx="420687" cy="255588"/>
+          </a:xfrm>
+          <a:prstGeom prst="rect">
+            <a:avLst/>
+          </a:prstGeom>
+          <a:noFill/>
+          <a:ln>
+            <a:noFill/>
+          </a:ln>
+          <a:extLst>
+            <a:ext uri="{909E8E84-426E-40DD-AFC4-6F175D3DCCD1}">
+              <a14:hiddenFill xmlns:a14="http://schemas.microsoft.com/office/drawing/2010/main">
+                <a:solidFill>
+                  <a:srgbClr val="FFFFFF"/>
+                </a:solidFill>
+              </a14:hiddenFill>
+            </a:ext>
+            <a:ext uri="{91240B29-F687-4F45-9708-019B960494DF}">
+              <a14:hiddenLine xmlns:a14="http://schemas.microsoft.com/office/drawing/2010/main" w="9525">
+                <a:solidFill>
+                  <a:srgbClr val="000000"/>
+                </a:solidFill>
+                <a:miter lim="800000"/>
+                <a:headEnd/>
+                <a:tailEnd/>
+              </a14:hiddenLine>
+            </a:ext>
+          </a:extLst>
+        </p:spPr>
+      </p:pic>
+      <p:cxnSp>
+        <p:nvCxnSpPr>
+          <p:cNvPr id="38" name="Connecteur droit avec flèche 37"/>
+          <p:cNvCxnSpPr/>
+          <p:nvPr/>
+        </p:nvCxnSpPr>
+        <p:spPr bwMode="auto">
+          <a:xfrm flipV="1">
+            <a:off x="933061" y="2956909"/>
+            <a:ext cx="3284593" cy="784667"/>
+          </a:xfrm>
+          <a:prstGeom prst="straightConnector1">
+            <a:avLst/>
+          </a:prstGeom>
+          <a:ln>
+            <a:headEnd type="triangle" w="med" len="med"/>
+            <a:tailEnd type="triangle"/>
+          </a:ln>
+          <a:extLst/>
+        </p:spPr>
+        <p:style>
+          <a:lnRef idx="3">
+            <a:schemeClr val="accent4"/>
+          </a:lnRef>
+          <a:fillRef idx="0">
+            <a:schemeClr val="accent4"/>
+          </a:fillRef>
+          <a:effectRef idx="2">
+            <a:schemeClr val="accent4"/>
+          </a:effectRef>
+          <a:fontRef idx="minor">
+            <a:schemeClr val="tx1"/>
+          </a:fontRef>
+        </p:style>
+      </p:cxnSp>
+      <p:sp>
+        <p:nvSpPr>
+          <p:cNvPr id="39" name="ZoneTexte 38"/>
+          <p:cNvSpPr txBox="1"/>
+          <p:nvPr/>
+        </p:nvSpPr>
+        <p:spPr>
+          <a:xfrm>
+            <a:off x="2724538" y="1228571"/>
+            <a:ext cx="5801959" cy="646331"/>
+          </a:xfrm>
+          <a:prstGeom prst="rect">
+            <a:avLst/>
+          </a:prstGeom>
+          <a:noFill/>
+        </p:spPr>
+        <p:txBody>
+          <a:bodyPr wrap="square" rtlCol="0">
+            <a:spAutoFit/>
+          </a:bodyPr>
+          <a:lstStyle/>
+          <a:p>
+            <a:r>
+              <a:rPr lang="fr-FR" dirty="0" smtClean="0"/>
+              <a:t>Détection de commandes </a:t>
+            </a:r>
+          </a:p>
+          <a:p>
+            <a:r>
+              <a:rPr lang="fr-FR" dirty="0" smtClean="0"/>
+              <a:t>(chaud / froid)</a:t>
+            </a:r>
+            <a:endParaRPr lang="fr-FR" dirty="0"/>
+          </a:p>
+        </p:txBody>
+      </p:sp>
+      <p:sp>
+        <p:nvSpPr>
+          <p:cNvPr id="40" name="ZoneTexte 39"/>
+          <p:cNvSpPr txBox="1"/>
+          <p:nvPr/>
+        </p:nvSpPr>
+        <p:spPr>
+          <a:xfrm>
+            <a:off x="183261" y="4427907"/>
+            <a:ext cx="2430336" cy="1754326"/>
+          </a:xfrm>
+          <a:prstGeom prst="rect">
+            <a:avLst/>
+          </a:prstGeom>
+          <a:noFill/>
+        </p:spPr>
+        <p:txBody>
+          <a:bodyPr wrap="square" rtlCol="0">
+            <a:spAutoFit/>
+          </a:bodyPr>
+          <a:lstStyle/>
+          <a:p>
+            <a:r>
+              <a:rPr lang="fr-FR" dirty="0" smtClean="0"/>
+              <a:t>Envoi d’une commande sous forme de liaison Série</a:t>
+            </a:r>
+            <a:br>
+              <a:rPr lang="fr-FR" dirty="0" smtClean="0"/>
+            </a:br>
+            <a:r>
+              <a:rPr lang="fr-FR" dirty="0" smtClean="0"/>
+              <a:t>Ex : </a:t>
+            </a:r>
+            <a:r>
+              <a:rPr lang="fr-FR" dirty="0" smtClean="0">
+                <a:latin typeface="Courier" pitchFamily="49" charset="0"/>
+              </a:rPr>
+              <a:t>mw2020</a:t>
+            </a:r>
+            <a:r>
+              <a:rPr lang="fr-FR" dirty="0" smtClean="0"/>
+              <a:t> pour faire tourner les 2 moteurs doucement</a:t>
+            </a:r>
+            <a:endParaRPr lang="fr-FR" dirty="0"/>
+          </a:p>
+        </p:txBody>
+      </p:sp>
+      <p:sp>
+        <p:nvSpPr>
+          <p:cNvPr id="42" name="ZoneTexte 41"/>
+          <p:cNvSpPr txBox="1"/>
+          <p:nvPr/>
+        </p:nvSpPr>
+        <p:spPr>
+          <a:xfrm>
+            <a:off x="3068971" y="4772452"/>
+            <a:ext cx="1916783" cy="923330"/>
+          </a:xfrm>
+          <a:prstGeom prst="rect">
+            <a:avLst/>
+          </a:prstGeom>
+          <a:noFill/>
+        </p:spPr>
+        <p:txBody>
+          <a:bodyPr wrap="square" rtlCol="0">
+            <a:spAutoFit/>
+          </a:bodyPr>
+          <a:lstStyle/>
+          <a:p>
+            <a:r>
+              <a:rPr lang="fr-FR" dirty="0" smtClean="0"/>
+              <a:t>Carte électronique</a:t>
+            </a:r>
+            <a:br>
+              <a:rPr lang="fr-FR" dirty="0" smtClean="0"/>
+            </a:br>
+            <a:r>
+              <a:rPr lang="fr-FR" dirty="0" smtClean="0"/>
+              <a:t>Air </a:t>
+            </a:r>
+            <a:r>
+              <a:rPr lang="fr-FR" dirty="0" err="1" smtClean="0"/>
+              <a:t>conditionning</a:t>
+            </a:r>
+            <a:endParaRPr lang="fr-FR" dirty="0"/>
+          </a:p>
+        </p:txBody>
+      </p:sp>
+      <p:sp>
+        <p:nvSpPr>
+          <p:cNvPr id="43" name="ZoneTexte 42"/>
+          <p:cNvSpPr txBox="1"/>
+          <p:nvPr/>
+        </p:nvSpPr>
+        <p:spPr>
+          <a:xfrm>
+            <a:off x="5785822" y="5049451"/>
+            <a:ext cx="1916783" cy="646331"/>
+          </a:xfrm>
+          <a:prstGeom prst="rect">
+            <a:avLst/>
+          </a:prstGeom>
+          <a:noFill/>
+        </p:spPr>
+        <p:txBody>
+          <a:bodyPr wrap="square" rtlCol="0">
+            <a:spAutoFit/>
+          </a:bodyPr>
+          <a:lstStyle/>
+          <a:p>
+            <a:r>
+              <a:rPr lang="fr-FR" dirty="0" err="1" smtClean="0"/>
+              <a:t>Servo</a:t>
+            </a:r>
+            <a:r>
+              <a:rPr lang="fr-FR" dirty="0" smtClean="0"/>
+              <a:t> moteurs</a:t>
+            </a:r>
+            <a:r>
+              <a:rPr lang="fr-FR" dirty="0" smtClean="0"/>
+              <a:t/>
+            </a:r>
+            <a:br>
+              <a:rPr lang="fr-FR" dirty="0" smtClean="0"/>
+            </a:br>
+            <a:r>
+              <a:rPr lang="fr-FR" dirty="0" smtClean="0"/>
+              <a:t>« Moteurs »</a:t>
+            </a:r>
+            <a:endParaRPr lang="fr-FR" dirty="0"/>
+          </a:p>
+        </p:txBody>
+      </p:sp>
+      <p:cxnSp>
+        <p:nvCxnSpPr>
+          <p:cNvPr id="44" name="Connecteur droit avec flèche 43"/>
+          <p:cNvCxnSpPr/>
+          <p:nvPr/>
+        </p:nvCxnSpPr>
+        <p:spPr bwMode="auto">
+          <a:xfrm flipH="1">
+            <a:off x="4515639" y="4188550"/>
+            <a:ext cx="1238766" cy="0"/>
+          </a:xfrm>
+          <a:prstGeom prst="straightConnector1">
+            <a:avLst/>
+          </a:prstGeom>
+          <a:ln>
+            <a:headEnd type="triangle" w="med" len="med"/>
+            <a:tailEnd type="triangle"/>
+          </a:ln>
+          <a:extLst/>
+        </p:spPr>
+        <p:style>
+          <a:lnRef idx="3">
+            <a:schemeClr val="accent2"/>
+          </a:lnRef>
+          <a:fillRef idx="0">
+            <a:schemeClr val="accent2"/>
+          </a:fillRef>
+          <a:effectRef idx="2">
+            <a:schemeClr val="accent2"/>
+          </a:effectRef>
+          <a:fontRef idx="minor">
+            <a:schemeClr val="tx1"/>
+          </a:fontRef>
+        </p:style>
+      </p:cxnSp>
+      <p:cxnSp>
+        <p:nvCxnSpPr>
+          <p:cNvPr id="50" name="Connecteur droit avec flèche 49"/>
+          <p:cNvCxnSpPr/>
+          <p:nvPr/>
+        </p:nvCxnSpPr>
+        <p:spPr bwMode="auto">
+          <a:xfrm>
+            <a:off x="7191119" y="4254927"/>
+            <a:ext cx="511486" cy="0"/>
+          </a:xfrm>
+          <a:prstGeom prst="straightConnector1">
+            <a:avLst/>
+          </a:prstGeom>
+          <a:ln>
+            <a:headEnd type="none" w="med" len="med"/>
+            <a:tailEnd type="triangle"/>
+          </a:ln>
+          <a:extLst/>
+        </p:spPr>
+        <p:style>
+          <a:lnRef idx="3">
+            <a:schemeClr val="accent4"/>
+          </a:lnRef>
+          <a:fillRef idx="0">
+            <a:schemeClr val="accent4"/>
+          </a:fillRef>
+          <a:effectRef idx="2">
+            <a:schemeClr val="accent4"/>
+          </a:effectRef>
+          <a:fontRef idx="minor">
+            <a:schemeClr val="tx1"/>
+          </a:fontRef>
+        </p:style>
+      </p:cxnSp>
+      <p:pic>
+        <p:nvPicPr>
+          <p:cNvPr id="57" name="Image 56"/>
+          <p:cNvPicPr>
+            <a:picLocks noChangeAspect="1"/>
+          </p:cNvPicPr>
+          <p:nvPr/>
+        </p:nvPicPr>
+        <p:blipFill>
+          <a:blip r:embed="rId9">
+            <a:extLst>
+              <a:ext uri="{28A0092B-C50C-407E-A947-70E740481C1C}">
+                <a14:useLocalDpi xmlns:a14="http://schemas.microsoft.com/office/drawing/2010/main" val="0"/>
+              </a:ext>
+            </a:extLst>
+          </a:blip>
+          <a:stretch>
+            <a:fillRect/>
+          </a:stretch>
+        </p:blipFill>
+        <p:spPr>
+          <a:xfrm>
+            <a:off x="6339377" y="2188678"/>
+            <a:ext cx="304800" cy="304800"/>
+          </a:xfrm>
+          <a:prstGeom prst="rect">
+            <a:avLst/>
+          </a:prstGeom>
+        </p:spPr>
+      </p:pic>
+      <p:pic>
+        <p:nvPicPr>
+          <p:cNvPr id="2050" name="Picture 2" descr="Résultat de recherche d'images pour &quot;servomoteur&quot;"/>
+          <p:cNvPicPr>
+            <a:picLocks noChangeAspect="1" noChangeArrowheads="1"/>
+          </p:cNvPicPr>
+          <p:nvPr/>
+        </p:nvPicPr>
+        <p:blipFill>
+          <a:blip r:embed="rId10">
+            <a:extLst>
+              <a:ext uri="{28A0092B-C50C-407E-A947-70E740481C1C}">
+                <a14:useLocalDpi xmlns:a14="http://schemas.microsoft.com/office/drawing/2010/main" val="0"/>
+              </a:ext>
+            </a:extLst>
+          </a:blip>
+          <a:srcRect/>
+          <a:stretch>
+            <a:fillRect/>
+          </a:stretch>
+        </p:blipFill>
+        <p:spPr bwMode="auto">
+          <a:xfrm>
+            <a:off x="5650100" y="3330749"/>
+            <a:ext cx="1383540" cy="1627233"/>
+          </a:xfrm>
+          <a:prstGeom prst="rect">
+            <a:avLst/>
+          </a:prstGeom>
+          <a:noFill/>
+          <a:extLst>
+            <a:ext uri="{909E8E84-426E-40DD-AFC4-6F175D3DCCD1}">
+              <a14:hiddenFill xmlns:a14="http://schemas.microsoft.com/office/drawing/2010/main">
+                <a:solidFill>
+                  <a:srgbClr val="FFFFFF"/>
+                </a:solidFill>
+              </a14:hiddenFill>
+            </a:ext>
+          </a:extLst>
+        </p:spPr>
+      </p:pic>
+      <p:pic>
+        <p:nvPicPr>
+          <p:cNvPr id="2052" name="Picture 4" descr="https://encrypted-tbn0.gstatic.com/images?q=tbn:ANd9GcSYjVm5aqi08I4oY5qy2nSccfZ_eQGFaq06kAFukY2H79IAsg_a6wpOW3_p"/>
+          <p:cNvPicPr>
+            <a:picLocks noChangeAspect="1" noChangeArrowheads="1"/>
+          </p:cNvPicPr>
+          <p:nvPr/>
+        </p:nvPicPr>
+        <p:blipFill>
+          <a:blip r:embed="rId11">
+            <a:extLst>
+              <a:ext uri="{28A0092B-C50C-407E-A947-70E740481C1C}">
+                <a14:useLocalDpi xmlns:a14="http://schemas.microsoft.com/office/drawing/2010/main" val="0"/>
+              </a:ext>
+            </a:extLst>
+          </a:blip>
+          <a:srcRect/>
+          <a:stretch>
+            <a:fillRect/>
+          </a:stretch>
+        </p:blipFill>
+        <p:spPr bwMode="auto">
+          <a:xfrm>
+            <a:off x="7757933" y="3794440"/>
+            <a:ext cx="1400657" cy="804432"/>
+          </a:xfrm>
+          <a:prstGeom prst="rect">
+            <a:avLst/>
+          </a:prstGeom>
+          <a:noFill/>
+          <a:extLst>
+            <a:ext uri="{909E8E84-426E-40DD-AFC4-6F175D3DCCD1}">
+              <a14:hiddenFill xmlns:a14="http://schemas.microsoft.com/office/drawing/2010/main">
+                <a:solidFill>
+                  <a:srgbClr val="FFFFFF"/>
+                </a:solidFill>
+              </a14:hiddenFill>
+            </a:ext>
+          </a:extLst>
+        </p:spPr>
+      </p:pic>
+      <p:pic>
+        <p:nvPicPr>
+          <p:cNvPr id="9" name="Image 8"/>
+          <p:cNvPicPr>
+            <a:picLocks noChangeAspect="1"/>
+          </p:cNvPicPr>
+          <p:nvPr/>
+        </p:nvPicPr>
+        <p:blipFill>
+          <a:blip r:embed="rId12"/>
+          <a:stretch>
+            <a:fillRect/>
+          </a:stretch>
+        </p:blipFill>
+        <p:spPr>
+          <a:xfrm>
+            <a:off x="4882000" y="3684650"/>
+            <a:ext cx="536241" cy="355551"/>
+          </a:xfrm>
+          <a:prstGeom prst="rect">
+            <a:avLst/>
+          </a:prstGeom>
+        </p:spPr>
+      </p:pic>
     </p:spTree>
     <p:extLst>
       <p:ext uri="{BB962C8B-B14F-4D97-AF65-F5344CB8AC3E}">
-        <p14:creationId xmlns:p14="http://schemas.microsoft.com/office/powerpoint/2010/main" val="2624478632"/>
+        <p14:creationId xmlns:p14="http://schemas.microsoft.com/office/powerpoint/2010/main" val="208255331"/>
       </p:ext>
     </p:extLst>
   </p:cSld>
@@ -46953,7 +48191,7 @@
 </p:sld>
 </file>
 
-<file path=ppt/slides/slide22.xml><?xml version="1.0" encoding="utf-8"?>
+<file path=ppt/slides/slide23.xml><?xml version="1.0" encoding="utf-8"?>
 <p:sld xmlns:a="http://schemas.openxmlformats.org/drawingml/2006/main" xmlns:r="http://schemas.openxmlformats.org/officeDocument/2006/relationships" xmlns:p="http://schemas.openxmlformats.org/presentationml/2006/main">
   <p:cSld>
     <p:spTree>
@@ -47011,7 +48249,7 @@
             <a:fld id="{C47C2D81-940B-4685-92D1-3ECF90F4940E}" type="slidenum">
               <a:rPr lang="fr-FR" smtClean="0"/>
               <a:pPr/>
-              <a:t>22</a:t>
+              <a:t>23</a:t>
             </a:fld>
             <a:endParaRPr lang="fr-FR" dirty="0"/>
           </a:p>
@@ -47073,7 +48311,7 @@
 </p:sld>
 </file>
 
-<file path=ppt/slides/slide23.xml><?xml version="1.0" encoding="utf-8"?>
+<file path=ppt/slides/slide24.xml><?xml version="1.0" encoding="utf-8"?>
 <p:sld xmlns:a="http://schemas.openxmlformats.org/drawingml/2006/main" xmlns:r="http://schemas.openxmlformats.org/officeDocument/2006/relationships" xmlns:p="http://schemas.openxmlformats.org/presentationml/2006/main">
   <p:cSld>
     <p:spTree>
@@ -47137,7 +48375,7 @@
             <a:fld id="{1AA167F7-1AE4-034A-99C2-C615EB6F9492}" type="slidenum">
               <a:rPr lang="fr-FR" smtClean="0"/>
               <a:pPr/>
-              <a:t>23</a:t>
+              <a:t>24</a:t>
             </a:fld>
             <a:endParaRPr lang="fr-FR" dirty="0"/>
           </a:p>
@@ -47156,7 +48394,7 @@
 </p:sld>
 </file>
 
-<file path=ppt/slides/slide24.xml><?xml version="1.0" encoding="utf-8"?>
+<file path=ppt/slides/slide25.xml><?xml version="1.0" encoding="utf-8"?>
 <p:sld xmlns:a="http://schemas.openxmlformats.org/drawingml/2006/main" xmlns:r="http://schemas.openxmlformats.org/officeDocument/2006/relationships" xmlns:p="http://schemas.openxmlformats.org/presentationml/2006/main">
   <p:cSld>
     <p:spTree>
@@ -47318,10 +48556,12 @@
           <a:p>
             <a:r>
               <a:rPr lang="fr-FR" dirty="0"/>
-              <a:t>Live Coding : Reconnaissance vocale et Robotique</a:t>
-            </a:r>
-          </a:p>
-          <a:p>
+              <a:t>Live Coding : </a:t>
+            </a:r>
+            <a:r>
+              <a:rPr lang="fr-FR" dirty="0"/>
+              <a:t>Kinect et Robotique</a:t>
+            </a:r>
             <a:endParaRPr lang="fr-FR" dirty="0"/>
           </a:p>
         </p:txBody>
@@ -49223,10 +50463,12 @@
           <a:p>
             <a:r>
               <a:rPr lang="fr-FR" dirty="0"/>
-              <a:t>Live Coding : Reconnaissance vocale et Robotique</a:t>
-            </a:r>
-          </a:p>
-          <a:p>
+              <a:t>Live Coding : </a:t>
+            </a:r>
+            <a:r>
+              <a:rPr lang="fr-FR" dirty="0"/>
+              <a:t>Kinect et Robotique</a:t>
+            </a:r>
             <a:endParaRPr lang="fr-FR" dirty="0"/>
           </a:p>
         </p:txBody>

</xml_diff>